<commit_message>
tweak slides background to be less intrusive
</commit_message>
<xml_diff>
--- a/slides/shiny-workshop.pptx
+++ b/slides/shiny-workshop.pptx
@@ -6181,7 +6181,9 @@
           <p:nvPr userDrawn="1"/>
         </p:nvPicPr>
         <p:blipFill>
-          <a:blip r:embed="rId9"/>
+          <a:blip r:embed="rId9">
+            <a:alphaModFix amt="12000"/>
+          </a:blip>
           <a:stretch>
             <a:fillRect/>
           </a:stretch>
@@ -10667,6 +10669,20 @@
             <a:pPr marL="457200" lvl="1" indent="0">
               <a:buNone/>
             </a:pPr>
+            <a:endParaRPr lang="en-US" sz="2000" dirty="0">
+              <a:solidFill>
+                <a:schemeClr val="accent4">
+                  <a:lumMod val="75000"/>
+                </a:schemeClr>
+              </a:solidFill>
+              <a:latin typeface="FuraCode Nerd Font Mono" panose="020B0509050000020004" pitchFamily="50" charset="0"/>
+              <a:ea typeface="FuraCode Nerd Font Mono" panose="020B0509050000020004" pitchFamily="50" charset="0"/>
+            </a:endParaRPr>
+          </a:p>
+          <a:p>
+            <a:pPr marL="457200" lvl="1" indent="0">
+              <a:buNone/>
+            </a:pPr>
             <a:r>
               <a:rPr lang="en-US" sz="2000" dirty="0">
                 <a:solidFill>
@@ -10983,7 +10999,7 @@
         </p:blipFill>
         <p:spPr>
           <a:xfrm>
-            <a:off x="5801805" y="1825533"/>
+            <a:off x="5801805" y="2090509"/>
             <a:ext cx="6655808" cy="1999408"/>
           </a:xfrm>
           <a:prstGeom prst="rect">
@@ -11018,7 +11034,7 @@
         </p:blipFill>
         <p:spPr>
           <a:xfrm>
-            <a:off x="5801805" y="4021079"/>
+            <a:off x="5801805" y="4354801"/>
             <a:ext cx="5486364" cy="1578874"/>
           </a:xfrm>
           <a:prstGeom prst="rect">
@@ -11236,7 +11252,7 @@
             <a:pPr lvl="1"/>
             <a:r>
               <a:rPr lang="en-GB" sz="2000" dirty="0"/>
-              <a:t>Stick to a basic use case – we’ll add complexity later</a:t>
+              <a:t>Stick to a basic use case – you can add complexity later</a:t>
             </a:r>
           </a:p>
           <a:p>
@@ -11254,38 +11270,48 @@
           <a:p>
             <a:pPr lvl="1"/>
             <a:r>
-              <a:rPr lang="en-GB" sz="2000" dirty="0"/>
+              <a:rPr lang="en-GB" dirty="0"/>
               <a:t>Add/change inputs &amp; outputs</a:t>
             </a:r>
           </a:p>
           <a:p>
-            <a:pPr lvl="1"/>
-            <a:r>
-              <a:rPr lang="en-GB" sz="2000" dirty="0"/>
-              <a:t>Change layout, labels, texts</a:t>
-            </a:r>
-          </a:p>
-          <a:p>
-            <a:pPr lvl="1"/>
-            <a:r>
-              <a:rPr lang="en-GB" sz="2000" dirty="0"/>
-              <a:t>You are now allowed to change the title</a:t>
-            </a:r>
-          </a:p>
-          <a:p>
-            <a:r>
-              <a:rPr lang="en-GB" dirty="0"/>
-              <a:t>Server</a:t>
-            </a:r>
-          </a:p>
-          <a:p>
-            <a:pPr lvl="1"/>
-            <a:r>
-              <a:rPr lang="en-GB" sz="2000" dirty="0">
+            <a:pPr lvl="2"/>
+            <a:r>
+              <a:rPr lang="en-GB" sz="1600" dirty="0">
                 <a:latin typeface="FuraCode Nerd Font" panose="020B0509050000020004" pitchFamily="50" charset="0"/>
                 <a:ea typeface="FuraCode Nerd Font" panose="020B0509050000020004" pitchFamily="50" charset="0"/>
               </a:rPr>
-              <a:t>render[Text/Plot/Table]</a:t>
+              <a:t>[xxx]Input(..), [xxx]Output(..)</a:t>
+            </a:r>
+          </a:p>
+          <a:p>
+            <a:pPr lvl="1"/>
+            <a:r>
+              <a:rPr lang="en-GB" dirty="0"/>
+              <a:t>Change layout, labels, texts</a:t>
+            </a:r>
+          </a:p>
+          <a:p>
+            <a:r>
+              <a:rPr lang="en-GB" dirty="0"/>
+              <a:t>Server</a:t>
+            </a:r>
+          </a:p>
+          <a:p>
+            <a:pPr lvl="1"/>
+            <a:r>
+              <a:rPr lang="en-GB" dirty="0"/>
+              <a:t>Create an output for your analysis/visualization</a:t>
+            </a:r>
+          </a:p>
+          <a:p>
+            <a:pPr lvl="2"/>
+            <a:r>
+              <a:rPr lang="en-GB" sz="1600" dirty="0">
+                <a:latin typeface="FuraCode Nerd Font" panose="020B0509050000020004" pitchFamily="50" charset="0"/>
+                <a:ea typeface="FuraCode Nerd Font" panose="020B0509050000020004" pitchFamily="50" charset="0"/>
+              </a:rPr>
+              <a:t>render[xxx](..)</a:t>
             </a:r>
           </a:p>
           <a:p>
@@ -11329,7 +11355,7 @@
           <a:p>
             <a:r>
               <a:rPr lang="en-GB" dirty="0"/>
-              <a:t>3/6/2022</a:t>
+              <a:t>24/10/2022</a:t>
             </a:r>
             <a:endParaRPr lang="en-NL" dirty="0"/>
           </a:p>
@@ -15172,6 +15198,15 @@
 </file>
 
 <file path=customXml/item1.xml><?xml version="1.0" encoding="utf-8"?>
+<?mso-contentType ?>
+<FormTemplates xmlns="http://schemas.microsoft.com/sharepoint/v3/contenttype/forms">
+  <Display>DocumentLibraryForm</Display>
+  <Edit>DocumentLibraryForm</Edit>
+  <New>DocumentLibraryForm</New>
+</FormTemplates>
+</file>
+
+<file path=customXml/item2.xml><?xml version="1.0" encoding="utf-8"?>
 <ct:contentTypeSchema xmlns:ct="http://schemas.microsoft.com/office/2006/metadata/contentType" xmlns:ma="http://schemas.microsoft.com/office/2006/metadata/properties/metaAttributes" ct:_="" ma:_="" ma:contentTypeName="Document" ma:contentTypeID="0x010100C6CAEDC347B3154C9924F629E21BEB80" ma:contentTypeVersion="10" ma:contentTypeDescription="Create a new document." ma:contentTypeScope="" ma:versionID="9747ca1e1dad1116bfb6c4900c6f1e50">
   <xsd:schema xmlns:xsd="http://www.w3.org/2001/XMLSchema" xmlns:xs="http://www.w3.org/2001/XMLSchema" xmlns:p="http://schemas.microsoft.com/office/2006/metadata/properties" xmlns:ns2="2624be63-ebf9-4739-94ef-32159122bcb8" xmlns:ns3="b06909d7-6895-4fb7-bf6a-f9b4b7585c62" targetNamespace="http://schemas.microsoft.com/office/2006/metadata/properties" ma:root="true" ma:fieldsID="a476e8526bb1765c594a6798734553de" ns2:_="" ns3:_="">
     <xsd:import namespace="2624be63-ebf9-4739-94ef-32159122bcb8"/>
@@ -15376,15 +15411,6 @@
 </ct:contentTypeSchema>
 </file>
 
-<file path=customXml/item2.xml><?xml version="1.0" encoding="utf-8"?>
-<?mso-contentType ?>
-<FormTemplates xmlns="http://schemas.microsoft.com/sharepoint/v3/contenttype/forms">
-  <Display>DocumentLibraryForm</Display>
-  <Edit>DocumentLibraryForm</Edit>
-  <New>DocumentLibraryForm</New>
-</FormTemplates>
-</file>
-
 <file path=customXml/item3.xml><?xml version="1.0" encoding="utf-8"?>
 <p:properties xmlns:p="http://schemas.microsoft.com/office/2006/metadata/properties" xmlns:xsi="http://www.w3.org/2001/XMLSchema-instance" xmlns:pc="http://schemas.microsoft.com/office/infopath/2007/PartnerControls">
   <documentManagement/>
@@ -15392,6 +15418,14 @@
 </file>
 
 <file path=customXml/itemProps1.xml><?xml version="1.0" encoding="utf-8"?>
+<ds:datastoreItem xmlns:ds="http://schemas.openxmlformats.org/officeDocument/2006/customXml" ds:itemID="{08B165A8-AC64-4E2D-94ED-9DAA48721EFC}">
+  <ds:schemaRefs>
+    <ds:schemaRef ds:uri="http://schemas.microsoft.com/sharepoint/v3/contenttype/forms"/>
+  </ds:schemaRefs>
+</ds:datastoreItem>
+</file>
+
+<file path=customXml/itemProps2.xml><?xml version="1.0" encoding="utf-8"?>
 <ds:datastoreItem xmlns:ds="http://schemas.openxmlformats.org/officeDocument/2006/customXml" ds:itemID="{B7433C36-043F-46C5-A8F7-2BAFAB869059}">
   <ds:schemaRefs>
     <ds:schemaRef ds:uri="http://schemas.microsoft.com/office/2006/metadata/contentType"/>
@@ -15406,14 +15440,6 @@
     <ds:schemaRef ds:uri="http://purl.org/dc/elements/1.1/"/>
     <ds:schemaRef ds:uri="http://purl.org/dc/terms/"/>
     <ds:schemaRef ds:uri="http://schemas.microsoft.com/internal/obd"/>
-  </ds:schemaRefs>
-</ds:datastoreItem>
-</file>
-
-<file path=customXml/itemProps2.xml><?xml version="1.0" encoding="utf-8"?>
-<ds:datastoreItem xmlns:ds="http://schemas.openxmlformats.org/officeDocument/2006/customXml" ds:itemID="{08B165A8-AC64-4E2D-94ED-9DAA48721EFC}">
-  <ds:schemaRefs>
-    <ds:schemaRef ds:uri="http://schemas.microsoft.com/sharepoint/v3/contenttype/forms"/>
   </ds:schemaRefs>
 </ds:datastoreItem>
 </file>

</xml_diff>

<commit_message>
minor updates/tweaks to slides, reactive, and model fitting examples
</commit_message>
<xml_diff>
--- a/slides/shiny-workshop.pptx
+++ b/slides/shiny-workshop.pptx
@@ -6,7 +6,7 @@
     <p:sldMasterId id="2147483666" r:id="rId5"/>
   </p:sldMasterIdLst>
   <p:notesMasterIdLst>
-    <p:notesMasterId r:id="rId24"/>
+    <p:notesMasterId r:id="rId26"/>
   </p:notesMasterIdLst>
   <p:sldIdLst>
     <p:sldId id="256" r:id="rId6"/>
@@ -23,10 +23,12 @@
     <p:sldId id="267" r:id="rId17"/>
     <p:sldId id="266" r:id="rId18"/>
     <p:sldId id="268" r:id="rId19"/>
-    <p:sldId id="277" r:id="rId20"/>
-    <p:sldId id="278" r:id="rId21"/>
-    <p:sldId id="280" r:id="rId22"/>
-    <p:sldId id="279" r:id="rId23"/>
+    <p:sldId id="285" r:id="rId20"/>
+    <p:sldId id="277" r:id="rId21"/>
+    <p:sldId id="284" r:id="rId22"/>
+    <p:sldId id="278" r:id="rId23"/>
+    <p:sldId id="280" r:id="rId24"/>
+    <p:sldId id="279" r:id="rId25"/>
   </p:sldIdLst>
   <p:sldSz cx="12192000" cy="6858000"/>
   <p:notesSz cx="6858000" cy="9144000"/>
@@ -133,6 +135,493 @@
 </p:presentation>
 </file>
 
+<file path=ppt/revisionInfo.xml><?xml version="1.0" encoding="utf-8"?>
+<p1510:revInfo xmlns:a="http://schemas.openxmlformats.org/drawingml/2006/main" xmlns:r="http://schemas.openxmlformats.org/officeDocument/2006/relationships" xmlns:p1510="http://schemas.microsoft.com/office/powerpoint/2015/10/main">
+  <p1510:revLst>
+    <p1510:client id="{96409CF9-C97D-44F8-A3EA-3F6F117A062B}" v="77" dt="2023-10-16T10:05:51.167"/>
+  </p1510:revLst>
+</p1510:revInfo>
+</file>
+
+<file path=ppt/changesInfos/changesInfo1.xml><?xml version="1.0" encoding="utf-8"?>
+<pc:chgInfo xmlns:a="http://schemas.openxmlformats.org/drawingml/2006/main" xmlns:r="http://schemas.openxmlformats.org/officeDocument/2006/relationships" xmlns:ac="http://schemas.microsoft.com/office/drawing/2013/main/command" xmlns:pc="http://schemas.microsoft.com/office/powerpoint/2013/main/command">
+  <pc:docChgLst>
+    <pc:chgData name="Kroeze, Karel (UT-BMS)" userId="f7e72889-5459-48df-bfa5-5c7276a18aae" providerId="ADAL" clId="{96409CF9-C97D-44F8-A3EA-3F6F117A062B}"/>
+    <pc:docChg chg="undo custSel addSld modSld sldOrd">
+      <pc:chgData name="Kroeze, Karel (UT-BMS)" userId="f7e72889-5459-48df-bfa5-5c7276a18aae" providerId="ADAL" clId="{96409CF9-C97D-44F8-A3EA-3F6F117A062B}" dt="2023-10-16T10:05:51.167" v="490"/>
+      <pc:docMkLst>
+        <pc:docMk/>
+      </pc:docMkLst>
+      <pc:sldChg chg="addSp delSp modSp mod">
+        <pc:chgData name="Kroeze, Karel (UT-BMS)" userId="f7e72889-5459-48df-bfa5-5c7276a18aae" providerId="ADAL" clId="{96409CF9-C97D-44F8-A3EA-3F6F117A062B}" dt="2023-10-16T09:28:04.996" v="90" actId="1076"/>
+        <pc:sldMkLst>
+          <pc:docMk/>
+          <pc:sldMk cId="3738341136" sldId="260"/>
+        </pc:sldMkLst>
+        <pc:spChg chg="mod">
+          <ac:chgData name="Kroeze, Karel (UT-BMS)" userId="f7e72889-5459-48df-bfa5-5c7276a18aae" providerId="ADAL" clId="{96409CF9-C97D-44F8-A3EA-3F6F117A062B}" dt="2023-10-16T09:28:04.996" v="90" actId="1076"/>
+          <ac:spMkLst>
+            <pc:docMk/>
+            <pc:sldMk cId="3738341136" sldId="260"/>
+            <ac:spMk id="7" creationId="{22176F0C-35AA-47F3-B84A-7B833AF80BCF}"/>
+          </ac:spMkLst>
+        </pc:spChg>
+        <pc:picChg chg="add del">
+          <ac:chgData name="Kroeze, Karel (UT-BMS)" userId="f7e72889-5459-48df-bfa5-5c7276a18aae" providerId="ADAL" clId="{96409CF9-C97D-44F8-A3EA-3F6F117A062B}" dt="2023-10-16T09:21:16.724" v="5"/>
+          <ac:picMkLst>
+            <pc:docMk/>
+            <pc:sldMk cId="3738341136" sldId="260"/>
+            <ac:picMk id="2" creationId="{7CF36CDD-390C-6356-D8C0-C73FB38A0435}"/>
+          </ac:picMkLst>
+        </pc:picChg>
+        <pc:picChg chg="add del">
+          <ac:chgData name="Kroeze, Karel (UT-BMS)" userId="f7e72889-5459-48df-bfa5-5c7276a18aae" providerId="ADAL" clId="{96409CF9-C97D-44F8-A3EA-3F6F117A062B}" dt="2023-10-16T09:21:52.719" v="7" actId="22"/>
+          <ac:picMkLst>
+            <pc:docMk/>
+            <pc:sldMk cId="3738341136" sldId="260"/>
+            <ac:picMk id="4" creationId="{E1E759D2-3A96-25E8-38B1-2078EF5A0122}"/>
+          </ac:picMkLst>
+        </pc:picChg>
+        <pc:picChg chg="mod">
+          <ac:chgData name="Kroeze, Karel (UT-BMS)" userId="f7e72889-5459-48df-bfa5-5c7276a18aae" providerId="ADAL" clId="{96409CF9-C97D-44F8-A3EA-3F6F117A062B}" dt="2023-10-16T09:27:49.350" v="85" actId="1076"/>
+          <ac:picMkLst>
+            <pc:docMk/>
+            <pc:sldMk cId="3738341136" sldId="260"/>
+            <ac:picMk id="5" creationId="{8DE11605-BB2E-43CA-BB54-E4B6480F7CCA}"/>
+          </ac:picMkLst>
+        </pc:picChg>
+        <pc:picChg chg="add del mod">
+          <ac:chgData name="Kroeze, Karel (UT-BMS)" userId="f7e72889-5459-48df-bfa5-5c7276a18aae" providerId="ADAL" clId="{96409CF9-C97D-44F8-A3EA-3F6F117A062B}" dt="2023-10-16T09:25:43.505" v="11" actId="478"/>
+          <ac:picMkLst>
+            <pc:docMk/>
+            <pc:sldMk cId="3738341136" sldId="260"/>
+            <ac:picMk id="9" creationId="{BAC51134-C618-7839-29FC-9F6762570BF1}"/>
+          </ac:picMkLst>
+        </pc:picChg>
+        <pc:picChg chg="add mod">
+          <ac:chgData name="Kroeze, Karel (UT-BMS)" userId="f7e72889-5459-48df-bfa5-5c7276a18aae" providerId="ADAL" clId="{96409CF9-C97D-44F8-A3EA-3F6F117A062B}" dt="2023-10-16T09:28:04.134" v="89" actId="1076"/>
+          <ac:picMkLst>
+            <pc:docMk/>
+            <pc:sldMk cId="3738341136" sldId="260"/>
+            <ac:picMk id="11" creationId="{53AA340E-6562-0260-FBE4-0C34F2999576}"/>
+          </ac:picMkLst>
+        </pc:picChg>
+        <pc:picChg chg="add del mod">
+          <ac:chgData name="Kroeze, Karel (UT-BMS)" userId="f7e72889-5459-48df-bfa5-5c7276a18aae" providerId="ADAL" clId="{96409CF9-C97D-44F8-A3EA-3F6F117A062B}" dt="2023-10-16T09:25:33.835" v="8" actId="478"/>
+          <ac:picMkLst>
+            <pc:docMk/>
+            <pc:sldMk cId="3738341136" sldId="260"/>
+            <ac:picMk id="1026" creationId="{36C83CBE-B85E-4174-EAF1-2F0068AA470E}"/>
+          </ac:picMkLst>
+        </pc:picChg>
+      </pc:sldChg>
+      <pc:sldChg chg="addSp delSp modSp mod">
+        <pc:chgData name="Kroeze, Karel (UT-BMS)" userId="f7e72889-5459-48df-bfa5-5c7276a18aae" providerId="ADAL" clId="{96409CF9-C97D-44F8-A3EA-3F6F117A062B}" dt="2023-10-16T09:39:08.408" v="219" actId="1076"/>
+        <pc:sldMkLst>
+          <pc:docMk/>
+          <pc:sldMk cId="1495240266" sldId="277"/>
+        </pc:sldMkLst>
+        <pc:spChg chg="mod">
+          <ac:chgData name="Kroeze, Karel (UT-BMS)" userId="f7e72889-5459-48df-bfa5-5c7276a18aae" providerId="ADAL" clId="{96409CF9-C97D-44F8-A3EA-3F6F117A062B}" dt="2023-10-16T09:38:47.988" v="214" actId="5793"/>
+          <ac:spMkLst>
+            <pc:docMk/>
+            <pc:sldMk cId="1495240266" sldId="277"/>
+            <ac:spMk id="3" creationId="{53955285-5F23-4DBC-8F2C-B5AF06D4975D}"/>
+          </ac:spMkLst>
+        </pc:spChg>
+        <pc:grpChg chg="del">
+          <ac:chgData name="Kroeze, Karel (UT-BMS)" userId="f7e72889-5459-48df-bfa5-5c7276a18aae" providerId="ADAL" clId="{96409CF9-C97D-44F8-A3EA-3F6F117A062B}" dt="2023-10-16T09:38:52.651" v="216" actId="478"/>
+          <ac:grpSpMkLst>
+            <pc:docMk/>
+            <pc:sldMk cId="1495240266" sldId="277"/>
+            <ac:grpSpMk id="11" creationId="{C51F17C6-D2E8-4516-BEF4-EF7B3ABFD707}"/>
+          </ac:grpSpMkLst>
+        </pc:grpChg>
+        <pc:picChg chg="add mod modCrop">
+          <ac:chgData name="Kroeze, Karel (UT-BMS)" userId="f7e72889-5459-48df-bfa5-5c7276a18aae" providerId="ADAL" clId="{96409CF9-C97D-44F8-A3EA-3F6F117A062B}" dt="2023-10-16T09:39:08.408" v="219" actId="1076"/>
+          <ac:picMkLst>
+            <pc:docMk/>
+            <pc:sldMk cId="1495240266" sldId="277"/>
+            <ac:picMk id="7" creationId="{850E6A02-A5C4-AEC2-C525-6EAE4AC3C862}"/>
+          </ac:picMkLst>
+        </pc:picChg>
+      </pc:sldChg>
+      <pc:sldChg chg="addSp delSp modSp mod">
+        <pc:chgData name="Kroeze, Karel (UT-BMS)" userId="f7e72889-5459-48df-bfa5-5c7276a18aae" providerId="ADAL" clId="{96409CF9-C97D-44F8-A3EA-3F6F117A062B}" dt="2023-10-16T09:44:51.007" v="371" actId="1076"/>
+        <pc:sldMkLst>
+          <pc:docMk/>
+          <pc:sldMk cId="776796449" sldId="278"/>
+        </pc:sldMkLst>
+        <pc:spChg chg="mod">
+          <ac:chgData name="Kroeze, Karel (UT-BMS)" userId="f7e72889-5459-48df-bfa5-5c7276a18aae" providerId="ADAL" clId="{96409CF9-C97D-44F8-A3EA-3F6F117A062B}" dt="2023-10-16T09:43:53.148" v="364" actId="20577"/>
+          <ac:spMkLst>
+            <pc:docMk/>
+            <pc:sldMk cId="776796449" sldId="278"/>
+            <ac:spMk id="3" creationId="{53955285-5F23-4DBC-8F2C-B5AF06D4975D}"/>
+          </ac:spMkLst>
+        </pc:spChg>
+        <pc:spChg chg="del">
+          <ac:chgData name="Kroeze, Karel (UT-BMS)" userId="f7e72889-5459-48df-bfa5-5c7276a18aae" providerId="ADAL" clId="{96409CF9-C97D-44F8-A3EA-3F6F117A062B}" dt="2023-10-16T09:44:31.839" v="365" actId="478"/>
+          <ac:spMkLst>
+            <pc:docMk/>
+            <pc:sldMk cId="776796449" sldId="278"/>
+            <ac:spMk id="6" creationId="{E5B6359E-D4EB-4C1D-AC37-23A99FEB194A}"/>
+          </ac:spMkLst>
+        </pc:spChg>
+        <pc:picChg chg="add mod">
+          <ac:chgData name="Kroeze, Karel (UT-BMS)" userId="f7e72889-5459-48df-bfa5-5c7276a18aae" providerId="ADAL" clId="{96409CF9-C97D-44F8-A3EA-3F6F117A062B}" dt="2023-10-16T09:44:51.007" v="371" actId="1076"/>
+          <ac:picMkLst>
+            <pc:docMk/>
+            <pc:sldMk cId="776796449" sldId="278"/>
+            <ac:picMk id="8" creationId="{4670703B-CC38-8881-122A-D36394A9EC8C}"/>
+          </ac:picMkLst>
+        </pc:picChg>
+      </pc:sldChg>
+      <pc:sldChg chg="addSp delSp modSp mod modAnim">
+        <pc:chgData name="Kroeze, Karel (UT-BMS)" userId="f7e72889-5459-48df-bfa5-5c7276a18aae" providerId="ADAL" clId="{96409CF9-C97D-44F8-A3EA-3F6F117A062B}" dt="2023-10-16T10:05:51.167" v="490"/>
+        <pc:sldMkLst>
+          <pc:docMk/>
+          <pc:sldMk cId="2943126073" sldId="279"/>
+        </pc:sldMkLst>
+        <pc:spChg chg="mod">
+          <ac:chgData name="Kroeze, Karel (UT-BMS)" userId="f7e72889-5459-48df-bfa5-5c7276a18aae" providerId="ADAL" clId="{96409CF9-C97D-44F8-A3EA-3F6F117A062B}" dt="2023-10-16T10:05:36.012" v="487" actId="1076"/>
+          <ac:spMkLst>
+            <pc:docMk/>
+            <pc:sldMk cId="2943126073" sldId="279"/>
+            <ac:spMk id="2" creationId="{DC65E524-C514-45D7-BC6C-D11A108C5A11}"/>
+          </ac:spMkLst>
+        </pc:spChg>
+        <pc:grpChg chg="del mod">
+          <ac:chgData name="Kroeze, Karel (UT-BMS)" userId="f7e72889-5459-48df-bfa5-5c7276a18aae" providerId="ADAL" clId="{96409CF9-C97D-44F8-A3EA-3F6F117A062B}" dt="2023-10-16T09:46:06.415" v="380"/>
+          <ac:grpSpMkLst>
+            <pc:docMk/>
+            <pc:sldMk cId="2943126073" sldId="279"/>
+            <ac:grpSpMk id="10" creationId="{2E64A9FD-6D1F-FCFF-AB6F-3F965C0EB936}"/>
+          </ac:grpSpMkLst>
+        </pc:grpChg>
+        <pc:grpChg chg="mod">
+          <ac:chgData name="Kroeze, Karel (UT-BMS)" userId="f7e72889-5459-48df-bfa5-5c7276a18aae" providerId="ADAL" clId="{96409CF9-C97D-44F8-A3EA-3F6F117A062B}" dt="2023-10-16T09:46:06.415" v="380"/>
+          <ac:grpSpMkLst>
+            <pc:docMk/>
+            <pc:sldMk cId="2943126073" sldId="279"/>
+            <ac:grpSpMk id="14" creationId="{F697C212-547C-BDF6-677D-D79359A1E716}"/>
+          </ac:grpSpMkLst>
+        </pc:grpChg>
+        <pc:grpChg chg="del mod">
+          <ac:chgData name="Kroeze, Karel (UT-BMS)" userId="f7e72889-5459-48df-bfa5-5c7276a18aae" providerId="ADAL" clId="{96409CF9-C97D-44F8-A3EA-3F6F117A062B}" dt="2023-10-16T09:46:12.822" v="385"/>
+          <ac:grpSpMkLst>
+            <pc:docMk/>
+            <pc:sldMk cId="2943126073" sldId="279"/>
+            <ac:grpSpMk id="17" creationId="{C273130F-2D81-1CDC-69F9-60AABFE6B13F}"/>
+          </ac:grpSpMkLst>
+        </pc:grpChg>
+        <pc:grpChg chg="del mod">
+          <ac:chgData name="Kroeze, Karel (UT-BMS)" userId="f7e72889-5459-48df-bfa5-5c7276a18aae" providerId="ADAL" clId="{96409CF9-C97D-44F8-A3EA-3F6F117A062B}" dt="2023-10-16T09:55:07.850" v="455" actId="478"/>
+          <ac:grpSpMkLst>
+            <pc:docMk/>
+            <pc:sldMk cId="2943126073" sldId="279"/>
+            <ac:grpSpMk id="19" creationId="{A5C0B758-945D-CED0-3E62-0D53511C79D5}"/>
+          </ac:grpSpMkLst>
+        </pc:grpChg>
+        <pc:inkChg chg="add del">
+          <ac:chgData name="Kroeze, Karel (UT-BMS)" userId="f7e72889-5459-48df-bfa5-5c7276a18aae" providerId="ADAL" clId="{96409CF9-C97D-44F8-A3EA-3F6F117A062B}" dt="2023-10-16T09:45:52.059" v="373" actId="9405"/>
+          <ac:inkMkLst>
+            <pc:docMk/>
+            <pc:sldMk cId="2943126073" sldId="279"/>
+            <ac:inkMk id="6" creationId="{E870DFD6-82E3-355F-9313-4919B7A20078}"/>
+          </ac:inkMkLst>
+        </pc:inkChg>
+        <pc:inkChg chg="add mod">
+          <ac:chgData name="Kroeze, Karel (UT-BMS)" userId="f7e72889-5459-48df-bfa5-5c7276a18aae" providerId="ADAL" clId="{96409CF9-C97D-44F8-A3EA-3F6F117A062B}" dt="2023-10-16T09:53:27.460" v="431" actId="1076"/>
+          <ac:inkMkLst>
+            <pc:docMk/>
+            <pc:sldMk cId="2943126073" sldId="279"/>
+            <ac:inkMk id="7" creationId="{C841DFD6-E7F0-3937-8BCF-8ADDC2AE880B}"/>
+          </ac:inkMkLst>
+        </pc:inkChg>
+        <pc:inkChg chg="add mod">
+          <ac:chgData name="Kroeze, Karel (UT-BMS)" userId="f7e72889-5459-48df-bfa5-5c7276a18aae" providerId="ADAL" clId="{96409CF9-C97D-44F8-A3EA-3F6F117A062B}" dt="2023-10-16T09:46:06.415" v="380"/>
+          <ac:inkMkLst>
+            <pc:docMk/>
+            <pc:sldMk cId="2943126073" sldId="279"/>
+            <ac:inkMk id="8" creationId="{4AE70AF9-1F14-B2D7-8F98-4B4B61F26451}"/>
+          </ac:inkMkLst>
+        </pc:inkChg>
+        <pc:inkChg chg="add mod">
+          <ac:chgData name="Kroeze, Karel (UT-BMS)" userId="f7e72889-5459-48df-bfa5-5c7276a18aae" providerId="ADAL" clId="{96409CF9-C97D-44F8-A3EA-3F6F117A062B}" dt="2023-10-16T09:46:06.415" v="380"/>
+          <ac:inkMkLst>
+            <pc:docMk/>
+            <pc:sldMk cId="2943126073" sldId="279"/>
+            <ac:inkMk id="9" creationId="{5EC1E851-7996-C73D-0213-2DE96B4E0F71}"/>
+          </ac:inkMkLst>
+        </pc:inkChg>
+        <pc:inkChg chg="add del mod">
+          <ac:chgData name="Kroeze, Karel (UT-BMS)" userId="f7e72889-5459-48df-bfa5-5c7276a18aae" providerId="ADAL" clId="{96409CF9-C97D-44F8-A3EA-3F6F117A062B}" dt="2023-10-16T09:55:13.065" v="457" actId="478"/>
+          <ac:inkMkLst>
+            <pc:docMk/>
+            <pc:sldMk cId="2943126073" sldId="279"/>
+            <ac:inkMk id="11" creationId="{1F18C148-9546-B9E3-1AC0-0ED9057E80ED}"/>
+          </ac:inkMkLst>
+        </pc:inkChg>
+        <pc:inkChg chg="add del mod">
+          <ac:chgData name="Kroeze, Karel (UT-BMS)" userId="f7e72889-5459-48df-bfa5-5c7276a18aae" providerId="ADAL" clId="{96409CF9-C97D-44F8-A3EA-3F6F117A062B}" dt="2023-10-16T09:55:10.470" v="456" actId="478"/>
+          <ac:inkMkLst>
+            <pc:docMk/>
+            <pc:sldMk cId="2943126073" sldId="279"/>
+            <ac:inkMk id="13" creationId="{0763FC67-D568-B61D-1200-468130497640}"/>
+          </ac:inkMkLst>
+        </pc:inkChg>
+        <pc:inkChg chg="add del mod">
+          <ac:chgData name="Kroeze, Karel (UT-BMS)" userId="f7e72889-5459-48df-bfa5-5c7276a18aae" providerId="ADAL" clId="{96409CF9-C97D-44F8-A3EA-3F6F117A062B}" dt="2023-10-16T09:55:05.125" v="454" actId="478"/>
+          <ac:inkMkLst>
+            <pc:docMk/>
+            <pc:sldMk cId="2943126073" sldId="279"/>
+            <ac:inkMk id="15" creationId="{BA120FA4-8386-2069-51AD-3C03D7741535}"/>
+          </ac:inkMkLst>
+        </pc:inkChg>
+        <pc:inkChg chg="add del mod topLvl">
+          <ac:chgData name="Kroeze, Karel (UT-BMS)" userId="f7e72889-5459-48df-bfa5-5c7276a18aae" providerId="ADAL" clId="{96409CF9-C97D-44F8-A3EA-3F6F117A062B}" dt="2023-10-16T09:55:07.850" v="455" actId="478"/>
+          <ac:inkMkLst>
+            <pc:docMk/>
+            <pc:sldMk cId="2943126073" sldId="279"/>
+            <ac:inkMk id="16" creationId="{FD600D0B-68A9-DC9E-5304-8B32EDC12567}"/>
+          </ac:inkMkLst>
+        </pc:inkChg>
+        <pc:inkChg chg="add mod topLvl">
+          <ac:chgData name="Kroeze, Karel (UT-BMS)" userId="f7e72889-5459-48df-bfa5-5c7276a18aae" providerId="ADAL" clId="{96409CF9-C97D-44F8-A3EA-3F6F117A062B}" dt="2023-10-16T09:55:07.850" v="455" actId="478"/>
+          <ac:inkMkLst>
+            <pc:docMk/>
+            <pc:sldMk cId="2943126073" sldId="279"/>
+            <ac:inkMk id="18" creationId="{BAED29BD-1DA3-934E-49B7-F495F7A7195B}"/>
+          </ac:inkMkLst>
+        </pc:inkChg>
+      </pc:sldChg>
+      <pc:sldChg chg="delSp modSp mod">
+        <pc:chgData name="Kroeze, Karel (UT-BMS)" userId="f7e72889-5459-48df-bfa5-5c7276a18aae" providerId="ADAL" clId="{96409CF9-C97D-44F8-A3EA-3F6F117A062B}" dt="2023-10-16T09:52:08.970" v="428" actId="1076"/>
+        <pc:sldMkLst>
+          <pc:docMk/>
+          <pc:sldMk cId="3626636867" sldId="280"/>
+        </pc:sldMkLst>
+        <pc:spChg chg="mod">
+          <ac:chgData name="Kroeze, Karel (UT-BMS)" userId="f7e72889-5459-48df-bfa5-5c7276a18aae" providerId="ADAL" clId="{96409CF9-C97D-44F8-A3EA-3F6F117A062B}" dt="2023-10-16T09:51:00.894" v="418" actId="5793"/>
+          <ac:spMkLst>
+            <pc:docMk/>
+            <pc:sldMk cId="3626636867" sldId="280"/>
+            <ac:spMk id="3" creationId="{53955285-5F23-4DBC-8F2C-B5AF06D4975D}"/>
+          </ac:spMkLst>
+        </pc:spChg>
+        <pc:spChg chg="del">
+          <ac:chgData name="Kroeze, Karel (UT-BMS)" userId="f7e72889-5459-48df-bfa5-5c7276a18aae" providerId="ADAL" clId="{96409CF9-C97D-44F8-A3EA-3F6F117A062B}" dt="2023-10-16T09:49:49.210" v="394" actId="478"/>
+          <ac:spMkLst>
+            <pc:docMk/>
+            <pc:sldMk cId="3626636867" sldId="280"/>
+            <ac:spMk id="15" creationId="{C43C087E-D5E1-41BA-B4F1-6CB3633545AE}"/>
+          </ac:spMkLst>
+        </pc:spChg>
+        <pc:picChg chg="mod modCrop">
+          <ac:chgData name="Kroeze, Karel (UT-BMS)" userId="f7e72889-5459-48df-bfa5-5c7276a18aae" providerId="ADAL" clId="{96409CF9-C97D-44F8-A3EA-3F6F117A062B}" dt="2023-10-16T09:51:50.671" v="425" actId="1076"/>
+          <ac:picMkLst>
+            <pc:docMk/>
+            <pc:sldMk cId="3626636867" sldId="280"/>
+            <ac:picMk id="12" creationId="{BCB9C76C-3C26-47FA-9156-215ECCFE8915}"/>
+          </ac:picMkLst>
+        </pc:picChg>
+        <pc:picChg chg="mod modCrop">
+          <ac:chgData name="Kroeze, Karel (UT-BMS)" userId="f7e72889-5459-48df-bfa5-5c7276a18aae" providerId="ADAL" clId="{96409CF9-C97D-44F8-A3EA-3F6F117A062B}" dt="2023-10-16T09:52:08.970" v="428" actId="1076"/>
+          <ac:picMkLst>
+            <pc:docMk/>
+            <pc:sldMk cId="3626636867" sldId="280"/>
+            <ac:picMk id="14" creationId="{CC2C35FC-AF82-498B-89F5-E09D354BE3F8}"/>
+          </ac:picMkLst>
+        </pc:picChg>
+      </pc:sldChg>
+      <pc:sldChg chg="addSp delSp modSp add mod">
+        <pc:chgData name="Kroeze, Karel (UT-BMS)" userId="f7e72889-5459-48df-bfa5-5c7276a18aae" providerId="ADAL" clId="{96409CF9-C97D-44F8-A3EA-3F6F117A062B}" dt="2023-10-16T09:43:16.378" v="354" actId="255"/>
+        <pc:sldMkLst>
+          <pc:docMk/>
+          <pc:sldMk cId="1361209070" sldId="284"/>
+        </pc:sldMkLst>
+        <pc:spChg chg="mod">
+          <ac:chgData name="Kroeze, Karel (UT-BMS)" userId="f7e72889-5459-48df-bfa5-5c7276a18aae" providerId="ADAL" clId="{96409CF9-C97D-44F8-A3EA-3F6F117A062B}" dt="2023-10-16T09:43:16.378" v="354" actId="255"/>
+          <ac:spMkLst>
+            <pc:docMk/>
+            <pc:sldMk cId="1361209070" sldId="284"/>
+            <ac:spMk id="3" creationId="{53955285-5F23-4DBC-8F2C-B5AF06D4975D}"/>
+          </ac:spMkLst>
+        </pc:spChg>
+        <pc:grpChg chg="del mod">
+          <ac:chgData name="Kroeze, Karel (UT-BMS)" userId="f7e72889-5459-48df-bfa5-5c7276a18aae" providerId="ADAL" clId="{96409CF9-C97D-44F8-A3EA-3F6F117A062B}" dt="2023-10-16T09:39:37.391" v="223" actId="478"/>
+          <ac:grpSpMkLst>
+            <pc:docMk/>
+            <pc:sldMk cId="1361209070" sldId="284"/>
+            <ac:grpSpMk id="11" creationId="{C51F17C6-D2E8-4516-BEF4-EF7B3ABFD707}"/>
+          </ac:grpSpMkLst>
+        </pc:grpChg>
+        <pc:grpChg chg="del mod">
+          <ac:chgData name="Kroeze, Karel (UT-BMS)" userId="f7e72889-5459-48df-bfa5-5c7276a18aae" providerId="ADAL" clId="{96409CF9-C97D-44F8-A3EA-3F6F117A062B}" dt="2023-10-16T09:41:19.745" v="243"/>
+          <ac:grpSpMkLst>
+            <pc:docMk/>
+            <pc:sldMk cId="1361209070" sldId="284"/>
+            <ac:grpSpMk id="18" creationId="{E30704EF-2FF5-8230-C702-C79C07CA0A85}"/>
+          </ac:grpSpMkLst>
+        </pc:grpChg>
+        <pc:grpChg chg="mod">
+          <ac:chgData name="Kroeze, Karel (UT-BMS)" userId="f7e72889-5459-48df-bfa5-5c7276a18aae" providerId="ADAL" clId="{96409CF9-C97D-44F8-A3EA-3F6F117A062B}" dt="2023-10-16T09:41:19.745" v="243"/>
+          <ac:grpSpMkLst>
+            <pc:docMk/>
+            <pc:sldMk cId="1361209070" sldId="284"/>
+            <ac:grpSpMk id="24" creationId="{CEDAA618-F646-3C24-6B06-3882A11B7807}"/>
+          </ac:grpSpMkLst>
+        </pc:grpChg>
+        <pc:picChg chg="add mod modCrop">
+          <ac:chgData name="Kroeze, Karel (UT-BMS)" userId="f7e72889-5459-48df-bfa5-5c7276a18aae" providerId="ADAL" clId="{96409CF9-C97D-44F8-A3EA-3F6F117A062B}" dt="2023-10-16T09:40:28.321" v="227" actId="732"/>
+          <ac:picMkLst>
+            <pc:docMk/>
+            <pc:sldMk cId="1361209070" sldId="284"/>
+            <ac:picMk id="7" creationId="{FFA53E35-871E-1EDD-3714-8F7C4924F8CF}"/>
+          </ac:picMkLst>
+        </pc:picChg>
+        <pc:picChg chg="add mod modCrop">
+          <ac:chgData name="Kroeze, Karel (UT-BMS)" userId="f7e72889-5459-48df-bfa5-5c7276a18aae" providerId="ADAL" clId="{96409CF9-C97D-44F8-A3EA-3F6F117A062B}" dt="2023-10-16T09:40:39.687" v="229" actId="1076"/>
+          <ac:picMkLst>
+            <pc:docMk/>
+            <pc:sldMk cId="1361209070" sldId="284"/>
+            <ac:picMk id="12" creationId="{3187B1E3-08E9-9B2A-5136-A7993866D639}"/>
+          </ac:picMkLst>
+        </pc:picChg>
+        <pc:inkChg chg="add del">
+          <ac:chgData name="Kroeze, Karel (UT-BMS)" userId="f7e72889-5459-48df-bfa5-5c7276a18aae" providerId="ADAL" clId="{96409CF9-C97D-44F8-A3EA-3F6F117A062B}" dt="2023-10-16T09:40:51.508" v="231" actId="9405"/>
+          <ac:inkMkLst>
+            <pc:docMk/>
+            <pc:sldMk cId="1361209070" sldId="284"/>
+            <ac:inkMk id="13" creationId="{62E9A659-210B-0B47-6FE3-050F9579ED7B}"/>
+          </ac:inkMkLst>
+        </pc:inkChg>
+        <pc:inkChg chg="add mod">
+          <ac:chgData name="Kroeze, Karel (UT-BMS)" userId="f7e72889-5459-48df-bfa5-5c7276a18aae" providerId="ADAL" clId="{96409CF9-C97D-44F8-A3EA-3F6F117A062B}" dt="2023-10-16T09:41:19.745" v="243"/>
+          <ac:inkMkLst>
+            <pc:docMk/>
+            <pc:sldMk cId="1361209070" sldId="284"/>
+            <ac:inkMk id="14" creationId="{93037999-CB6F-A97D-C6F7-E4CF11AB562A}"/>
+          </ac:inkMkLst>
+        </pc:inkChg>
+        <pc:inkChg chg="add mod">
+          <ac:chgData name="Kroeze, Karel (UT-BMS)" userId="f7e72889-5459-48df-bfa5-5c7276a18aae" providerId="ADAL" clId="{96409CF9-C97D-44F8-A3EA-3F6F117A062B}" dt="2023-10-16T09:41:19.745" v="243"/>
+          <ac:inkMkLst>
+            <pc:docMk/>
+            <pc:sldMk cId="1361209070" sldId="284"/>
+            <ac:inkMk id="15" creationId="{37958E6B-E5C7-E3D4-1CA1-77D93203AB84}"/>
+          </ac:inkMkLst>
+        </pc:inkChg>
+        <pc:inkChg chg="add mod">
+          <ac:chgData name="Kroeze, Karel (UT-BMS)" userId="f7e72889-5459-48df-bfa5-5c7276a18aae" providerId="ADAL" clId="{96409CF9-C97D-44F8-A3EA-3F6F117A062B}" dt="2023-10-16T09:41:19.745" v="243"/>
+          <ac:inkMkLst>
+            <pc:docMk/>
+            <pc:sldMk cId="1361209070" sldId="284"/>
+            <ac:inkMk id="16" creationId="{BB383934-AFF8-782E-3A93-4C22E341FBFA}"/>
+          </ac:inkMkLst>
+        </pc:inkChg>
+        <pc:inkChg chg="add mod">
+          <ac:chgData name="Kroeze, Karel (UT-BMS)" userId="f7e72889-5459-48df-bfa5-5c7276a18aae" providerId="ADAL" clId="{96409CF9-C97D-44F8-A3EA-3F6F117A062B}" dt="2023-10-16T09:41:19.745" v="243"/>
+          <ac:inkMkLst>
+            <pc:docMk/>
+            <pc:sldMk cId="1361209070" sldId="284"/>
+            <ac:inkMk id="17" creationId="{B2E4BA31-AB73-8B11-1D5D-BEB0C7295453}"/>
+          </ac:inkMkLst>
+        </pc:inkChg>
+        <pc:inkChg chg="add mod">
+          <ac:chgData name="Kroeze, Karel (UT-BMS)" userId="f7e72889-5459-48df-bfa5-5c7276a18aae" providerId="ADAL" clId="{96409CF9-C97D-44F8-A3EA-3F6F117A062B}" dt="2023-10-16T09:41:19.745" v="243"/>
+          <ac:inkMkLst>
+            <pc:docMk/>
+            <pc:sldMk cId="1361209070" sldId="284"/>
+            <ac:inkMk id="19" creationId="{B0F965E6-0252-4535-08F0-2AD080F99C03}"/>
+          </ac:inkMkLst>
+        </pc:inkChg>
+        <pc:inkChg chg="add">
+          <ac:chgData name="Kroeze, Karel (UT-BMS)" userId="f7e72889-5459-48df-bfa5-5c7276a18aae" providerId="ADAL" clId="{96409CF9-C97D-44F8-A3EA-3F6F117A062B}" dt="2023-10-16T09:41:07.920" v="238" actId="9405"/>
+          <ac:inkMkLst>
+            <pc:docMk/>
+            <pc:sldMk cId="1361209070" sldId="284"/>
+            <ac:inkMk id="20" creationId="{9376DEC4-65CC-1710-4A90-727F1AFE3273}"/>
+          </ac:inkMkLst>
+        </pc:inkChg>
+        <pc:inkChg chg="add mod">
+          <ac:chgData name="Kroeze, Karel (UT-BMS)" userId="f7e72889-5459-48df-bfa5-5c7276a18aae" providerId="ADAL" clId="{96409CF9-C97D-44F8-A3EA-3F6F117A062B}" dt="2023-10-16T09:41:19.745" v="243"/>
+          <ac:inkMkLst>
+            <pc:docMk/>
+            <pc:sldMk cId="1361209070" sldId="284"/>
+            <ac:inkMk id="21" creationId="{66D28C72-1FC1-AF1F-3338-16C77CFBA1C2}"/>
+          </ac:inkMkLst>
+        </pc:inkChg>
+        <pc:inkChg chg="add mod">
+          <ac:chgData name="Kroeze, Karel (UT-BMS)" userId="f7e72889-5459-48df-bfa5-5c7276a18aae" providerId="ADAL" clId="{96409CF9-C97D-44F8-A3EA-3F6F117A062B}" dt="2023-10-16T09:41:19.745" v="243"/>
+          <ac:inkMkLst>
+            <pc:docMk/>
+            <pc:sldMk cId="1361209070" sldId="284"/>
+            <ac:inkMk id="22" creationId="{C75A1093-D93D-941C-AD3D-AB9B594E6479}"/>
+          </ac:inkMkLst>
+        </pc:inkChg>
+        <pc:inkChg chg="add del">
+          <ac:chgData name="Kroeze, Karel (UT-BMS)" userId="f7e72889-5459-48df-bfa5-5c7276a18aae" providerId="ADAL" clId="{96409CF9-C97D-44F8-A3EA-3F6F117A062B}" dt="2023-10-16T09:41:19.708" v="242" actId="9405"/>
+          <ac:inkMkLst>
+            <pc:docMk/>
+            <pc:sldMk cId="1361209070" sldId="284"/>
+            <ac:inkMk id="23" creationId="{B947FAB8-0B97-E5B3-6145-465E40DCC148}"/>
+          </ac:inkMkLst>
+        </pc:inkChg>
+        <pc:inkChg chg="add">
+          <ac:chgData name="Kroeze, Karel (UT-BMS)" userId="f7e72889-5459-48df-bfa5-5c7276a18aae" providerId="ADAL" clId="{96409CF9-C97D-44F8-A3EA-3F6F117A062B}" dt="2023-10-16T09:41:24.434" v="244" actId="9405"/>
+          <ac:inkMkLst>
+            <pc:docMk/>
+            <pc:sldMk cId="1361209070" sldId="284"/>
+            <ac:inkMk id="25" creationId="{D9269CDF-FC56-4D36-1ED7-FA62BA13A975}"/>
+          </ac:inkMkLst>
+        </pc:inkChg>
+        <pc:inkChg chg="add">
+          <ac:chgData name="Kroeze, Karel (UT-BMS)" userId="f7e72889-5459-48df-bfa5-5c7276a18aae" providerId="ADAL" clId="{96409CF9-C97D-44F8-A3EA-3F6F117A062B}" dt="2023-10-16T09:41:27.736" v="245" actId="9405"/>
+          <ac:inkMkLst>
+            <pc:docMk/>
+            <pc:sldMk cId="1361209070" sldId="284"/>
+            <ac:inkMk id="26" creationId="{1240769C-D154-B1AA-D83D-A0D17733F975}"/>
+          </ac:inkMkLst>
+        </pc:inkChg>
+      </pc:sldChg>
+      <pc:sldChg chg="addSp delSp modSp add mod ord">
+        <pc:chgData name="Kroeze, Karel (UT-BMS)" userId="f7e72889-5459-48df-bfa5-5c7276a18aae" providerId="ADAL" clId="{96409CF9-C97D-44F8-A3EA-3F6F117A062B}" dt="2023-10-16T09:42:28.799" v="273" actId="1076"/>
+        <pc:sldMkLst>
+          <pc:docMk/>
+          <pc:sldMk cId="801706623" sldId="285"/>
+        </pc:sldMkLst>
+        <pc:spChg chg="mod">
+          <ac:chgData name="Kroeze, Karel (UT-BMS)" userId="f7e72889-5459-48df-bfa5-5c7276a18aae" providerId="ADAL" clId="{96409CF9-C97D-44F8-A3EA-3F6F117A062B}" dt="2023-10-16T09:42:16.375" v="271" actId="6549"/>
+          <ac:spMkLst>
+            <pc:docMk/>
+            <pc:sldMk cId="801706623" sldId="285"/>
+            <ac:spMk id="3" creationId="{53955285-5F23-4DBC-8F2C-B5AF06D4975D}"/>
+          </ac:spMkLst>
+        </pc:spChg>
+        <pc:grpChg chg="del">
+          <ac:chgData name="Kroeze, Karel (UT-BMS)" userId="f7e72889-5459-48df-bfa5-5c7276a18aae" providerId="ADAL" clId="{96409CF9-C97D-44F8-A3EA-3F6F117A062B}" dt="2023-10-16T09:35:24.247" v="93" actId="478"/>
+          <ac:grpSpMkLst>
+            <pc:docMk/>
+            <pc:sldMk cId="801706623" sldId="285"/>
+            <ac:grpSpMk id="11" creationId="{C51F17C6-D2E8-4516-BEF4-EF7B3ABFD707}"/>
+          </ac:grpSpMkLst>
+        </pc:grpChg>
+        <pc:picChg chg="add mod modCrop">
+          <ac:chgData name="Kroeze, Karel (UT-BMS)" userId="f7e72889-5459-48df-bfa5-5c7276a18aae" providerId="ADAL" clId="{96409CF9-C97D-44F8-A3EA-3F6F117A062B}" dt="2023-10-16T09:42:28.799" v="273" actId="1076"/>
+          <ac:picMkLst>
+            <pc:docMk/>
+            <pc:sldMk cId="801706623" sldId="285"/>
+            <ac:picMk id="7" creationId="{A03CA454-9131-DE78-B5C6-102B26378D1C}"/>
+          </ac:picMkLst>
+        </pc:picChg>
+      </pc:sldChg>
+    </pc:docChg>
+  </pc:docChgLst>
+</pc:chgInfo>
+</file>
+
 <file path=ppt/ink/ink1.xml><?xml version="1.0" encoding="utf-8"?>
 <inkml:ink xmlns:inkml="http://www.w3.org/2003/InkML">
   <inkml:definitions>
@@ -149,15 +638,379 @@
           <inkml:channelProperty channel="F" name="resolution" value="0" units="1/dev"/>
         </inkml:channelProperties>
       </inkml:inkSource>
-      <inkml:timestamp xml:id="ts0" timeString="2022-06-02T09:58:39.683"/>
+      <inkml:timestamp xml:id="ts0" timeString="2023-10-16T09:41:07.920"/>
     </inkml:context>
     <inkml:brush xml:id="br0">
-      <inkml:brushProperty name="width" value="0.05" units="cm"/>
-      <inkml:brushProperty name="height" value="0.05" units="cm"/>
+      <inkml:brushProperty name="width" value="0.035" units="cm"/>
+      <inkml:brushProperty name="height" value="0.035" units="cm"/>
       <inkml:brushProperty name="color" value="#E71224"/>
     </inkml:brush>
   </inkml:definitions>
-  <inkml:trace contextRef="#ctx0" brushRef="#br0">2976 784 24575,'-16'-1'0,"0"0"0,0-1 0,0 0 0,0-2 0,1 0 0,-1 0 0,1-2 0,0 1 0,0-2 0,-17-10 0,-2 2 0,0 1 0,0 2 0,-2 2 0,1 1 0,-51-6 0,-187-5 0,87 10 0,-107-22 0,-248-13 0,-192 31 0,715 14 0,1 1 0,-1 1 0,1 0 0,0 1 0,-1 1 0,1 1 0,1 0 0,-33 16 0,24-8 0,1 1 0,0 1 0,1 1 0,-38 35 0,53-42 0,0 0 0,0 0 0,2 1 0,-1 0 0,1 0 0,0 0 0,1 1 0,0 0 0,1 0 0,0 1 0,-2 12 0,-3 21 0,-5 70 0,11-83 0,0-14 0,2 0 0,0-1 0,1 1 0,1 0 0,6 34 0,-5-45 0,0-1 0,0 1 0,1-1 0,0 0 0,0 1 0,0-2 0,1 1 0,0 0 0,0-1 0,0 1 0,1-1 0,0-1 0,0 1 0,0 0 0,1-1 0,-1 0 0,1-1 0,11 6 0,44 17 0,0-4 0,2-2 0,66 12 0,-29-7 0,464 94 0,247-8 0,-172-62 0,-1-35 0,-544-12 0,-15 1 0,1-4 0,149-19 0,-216 16 0,0 0 0,-1-1 0,0 0 0,0-1 0,0-1 0,-1 0 0,0 0 0,0-1 0,-1 0 0,0-1 0,16-17 0,-5 7 0,-16 12 0,1 1 0,-1-1 0,0 0 0,-1 0 0,0-1 0,0 1 0,0-1 0,-1 0 0,0 0 0,0 0 0,-1 0 0,0 0 0,-1-1 0,0 1 0,0 0 0,-1-1 0,0 1 0,0-1 0,-1 1 0,-2-14 0,-1 3 0,0 1 0,-1-1 0,-1 1 0,-1 0 0,0 0 0,-2 0 0,0 1 0,-11-16 0,-3 4 0,-1 0 0,-1 2 0,-1 1 0,-1 1 0,-1 2 0,-2 0 0,0 2 0,-39-20 0,-33-12 0,-140-51 0,15 21 0,-260-57 0,-248-19 0,357 82 0,-933-231-1365,1224 284-5461</inkml:trace>
+  <inkml:trace contextRef="#ctx0" brushRef="#br0">1111 61 24575,'-5'2'0,"0"-1"0,0 1 0,0 0 0,0 0 0,1 0 0,-1 1 0,1 0 0,-1 0 0,1 0 0,-5 5 0,-11 7 0,-132 63 0,103-55 0,0 2 0,-46 33 0,13 0 0,-323 212 0,202-143 0,340-198 0,-52 30 0,96-64 0,-1-10 0,28-20 0,-144 85 0,-48 36 0,0 0 0,1 1 0,0 1 0,1 1 0,0 1 0,1 0 0,0 1 0,29-9 0,-45 18 0,-1-1 0,0 1 0,0-1 0,1 0 0,-1 0 0,0 0 0,0 0 0,0 0 0,0 0 0,0 0 0,0-1 0,0 1 0,0-1 0,-1 1 0,1-1 0,0 0 0,-1 0 0,2-2 0,-3 3 0,1 1 0,-1-1 0,0 1 0,0-1 0,0 0 0,0 1 0,0-1 0,0 1 0,0-1 0,0 0 0,0 1 0,-1-1 0,1 1 0,0-1 0,0 1 0,0-1 0,-1 1 0,1-1 0,0 1 0,-1-1 0,1 1 0,0-1 0,-1 1 0,1-1 0,0 1 0,-2-1 0,-25-11 0,-60 4 0,69 8 0,-1-2 0,1 0 0,-34-7 0,14 2 0,-76-4 0,107 11 0,10 0 0,37 3 0,-2 2 0,1 1 0,61 18 0,32 7 0,-115-28 0,0 2 0,-1 0 0,20 10 0,7 2 0,-41-16 0,1 0 0,-1 0 0,0 0 0,0 0 0,-1 0 0,1 1 0,0-1 0,0 1 0,-1-1 0,1 1 0,-1 0 0,1-1 0,-1 1 0,0 0 0,1 0 0,-1 0 0,0 0 0,0 3 0,2 1 0,-1 1 0,-1-1 0,0 1 0,1 0 0,-2-1 0,1 9 0,-1 3 0,-2 0 0,1 0 0,-9 33 0,7-44 0,0-10 0,0-20 0,1-34 0,11-28 0,-5 58 0,-1 0 0,-1 0 0,-3-38 0,1 64 0,0 0 0,0 0 0,0 0 0,0-1 0,-1 1 0,1 0 0,0 0 0,-1 0 0,1 0 0,0 1 0,-1-1 0,1 0 0,-1 0 0,0 0 0,1 0 0,-1 0 0,0 1 0,0-1 0,1 0 0,-1 0 0,0 1 0,0-1 0,0 1 0,0-1 0,0 1 0,0-1 0,-1 0 0,-1 1 0,0-1 0,0 1 0,1 0 0,-1 0 0,0 0 0,0 0 0,0 1 0,0-1 0,0 1 0,-3 1 0,-9 3 0,0 1 0,-27 16 0,37-20 0,2 0-76,1 0 24,0-1 1,0 0-1,0 1 1,0-1-1,0 0 1,0 0-1,0 0 1,0 0-1,-1-1 0,1 1 1,0 0-1,-1-1 1,1 0-1,0 1 1,-1-1-1,1 0 0,0 0 1,-1-1-1,1 1 1,0 0-1,-1-1 1,1 1-1,0-1 1,-5-2-1,1-3-6774</inkml:trace>
+</inkml:ink>
+</file>
+
+<file path=ppt/ink/ink10.xml><?xml version="1.0" encoding="utf-8"?>
+<inkml:ink xmlns:inkml="http://www.w3.org/2003/InkML">
+  <inkml:definitions>
+    <inkml:context xml:id="ctx0">
+      <inkml:inkSource xml:id="inkSrc0">
+        <inkml:traceFormat>
+          <inkml:channel name="X" type="integer" min="-2.14748E9" max="2.14748E9" units="cm"/>
+          <inkml:channel name="Y" type="integer" min="-2.14748E9" max="2.14748E9" units="cm"/>
+          <inkml:channel name="F" type="integer" max="32767" units="dev"/>
+        </inkml:traceFormat>
+        <inkml:channelProperties>
+          <inkml:channelProperty channel="X" name="resolution" value="1000" units="1/cm"/>
+          <inkml:channelProperty channel="Y" name="resolution" value="1000" units="1/cm"/>
+          <inkml:channelProperty channel="F" name="resolution" value="0" units="1/dev"/>
+        </inkml:channelProperties>
+      </inkml:inkSource>
+      <inkml:timestamp xml:id="ts0" timeString="2023-10-16T09:41:27.736"/>
+    </inkml:context>
+    <inkml:brush xml:id="br0">
+      <inkml:brushProperty name="width" value="0.035" units="cm"/>
+      <inkml:brushProperty name="height" value="0.035" units="cm"/>
+      <inkml:brushProperty name="color" value="#E71224"/>
+    </inkml:brush>
+  </inkml:definitions>
+  <inkml:trace contextRef="#ctx0" brushRef="#br0">36 375 24575,'0'-4'0,"1"0"0,0 0 0,0 0 0,0 0 0,0 0 0,1 0 0,-1 0 0,1 1 0,0-1 0,0 1 0,4-5 0,34-39 0,-24 29 0,0-4 0,0 0 0,-1-1 0,15-33 0,-23 45 0,1 1 0,-1 0 0,2 0 0,0 0 0,0 1 0,0 1 0,1 0 0,0 0 0,1 0 0,0 2 0,0-1 0,0 1 0,1 1 0,0 0 0,0 1 0,0 0 0,18-3 0,-49 7 0,0 0 0,0 1 0,0 0 0,1 2 0,-1 0 0,1 2 0,0 0 0,-24 10 0,32-10 0,0 0 0,0 1 0,1 0 0,0 1 0,0 0 0,1 1 0,-1-1 0,2 2 0,-1-1 0,1 1 0,1 0 0,-1 0 0,2 1 0,-1 0 0,-5 14 0,-9 12-81,14-26-80,-1 1 1,1 1-1,1-1 1,0 1-1,0 0 1,2 0-1,-6 24 1,8-22-6666</inkml:trace>
+</inkml:ink>
+</file>
+
+<file path=ppt/ink/ink11.xml><?xml version="1.0" encoding="utf-8"?>
+<inkml:ink xmlns:inkml="http://www.w3.org/2003/InkML">
+  <inkml:definitions>
+    <inkml:context xml:id="ctx0">
+      <inkml:inkSource xml:id="inkSrc0">
+        <inkml:traceFormat>
+          <inkml:channel name="X" type="integer" min="-2.14748E9" max="2.14748E9" units="cm"/>
+          <inkml:channel name="Y" type="integer" min="-2.14748E9" max="2.14748E9" units="cm"/>
+          <inkml:channel name="F" type="integer" max="32767" units="dev"/>
+        </inkml:traceFormat>
+        <inkml:channelProperties>
+          <inkml:channelProperty channel="X" name="resolution" value="1000" units="1/cm"/>
+          <inkml:channelProperty channel="Y" name="resolution" value="1000" units="1/cm"/>
+          <inkml:channelProperty channel="F" name="resolution" value="0" units="1/dev"/>
+        </inkml:channelProperties>
+      </inkml:inkSource>
+      <inkml:timestamp xml:id="ts0" timeString="2023-10-16T09:45:54.507"/>
+    </inkml:context>
+    <inkml:brush xml:id="br0">
+      <inkml:brushProperty name="width" value="0.035" units="cm"/>
+      <inkml:brushProperty name="height" value="0.035" units="cm"/>
+      <inkml:brushProperty name="color" value="#E71224"/>
+    </inkml:brush>
+  </inkml:definitions>
+  <inkml:trace contextRef="#ctx0" brushRef="#br0">1 206 24575,'53'-16'0,"0"2"0,73-9 0,113-1 0,-215 22 0,784-37-746,8 32-507,-267 4 867,-435 1 386,1172-36-26,-1109 21 221,133-3 2021,3 19-2216,638 9 0,5 50 0,1269 124 0,-715-69 0,-430-44 0,2-42 0,976-73 0,-1919 40 0,253-13 0,418-9 0,-690 29 0,267-6 0,-308 0 0,0-4 0,146-36 0,434-124 0,-513 119 0,-46 13 0,-86 34 0,0 1 0,-1 0 0,1 1 0,0 1 0,0 0 0,17 2 0,10 0 0,177-1-1365,-203-1-5461</inkml:trace>
+</inkml:ink>
+</file>
+
+<file path=ppt/ink/ink12.xml><?xml version="1.0" encoding="utf-8"?>
+<inkml:ink xmlns:inkml="http://www.w3.org/2003/InkML">
+  <inkml:definitions>
+    <inkml:context xml:id="ctx0">
+      <inkml:inkSource xml:id="inkSrc0">
+        <inkml:traceFormat>
+          <inkml:channel name="X" type="integer" min="-2.14748E9" max="2.14748E9" units="cm"/>
+          <inkml:channel name="Y" type="integer" min="-2.14748E9" max="2.14748E9" units="cm"/>
+          <inkml:channel name="F" type="integer" max="32767" units="dev"/>
+        </inkml:traceFormat>
+        <inkml:channelProperties>
+          <inkml:channelProperty channel="X" name="resolution" value="1000" units="1/cm"/>
+          <inkml:channelProperty channel="Y" name="resolution" value="1000" units="1/cm"/>
+          <inkml:channelProperty channel="F" name="resolution" value="0" units="1/dev"/>
+        </inkml:channelProperties>
+      </inkml:inkSource>
+      <inkml:timestamp xml:id="ts0" timeString="2023-10-16T09:45:58.093"/>
+    </inkml:context>
+    <inkml:brush xml:id="br0">
+      <inkml:brushProperty name="width" value="0.035" units="cm"/>
+      <inkml:brushProperty name="height" value="0.035" units="cm"/>
+      <inkml:brushProperty name="color" value="#E71224"/>
+    </inkml:brush>
+  </inkml:definitions>
+  <inkml:trace contextRef="#ctx0" brushRef="#br0">1 303 24575,'64'-15'0,"75"-1"0,39-2 0,165-11 0,-307 26 0,234-5 0,-17 2 0,-126-2 0,145 10 0,-178 6 0,41 1 0,-124-9 0,0 0 0,0 0 0,0-1 0,-1-1 0,1 1 0,-1-2 0,1 0 0,-1 0 0,0-1 0,0 0 0,10-6 0,-14 7 0,0 0 0,0 0 0,0-1 0,-1 0 0,0 0 0,0-1 0,9-9 0,-13 13 0,0-1 0,-1 1 0,1-1 0,0 1 0,-1 0 0,1-1 0,-1 1 0,1-1 0,-1 0 0,0 1 0,0-1 0,1 1 0,-1-1 0,0 1 0,-1-1 0,1 0 0,0 1 0,0-1 0,-1 1 0,1-1 0,-1 1 0,1-1 0,-1 1 0,1-1 0,-1 1 0,0 0 0,0-1 0,0 1 0,0 0 0,0 0 0,0 0 0,0-1 0,0 1 0,0 0 0,-1 0 0,1 1 0,0-1 0,-3-1 0,-5-4 0,1 1 0,-1 0 0,0 1 0,-1 0 0,1 1 0,-1 0 0,1 0 0,-1 1 0,-12-2 0,-16 0 0,-41 1 0,36 2 0,-146-14 0,-43-3 0,-156 29 0,272-6 0,87-5 0,-1-2 0,1-1 0,-33-7 0,39 5 0,1 1 0,0 1 0,-1 1 0,1 1 0,-1 1 0,-34 4 0,-37 7 0,70-10 0,0 2 0,-1 0 0,-41 12 0,53-11-227,-1-1-1,1-1 1,0 0-1,-1 0 1,-19-2-1,18 0-6598</inkml:trace>
+</inkml:ink>
+</file>
+
+<file path=ppt/ink/ink13.xml><?xml version="1.0" encoding="utf-8"?>
+<inkml:ink xmlns:inkml="http://www.w3.org/2003/InkML">
+  <inkml:definitions>
+    <inkml:context xml:id="ctx0">
+      <inkml:inkSource xml:id="inkSrc0">
+        <inkml:traceFormat>
+          <inkml:channel name="X" type="integer" min="-2.14748E9" max="2.14748E9" units="cm"/>
+          <inkml:channel name="Y" type="integer" min="-2.14748E9" max="2.14748E9" units="cm"/>
+          <inkml:channel name="F" type="integer" max="32767" units="dev"/>
+        </inkml:traceFormat>
+        <inkml:channelProperties>
+          <inkml:channelProperty channel="X" name="resolution" value="1000" units="1/cm"/>
+          <inkml:channelProperty channel="Y" name="resolution" value="1000" units="1/cm"/>
+          <inkml:channelProperty channel="F" name="resolution" value="0" units="1/dev"/>
+        </inkml:channelProperties>
+      </inkml:inkSource>
+      <inkml:timestamp xml:id="ts0" timeString="2023-10-16T09:45:59.045"/>
+    </inkml:context>
+    <inkml:brush xml:id="br0">
+      <inkml:brushProperty name="width" value="0.035" units="cm"/>
+      <inkml:brushProperty name="height" value="0.035" units="cm"/>
+      <inkml:brushProperty name="color" value="#E71224"/>
+    </inkml:brush>
+  </inkml:definitions>
+  <inkml:trace contextRef="#ctx0" brushRef="#br0">1 137 24575,'161'1'0,"327"-6"0,-330-4 0,170-31 0,101-37 0,-397 73 0,-1 3 0,1 0 0,-1 2 0,42 6 0,-30-2 0,56-1 0,64-21-1365,-149 17-5461</inkml:trace>
+</inkml:ink>
+</file>
+
+<file path=ppt/ink/ink14.xml><?xml version="1.0" encoding="utf-8"?>
+<inkml:ink xmlns:inkml="http://www.w3.org/2003/InkML">
+  <inkml:definitions>
+    <inkml:context xml:id="ctx0">
+      <inkml:inkSource xml:id="inkSrc0">
+        <inkml:traceFormat>
+          <inkml:channel name="X" type="integer" min="-2.14748E9" max="2.14748E9" units="cm"/>
+          <inkml:channel name="Y" type="integer" min="-2.14748E9" max="2.14748E9" units="cm"/>
+          <inkml:channel name="F" type="integer" max="32767" units="dev"/>
+        </inkml:traceFormat>
+        <inkml:channelProperties>
+          <inkml:channelProperty channel="X" name="resolution" value="1000" units="1/cm"/>
+          <inkml:channelProperty channel="Y" name="resolution" value="1000" units="1/cm"/>
+          <inkml:channelProperty channel="F" name="resolution" value="0" units="1/dev"/>
+        </inkml:channelProperties>
+      </inkml:inkSource>
+      <inkml:timestamp xml:id="ts0" timeString="2023-10-16T09:46:12.320"/>
+    </inkml:context>
+    <inkml:brush xml:id="br0">
+      <inkml:brushProperty name="width" value="0.035" units="cm"/>
+      <inkml:brushProperty name="height" value="0.035" units="cm"/>
+      <inkml:brushProperty name="color" value="#E71224"/>
+    </inkml:brush>
+  </inkml:definitions>
+  <inkml:trace contextRef="#ctx0" brushRef="#br0">95 227 24575,'-32'-26'0,"-7"-7"0,36 28 0,0 1 0,0-1 0,1 1 0,0-1 0,0 0 0,0 0 0,0 1 0,1-1 0,0-1 0,0 1 0,0 0 0,1 0 0,0 0 0,0 0 0,0 0 0,0-1 0,1 1 0,0 0 0,2-8 0,-2 10 0,0 0 0,0 1 0,0-1 0,0 1 0,1-1 0,-1 1 0,0-1 0,1 1 0,0 0 0,0 0 0,0 0 0,0 0 0,0 0 0,0 0 0,0 0 0,0 0 0,1 1 0,-1 0 0,1-1 0,-1 1 0,1 0 0,0 0 0,-1 0 0,1 0 0,0 1 0,0-1 0,-1 1 0,1 0 0,0 0 0,0 0 0,0 0 0,-1 0 0,1 0 0,0 1 0,0-1 0,-1 1 0,4 1 0,-4-1 0,0 0 0,0-1 0,0 1 0,0 0 0,-1 1 0,1-1 0,0 0 0,-1 0 0,1 1 0,-1-1 0,1 1 0,-1-1 0,0 1 0,1 0 0,-1-1 0,0 1 0,0 0 0,0 0 0,-1 0 0,1 0 0,0 0 0,0 2 0,7 15 0,-8-19 0,0 0 0,1 1 0,-1-1 0,0 0 0,1 1 0,-1-1 0,1 0 0,-1 0 0,0 0 0,1 1 0,-1-1 0,0 0 0,1 0 0,-1 0 0,1 0 0,-1 0 0,1 0 0,-1 0 0,0 0 0,1 0 0,-1 0 0,1 0 0,-1 0 0,1 0 0,-1 0 0,0 0 0,1 0 0,-1 0 0,1 0 0,-1-1 0,0 1 0,1 0 0,-1 0 0,1 0 0,-1-1 0,0 1 0,1 0 0,-1-1 0,0 1 0,0 0 0,1-1 0,-1 1 0,0 0 0,0-1 0,1 1 0,-1-1 0,0 1 0,0 0 0,0-1 0,18-27 0,-13 20 0,-3 6 0,0-1 0,0 1 0,0 0 0,0-1 0,0 1 0,0 0 0,1 1 0,-1-1 0,1 0 0,0 1 0,-1-1 0,1 1 0,0 0 0,0 0 0,0 0 0,0 0 0,0 1 0,0-1 0,0 1 0,5-1 0,-6 2 0,0-1 0,0 0 0,0 1 0,0-1 0,0 1 0,0 0 0,0-1 0,-1 1 0,1 0 0,0 0 0,0 0 0,-1 1 0,1-1 0,-1 0 0,1 1 0,-1-1 0,1 1 0,-1-1 0,0 1 0,0 0 0,0-1 0,0 1 0,0 0 0,0 0 0,0 0 0,-1-1 0,1 1 0,-1 0 0,1 0 0,-1 0 0,0 0 0,0 2 0,1 5-52,-1-1-1,0 0 1,0 1-1,-1-1 1,0 0-1,-1 0 1,0 1-1,0-1 1,0-1-1,-1 1 1,-1 0-1,1-1 1,-1 1-1,0-1 1,-1 0-1,0 0 1,0-1-1,0 1 1,-1-1-1,0 0 1,0-1-1,-1 0 1,1 0-1,-1 0 0,-13 7 1,10-8-6774</inkml:trace>
+</inkml:ink>
+</file>
+
+<file path=ppt/ink/ink2.xml><?xml version="1.0" encoding="utf-8"?>
+<inkml:ink xmlns:inkml="http://www.w3.org/2003/InkML">
+  <inkml:definitions>
+    <inkml:context xml:id="ctx0">
+      <inkml:inkSource xml:id="inkSrc0">
+        <inkml:traceFormat>
+          <inkml:channel name="X" type="integer" min="-2.14748E9" max="2.14748E9" units="cm"/>
+          <inkml:channel name="Y" type="integer" min="-2.14748E9" max="2.14748E9" units="cm"/>
+          <inkml:channel name="F" type="integer" max="32767" units="dev"/>
+        </inkml:traceFormat>
+        <inkml:channelProperties>
+          <inkml:channelProperty channel="X" name="resolution" value="1000" units="1/cm"/>
+          <inkml:channelProperty channel="Y" name="resolution" value="1000" units="1/cm"/>
+          <inkml:channelProperty channel="F" name="resolution" value="0" units="1/dev"/>
+        </inkml:channelProperties>
+      </inkml:inkSource>
+      <inkml:timestamp xml:id="ts0" timeString="2023-10-16T09:40:54.474"/>
+    </inkml:context>
+    <inkml:brush xml:id="br0">
+      <inkml:brushProperty name="width" value="0.035" units="cm"/>
+      <inkml:brushProperty name="height" value="0.035" units="cm"/>
+      <inkml:brushProperty name="color" value="#E71224"/>
+    </inkml:brush>
+  </inkml:definitions>
+  <inkml:trace contextRef="#ctx0" brushRef="#br0">9 1 24575,'2'15'0,"1"0"0,1 0 0,0 0 0,0 0 0,2-1 0,0 0 0,1 0 0,0 0 0,10 14 0,22 46 0,60 149 0,15 35 0,-101-226 0,-3-2 0,2-1 0,0-1 0,3 0 0,0 0 0,37 49 0,-51-76 0,-1-1 0,1 1 0,-1 0 0,1-1 0,-1 1 0,1 0 0,0-1 0,-1 1 0,1-1 0,0 1 0,0-1 0,-1 1 0,1-1 0,0 0 0,0 1 0,0-1 0,-1 0 0,1 0 0,0 0 0,0 1 0,0-1 0,0 0 0,0 0 0,-1 0 0,1 0 0,0-1 0,0 1 0,0 0 0,1-1 0,0 0 0,0 0 0,0 0 0,-1-1 0,1 1 0,-1-1 0,1 1 0,-1-1 0,0 0 0,0 1 0,1-1 0,-1 0 0,1-2 0,21-64 0,-22 62 0,25-97 0,39-127 0,-39 162 0,-39 142 0,-23 5 0,25-59 0,1 1 0,1 0 0,2 0 0,-9 35 0,14-43 0,-1 0 0,0-1 0,-1 1 0,-1-1 0,0 0 0,0 0 0,-1 0 0,0-1 0,-12 16 0,14-22 0,-1 0 0,0 0 0,0 0 0,-1-1 0,1 1 0,-1-1 0,0 0 0,0-1 0,0 0 0,0 0 0,-1 0 0,0 0 0,1-1 0,-1 0 0,0-1 0,0 0 0,0 0 0,-13 0 0,-8 0 0,-162-4 0,183 1-19,-1 0-1,1 0 0,-1-1 1,1 0-1,0-1 0,1 1 1,-1-1-1,0-1 1,1 1-1,0-1 0,0 0 1,1-1-1,-8-8 0,-6-4-1070,9 9-5736</inkml:trace>
+</inkml:ink>
+</file>
+
+<file path=ppt/ink/ink3.xml><?xml version="1.0" encoding="utf-8"?>
+<inkml:ink xmlns:inkml="http://www.w3.org/2003/InkML">
+  <inkml:definitions>
+    <inkml:context xml:id="ctx0">
+      <inkml:inkSource xml:id="inkSrc0">
+        <inkml:traceFormat>
+          <inkml:channel name="X" type="integer" min="-2.14748E9" max="2.14748E9" units="cm"/>
+          <inkml:channel name="Y" type="integer" min="-2.14748E9" max="2.14748E9" units="cm"/>
+          <inkml:channel name="F" type="integer" max="32767" units="dev"/>
+        </inkml:traceFormat>
+        <inkml:channelProperties>
+          <inkml:channelProperty channel="X" name="resolution" value="1000" units="1/cm"/>
+          <inkml:channelProperty channel="Y" name="resolution" value="1000" units="1/cm"/>
+          <inkml:channelProperty channel="F" name="resolution" value="0" units="1/dev"/>
+        </inkml:channelProperties>
+      </inkml:inkSource>
+      <inkml:timestamp xml:id="ts0" timeString="2023-10-16T09:40:56.375"/>
+    </inkml:context>
+    <inkml:brush xml:id="br0">
+      <inkml:brushProperty name="width" value="0.035" units="cm"/>
+      <inkml:brushProperty name="height" value="0.035" units="cm"/>
+      <inkml:brushProperty name="color" value="#E71224"/>
+    </inkml:brush>
+  </inkml:definitions>
+  <inkml:trace contextRef="#ctx0" brushRef="#br0">270 0 24575,'-21'458'0,"11"-339"0,10-88 0,-2 1 0,-1 0 0,-2-1 0,-1 0 0,-20 60 0,16-63 0,1 1 0,1 0 0,1 1 0,2-1 0,1 1 0,1 1 0,2-1 0,2 33 0,-5-25 0,4-37 0,0-1 0,0 0 0,0 1 0,-1-1 0,1 0 0,0 1 0,0-1 0,0 0 0,0 1 0,-1-1 0,1 0 0,0 1 0,0-1 0,-1 0 0,1 0 0,0 1 0,-1-1 0,1 0 0,0 0 0,0 1 0,-1-1 0,1 0 0,-1 0 0,1 0 0,0 0 0,-1 0 0,1 0 0,0 1 0,-1-1 0,0 0 0,-14-15 0,-11-24 0,2-2 0,2 0 0,-21-57 0,36 77 0,11 31 0,16 37 0,-20-47 0,29 74 0,-4-8 0,3-1 0,46 76 0,-73-138 0,1 0 0,0 0 0,0 0 0,0-1 0,0 1 0,1-1 0,-1 1 0,1-1 0,-1 0 0,1 0 0,0 0 0,0-1 0,0 1 0,0 0 0,0-1 0,0 0 0,0 0 0,1 0 0,-1 0 0,5 0 0,-3-1 0,1 0 0,-1-1 0,0 0 0,1 1 0,-1-2 0,0 1 0,0-1 0,0 0 0,0 0 0,0 0 0,8-5 0,5-6 0,0 0 0,-1-1 0,0-1 0,-1 0 0,15-20 0,15-17-67,-16 20-366,-1-2 1,33-51-1,-54 71-6393</inkml:trace>
+</inkml:ink>
+</file>
+
+<file path=ppt/ink/ink4.xml><?xml version="1.0" encoding="utf-8"?>
+<inkml:ink xmlns:inkml="http://www.w3.org/2003/InkML">
+  <inkml:definitions>
+    <inkml:context xml:id="ctx0">
+      <inkml:inkSource xml:id="inkSrc0">
+        <inkml:traceFormat>
+          <inkml:channel name="X" type="integer" min="-2.14748E9" max="2.14748E9" units="cm"/>
+          <inkml:channel name="Y" type="integer" min="-2.14748E9" max="2.14748E9" units="cm"/>
+          <inkml:channel name="F" type="integer" max="32767" units="dev"/>
+        </inkml:traceFormat>
+        <inkml:channelProperties>
+          <inkml:channelProperty channel="X" name="resolution" value="1000" units="1/cm"/>
+          <inkml:channelProperty channel="Y" name="resolution" value="1000" units="1/cm"/>
+          <inkml:channelProperty channel="F" name="resolution" value="0" units="1/dev"/>
+        </inkml:channelProperties>
+      </inkml:inkSource>
+      <inkml:timestamp xml:id="ts0" timeString="2023-10-16T09:40:59.661"/>
+    </inkml:context>
+    <inkml:brush xml:id="br0">
+      <inkml:brushProperty name="width" value="0.035" units="cm"/>
+      <inkml:brushProperty name="height" value="0.035" units="cm"/>
+      <inkml:brushProperty name="color" value="#E71224"/>
+    </inkml:brush>
+  </inkml:definitions>
+  <inkml:trace contextRef="#ctx0" brushRef="#br0">1289 1 24575,'-8'0'0,"-1"1"0,1 1 0,-1 0 0,1 0 0,-1 0 0,1 1 0,0 0 0,0 1 0,0 0 0,-10 7 0,-12 9 0,-33 30 0,22-17 0,-178 153 0,20-16 0,165-143 0,-29 22 0,-80 80 0,-150 166 0,258-248 0,30-38 0,-1-1 0,0 1 0,0-1 0,-1-1 0,-13 13 0,20-20 0,0 0 0,0 0 0,-1 0 0,1 1 0,0-1 0,0 0 0,-1 0 0,1 0 0,0 0 0,0 0 0,-1 0 0,1 1 0,0-1 0,-1 0 0,1 0 0,0 0 0,0 0 0,-1 0 0,1 0 0,0 0 0,-1 0 0,1 0 0,0 0 0,-1-1 0,1 1 0,0 0 0,0 0 0,-1 0 0,1 0 0,0 0 0,0 0 0,-1-1 0,1 1 0,0 0 0,0 0 0,0 0 0,-1-1 0,1 1 0,0 0 0,0 0 0,0 0 0,-1-1 0,1 1 0,-5-20 0,3-24 0,2 42 0,3-35 0,1 0 0,2 0 0,1 0 0,24-67 0,-13 46 0,-11 28 0,6-47 0,-11 54 0,1 1 0,2 0 0,0-1 0,9-22 0,-10 108 0,-4-48 0,-14 419 0,13-426 0,-2 17 0,1 0 0,1 1 0,5 49 0,-4-74 0,0 1 0,1 0 0,-1 0 0,1-1 0,0 1 0,-1-1 0,1 1 0,0 0 0,0-1 0,0 1 0,0-1 0,0 0 0,0 1 0,0-1 0,1 0 0,-1 0 0,0 0 0,1 0 0,-1 0 0,1 0 0,2 1 0,0 0 0,0-1 0,0 0 0,0 0 0,0 0 0,0-1 0,0 1 0,1-1 0,6-1 0,5 0 0,0-2 0,-1 0 0,26-8 0,26-13 0,50-14 0,-85 31 0,50-15 0,-82 22 0,0 0 0,0 0 0,0 0 0,0 0 0,1 0 0,-1 0 0,0 0 0,0 0 0,0 0 0,0 0 0,1 0 0,-1 0 0,0 0 0,0 0 0,0 0 0,0-1 0,0 1 0,0 0 0,1 0 0,-1 0 0,0 0 0,0 0 0,0 0 0,0 0 0,0 0 0,0-1 0,0 1 0,0 0 0,0 0 0,1 0 0,-1 0 0,0 0 0,0-1 0,0 1 0,0 0 0,0 0 0,0 0 0,0 0 0,0 0 0,0-1 0,0 1 0,0 0 0,0 0 0,0 0 0,0 0 0,0 0 0,0-1 0,0 1 0,-1 0 0,1 0 0,0 0 0,0 0 0,0 0 0,0 0 0,0-1 0,-12-5 0,-18-2 0,-50-4-146,-1 2-1,-1 5 1,-89 5 0,115 0-634,42 0-6046</inkml:trace>
+</inkml:ink>
+</file>
+
+<file path=ppt/ink/ink5.xml><?xml version="1.0" encoding="utf-8"?>
+<inkml:ink xmlns:inkml="http://www.w3.org/2003/InkML">
+  <inkml:definitions>
+    <inkml:context xml:id="ctx0">
+      <inkml:inkSource xml:id="inkSrc0">
+        <inkml:traceFormat>
+          <inkml:channel name="X" type="integer" min="-2.14748E9" max="2.14748E9" units="cm"/>
+          <inkml:channel name="Y" type="integer" min="-2.14748E9" max="2.14748E9" units="cm"/>
+          <inkml:channel name="F" type="integer" max="32767" units="dev"/>
+        </inkml:traceFormat>
+        <inkml:channelProperties>
+          <inkml:channelProperty channel="X" name="resolution" value="1000" units="1/cm"/>
+          <inkml:channelProperty channel="Y" name="resolution" value="1000" units="1/cm"/>
+          <inkml:channelProperty channel="F" name="resolution" value="0" units="1/dev"/>
+        </inkml:channelProperties>
+      </inkml:inkSource>
+      <inkml:timestamp xml:id="ts0" timeString="2023-10-16T09:41:02.049"/>
+    </inkml:context>
+    <inkml:brush xml:id="br0">
+      <inkml:brushProperty name="width" value="0.035" units="cm"/>
+      <inkml:brushProperty name="height" value="0.035" units="cm"/>
+      <inkml:brushProperty name="color" value="#E71224"/>
+    </inkml:brush>
+  </inkml:definitions>
+  <inkml:trace contextRef="#ctx0" brushRef="#br0">274 57 24575,'1'6'0,"0"0"0,0 0 0,0 0 0,1-1 0,-1 1 0,1 0 0,1-1 0,-1 1 0,1-1 0,4 7 0,40 51 0,-34-47 0,33 35 0,1-2 0,105 83 0,-96-88 0,-3 3 0,72 81 0,-47-19 0,-100-140 0,-1 1 0,-50-48 0,-74-56 0,104 96 0,-142-155 0,46 42 0,114 123 0,21 22 0,0 1 0,0 0 0,-1 0 0,0 0 0,0 0 0,0 1 0,0 0 0,-1 0 0,-8-5 0,12 9 0,1 0 0,-1-1 0,1 1 0,-1 0 0,1 0 0,-1 0 0,1 0 0,-1 1 0,1-1 0,-1 0 0,1 0 0,0 1 0,-1-1 0,1 1 0,0 0 0,-1-1 0,1 1 0,0 0 0,-1 0 0,1 0 0,0 0 0,-1 1 0,-27 28 0,23-22 0,-18 19 0,1 1 0,-24 40 0,42-60 0,0 1 0,0 0 0,1 0 0,0 0 0,1 0 0,0 1 0,0-1 0,1 1 0,0 0 0,1-1 0,0 1 0,0 0 0,2 15 0,-1-25 0,0 0 0,0-1 0,0 1 0,1 0 0,-1 0 0,0 0 0,0 0 0,0 0 0,0 0 0,0 0 0,1 0 0,-1 0 0,0-1 0,0 1 0,0 0 0,0 0 0,1 0 0,-1 0 0,0 0 0,0 0 0,0 0 0,0 0 0,1 0 0,-1 0 0,0 0 0,0 0 0,0 0 0,0 0 0,1 1 0,-1-1 0,0 0 0,0 0 0,0 0 0,0 0 0,0 0 0,1 0 0,-1 0 0,0 0 0,0 0 0,0 1 0,0-1 0,0 0 0,0 0 0,1 0 0,-1 0 0,0 0 0,0 1 0,0-1 0,0 0 0,0 0 0,0 0 0,0 0 0,0 1 0,0-1 0,0 0 0,0 0 0,0 0 0,0 0 0,0 1 0,0-1 0,0 0 0,0 0 0,0 0 0,0 0 0,0 1 0,0-1 0,0 0 0,0 0 0,-1 0 0,11-18 0,6-27 0,-5 10 0,-2 2 0,1 0 0,2 0 0,1 1 0,25-43 0,-35 71 0,0 0 0,1 1 0,-1 0 0,0-1 0,1 1 0,0 1 0,-1-1 0,1 0 0,1 1 0,-1 0 0,0 0 0,0 0 0,1 1 0,-1-1 0,1 1 0,-1 0 0,1 0 0,5 0 0,14 0 0,-1 0 0,36 4 0,-12-1 0,-25 0 19,1 1-1,-1 0 0,0 2 1,0 1-1,28 11 0,44 10-1493,-80-24-5351</inkml:trace>
+</inkml:ink>
+</file>
+
+<file path=ppt/ink/ink6.xml><?xml version="1.0" encoding="utf-8"?>
+<inkml:ink xmlns:inkml="http://www.w3.org/2003/InkML">
+  <inkml:definitions>
+    <inkml:context xml:id="ctx0">
+      <inkml:inkSource xml:id="inkSrc0">
+        <inkml:traceFormat>
+          <inkml:channel name="X" type="integer" min="-2.14748E9" max="2.14748E9" units="cm"/>
+          <inkml:channel name="Y" type="integer" min="-2.14748E9" max="2.14748E9" units="cm"/>
+          <inkml:channel name="F" type="integer" max="32767" units="dev"/>
+        </inkml:traceFormat>
+        <inkml:channelProperties>
+          <inkml:channelProperty channel="X" name="resolution" value="1000" units="1/cm"/>
+          <inkml:channelProperty channel="Y" name="resolution" value="1000" units="1/cm"/>
+          <inkml:channelProperty channel="F" name="resolution" value="0" units="1/dev"/>
+        </inkml:channelProperties>
+      </inkml:inkSource>
+      <inkml:timestamp xml:id="ts0" timeString="2023-10-16T09:41:04.334"/>
+    </inkml:context>
+    <inkml:brush xml:id="br0">
+      <inkml:brushProperty name="width" value="0.035" units="cm"/>
+      <inkml:brushProperty name="height" value="0.035" units="cm"/>
+      <inkml:brushProperty name="color" value="#E71224"/>
+    </inkml:brush>
+  </inkml:definitions>
+  <inkml:trace contextRef="#ctx0" brushRef="#br0">271 14 24575,'-19'394'0,"2"-129"0,14-235 0,-2 0 0,-1 0 0,-15 45 0,3-13 0,5-22 0,13-40 0,0 1 0,0-1 0,0 0 0,0 0 0,0 1 0,0-1 0,-1 0 0,1 0 0,0 1 0,0-1 0,0 0 0,0 0 0,0 0 0,-1 1 0,1-1 0,0 0 0,0 0 0,0 0 0,-1 1 0,1-1 0,0 0 0,0 0 0,0 0 0,-1 0 0,1 0 0,0 0 0,0 0 0,-1 1 0,1-1 0,0 0 0,-1 0 0,1 0 0,0 0 0,0 0 0,-1 0 0,1 0 0,0 0 0,-1-1 0,-5-20 0,4-31 0,1 0 0,3 0 0,3 0 0,15-75 0,5-56 0,-8-93 0,-11 246 0,1 0 0,11-29 0,-36 98 0,-2 0 0,-1-1 0,-2-2 0,-1 0 0,-43 47 0,58-71 0,-1 0 0,-1-1 0,0 0 0,-14 10 0,25-20 0,-1-1 0,1 0 0,0 0 0,0 0 0,0 1 0,-1-1 0,1 0 0,0 0 0,0 0 0,-1 0 0,1 0 0,0 0 0,0 0 0,-1 1 0,1-1 0,0 0 0,0 0 0,-1 0 0,1 0 0,0 0 0,0 0 0,-1 0 0,1 0 0,0 0 0,0 0 0,-1-1 0,1 1 0,0 0 0,-1 0 0,1 0 0,0 0 0,0 0 0,0 0 0,-1-1 0,1 1 0,0 0 0,0 0 0,0 0 0,-1 0 0,1-1 0,0 1 0,0 0 0,0 0 0,-1-1 0,0-16 0,7-16 0,7 5 0,1 1 0,2 1 0,0 0 0,2 1 0,1 1 0,0 0 0,45-39 0,-46 43 0,-15 16 0,1 0 0,-1 0 0,1 1 0,-1-1 0,1 1 0,0 0 0,5-3 0,-7 5 0,0 1 0,0-1 0,0 0 0,0 1 0,1 0 0,-1-1 0,0 1 0,0 0 0,1 0 0,-1 0 0,0 0 0,0 1 0,1-1 0,-1 1 0,0-1 0,0 1 0,0 0 0,0 0 0,4 2 0,22 13-151,0 1-1,-2 2 0,0 0 0,-1 2 1,-1 1-1,-1 1 0,-1 1 1,36 51-1,-50-64-6674</inkml:trace>
+</inkml:ink>
+</file>
+
+<file path=ppt/ink/ink7.xml><?xml version="1.0" encoding="utf-8"?>
+<inkml:ink xmlns:inkml="http://www.w3.org/2003/InkML">
+  <inkml:definitions>
+    <inkml:context xml:id="ctx0">
+      <inkml:inkSource xml:id="inkSrc0">
+        <inkml:traceFormat>
+          <inkml:channel name="X" type="integer" min="-2.14748E9" max="2.14748E9" units="cm"/>
+          <inkml:channel name="Y" type="integer" min="-2.14748E9" max="2.14748E9" units="cm"/>
+          <inkml:channel name="F" type="integer" max="32767" units="dev"/>
+        </inkml:traceFormat>
+        <inkml:channelProperties>
+          <inkml:channelProperty channel="X" name="resolution" value="1000" units="1/cm"/>
+          <inkml:channelProperty channel="Y" name="resolution" value="1000" units="1/cm"/>
+          <inkml:channelProperty channel="F" name="resolution" value="0" units="1/dev"/>
+        </inkml:channelProperties>
+      </inkml:inkSource>
+      <inkml:timestamp xml:id="ts0" timeString="2023-10-16T09:41:11.088"/>
+    </inkml:context>
+    <inkml:brush xml:id="br0">
+      <inkml:brushProperty name="width" value="0.035" units="cm"/>
+      <inkml:brushProperty name="height" value="0.035" units="cm"/>
+      <inkml:brushProperty name="color" value="#E71224"/>
+    </inkml:brush>
+  </inkml:definitions>
+  <inkml:trace contextRef="#ctx0" brushRef="#br0">1618 458 24575,'-1'1'0,"0"0"0,0 1 0,0-1 0,0-1 0,0 1 0,0 0 0,-1 0 0,1 0 0,0 0 0,0-1 0,-1 1 0,1-1 0,0 1 0,-1-1 0,1 1 0,-1-1 0,1 0 0,0 0 0,-1 0 0,1 1 0,-1-1 0,1-1 0,-1 1 0,-1 0 0,1 0 0,-64 0 0,1-2 0,-1-3 0,1-3 0,-95-24 0,68-2 0,70 24 0,-1 1 0,-42-10 0,-4 5 0,-205-46 0,207 41 0,1-2 0,-66-31 0,-46-47 0,73 38 0,97 56 0,-1 1 0,0 0 0,0 0 0,-12-3 0,21 7 0,0 0 0,-1 0 0,1 0 0,0 0 0,0-1 0,-1 1 0,1 0 0,0 0 0,0 0 0,-1 0 0,1 0 0,0 0 0,-1 0 0,1 0 0,0 0 0,0 0 0,-1 0 0,1 0 0,0 0 0,-1 0 0,1 0 0,0 0 0,0 0 0,-1 0 0,1 1 0,0-1 0,0 0 0,-1 0 0,1 0 0,0 0 0,0 1 0,-1-1 0,1 0 0,0 0 0,0 0 0,0 1 0,-1-1 0,1 0 0,0 0 0,0 1 0,0-1 0,6 13 0,21 15 0,13 4 0,1-2 0,2-1 0,1-3 0,80 36 0,204 59 0,-178-67 0,46 13 0,-152-58 0,1-1 0,63 2 0,13 2 0,-77-8 0,88-4 0,-58-1 0,-72 1 0,-1 0 0,1 0 0,0 0 0,0 0 0,0 0 0,0 0 0,0 0 0,0-1 0,-1 1 0,1-1 0,0 1 0,0-1 0,0 0 0,-1 0 0,1 1 0,-1-1 0,1-1 0,0 1 0,-1 0 0,0 0 0,1 0 0,-1-1 0,0 1 0,2-3 0,-3 2 0,1 0 0,-1 0 0,1 0 0,-1-1 0,0 1 0,0 0 0,0-1 0,-1 1 0,1 0 0,0 0 0,-1 0 0,1-1 0,-1 1 0,0 0 0,0 0 0,0 0 0,0 0 0,0 0 0,0 0 0,-2-2 0,-20-32 0,14 24 0,0 0 0,2-1 0,-1 1 0,2-2 0,0 1 0,0-1 0,1 0 0,-3-18 0,4 17 0,-2-14 0,8 26 0,7 16 0,8 21 0,-1 1 0,-2 0 0,18 69 0,-27-70 0,-1 0 0,-2 1 0,-1-1 0,-7 64 0,6-96 0,-1 0 0,0 1 0,1-1 0,-1 0 0,0 1 0,0-1 0,-1 0 0,1 0 0,0 0 0,-1 0 0,1 0 0,-1 0 0,1 0 0,-1-1 0,0 1 0,0-1 0,0 1 0,0-1 0,-2 2 0,-3 1 0,0-1 0,0 1 0,0-2 0,0 1 0,-12 2 0,-25 0 0,37-8 0,15-3 0,22-7 0,-21 10 0,-1 0 0,0 0 0,0-1 0,0 0 0,-1 0 0,1-1 0,-1 0 0,0 0 0,0-1 0,-1 0 0,0 0 0,11-13 0,-13 11 7,0 0 0,0 0-1,-1 0 1,0 0 0,-1 0-1,0-1 1,0 1-1,0-1 1,-1 1 0,-1-1-1,1 0 1,-1 0 0,-1 1-1,0-1 1,0 0 0,-1 1-1,-3-13 1,-5-9-378,0 1-1,-2 0 1,-23-42 0,29 61-6455</inkml:trace>
+</inkml:ink>
+</file>
+
+<file path=ppt/ink/ink8.xml><?xml version="1.0" encoding="utf-8"?>
+<inkml:ink xmlns:inkml="http://www.w3.org/2003/InkML">
+  <inkml:definitions>
+    <inkml:context xml:id="ctx0">
+      <inkml:inkSource xml:id="inkSrc0">
+        <inkml:traceFormat>
+          <inkml:channel name="X" type="integer" min="-2.14748E9" max="2.14748E9" units="cm"/>
+          <inkml:channel name="Y" type="integer" min="-2.14748E9" max="2.14748E9" units="cm"/>
+          <inkml:channel name="F" type="integer" max="32767" units="dev"/>
+        </inkml:traceFormat>
+        <inkml:channelProperties>
+          <inkml:channelProperty channel="X" name="resolution" value="1000" units="1/cm"/>
+          <inkml:channelProperty channel="Y" name="resolution" value="1000" units="1/cm"/>
+          <inkml:channelProperty channel="F" name="resolution" value="0" units="1/dev"/>
+        </inkml:channelProperties>
+      </inkml:inkSource>
+      <inkml:timestamp xml:id="ts0" timeString="2023-10-16T09:41:13.791"/>
+    </inkml:context>
+    <inkml:brush xml:id="br0">
+      <inkml:brushProperty name="width" value="0.035" units="cm"/>
+      <inkml:brushProperty name="height" value="0.035" units="cm"/>
+      <inkml:brushProperty name="color" value="#E71224"/>
+    </inkml:brush>
+  </inkml:definitions>
+  <inkml:trace contextRef="#ctx0" brushRef="#br0">34 0 24575,'1'11'0,"1"0"0,1-1 0,0 1 0,0-1 0,1 0 0,1 0 0,9 17 0,4 9 0,134 291 0,-145-308 0,-1 0 0,-1 0 0,3 22 0,-5-23 0,1 0 0,1 0 0,13 32 0,6 8 0,-15-34 0,0 0 0,2-1 0,21 34 0,-29-52 0,1-1 0,-1 1 0,1-1 0,0 1 0,0-1 0,0 0 0,1-1 0,-1 1 0,1-1 0,0 1 0,0-2 0,0 1 0,1 0 0,-1-1 0,1 0 0,-1 0 0,1-1 0,-1 0 0,1 0 0,10 1 0,-12-2 0,-1-1 0,1 1 0,-1-1 0,1 0 0,-1 0 0,1 0 0,-1 0 0,0 0 0,1-1 0,-1 0 0,0 0 0,0 1 0,0-2 0,0 1 0,-1 0 0,1-1 0,0 1 0,-1-1 0,0 0 0,0 1 0,0-1 0,0 0 0,0-1 0,0 1 0,-1 0 0,3-7 0,2-9 0,0 0 0,-1 0 0,4-34 0,-5 24 0,-3 27 0,6-30 0,-7 31 0,0 0 0,0 0 0,0 0 0,1 0 0,-1 0 0,0 0 0,1 0 0,-1 0 0,1 0 0,-1 0 0,1 0 0,0 0 0,-1 0 0,1 0 0,0 0 0,0 1 0,-1-1 0,1 0 0,0 1 0,0-1 0,0 0 0,1 0 0,0 4 0,-1 1 0,0-1 0,0 1 0,0-1 0,0 1 0,0-1 0,0 1 0,-1 0 0,0-1 0,0 1 0,0-1 0,-1 6 0,1-5 0,1 10 0,-1 1 0,-1 0 0,0-1 0,-1 1 0,-1-1 0,0 1 0,-6 14 0,5-19 0,-1-1 0,0 0 0,0 0 0,-1-1 0,0 0 0,-1 0 0,0 0 0,0-1 0,0 0 0,-17 12 0,18-13 0,0-1 0,0 0 0,-1 0 0,0-1 0,0 0 0,0 0 0,-1-1 0,1 1 0,-1-2 0,0 1 0,0-1 0,0 0 0,0-1 0,0 0 0,0 0 0,-12-1 0,1 1 0,1 1 0,0 0 0,0 2 0,-18 4 0,-50 9 0,70-15 31,0 1 1,0 1-1,-28 11 0,28-9-404,-1 0 1,1-2-1,-24 4 1,28-6-6454</inkml:trace>
+</inkml:ink>
+</file>
+
+<file path=ppt/ink/ink9.xml><?xml version="1.0" encoding="utf-8"?>
+<inkml:ink xmlns:inkml="http://www.w3.org/2003/InkML">
+  <inkml:definitions>
+    <inkml:context xml:id="ctx0">
+      <inkml:inkSource xml:id="inkSrc0">
+        <inkml:traceFormat>
+          <inkml:channel name="X" type="integer" min="-2.14748E9" max="2.14748E9" units="cm"/>
+          <inkml:channel name="Y" type="integer" min="-2.14748E9" max="2.14748E9" units="cm"/>
+          <inkml:channel name="F" type="integer" max="32767" units="dev"/>
+        </inkml:traceFormat>
+        <inkml:channelProperties>
+          <inkml:channelProperty channel="X" name="resolution" value="1000" units="1/cm"/>
+          <inkml:channelProperty channel="Y" name="resolution" value="1000" units="1/cm"/>
+          <inkml:channelProperty channel="F" name="resolution" value="0" units="1/dev"/>
+        </inkml:channelProperties>
+      </inkml:inkSource>
+      <inkml:timestamp xml:id="ts0" timeString="2023-10-16T09:41:24.434"/>
+    </inkml:context>
+    <inkml:brush xml:id="br0">
+      <inkml:brushProperty name="width" value="0.035" units="cm"/>
+      <inkml:brushProperty name="height" value="0.035" units="cm"/>
+      <inkml:brushProperty name="color" value="#E71224"/>
+    </inkml:brush>
+  </inkml:definitions>
+  <inkml:trace contextRef="#ctx0" brushRef="#br0">199 1153 24575,'9'-73'0,"-1"21"0,9-160 0,-14 188 0,1 1 0,0-1 0,11-27 0,-9 29 0,0-1 0,-1 0 0,3-36 0,-7 45 0,0-20 0,1-1 0,10-49 0,24-143 0,-33 199 0,-2 23 0,0 1 0,0-1 0,0 1 0,-1-1 0,0 0 0,0 1 0,0-1 0,0 0 0,-1 1 0,0-1 0,0 0 0,0 1 0,-1-1 0,1 1 0,-1 0 0,0-1 0,0 1 0,0 0 0,-1 0 0,0 1 0,-3-5 0,0 0 0,3 3 0,-1 1 0,0-1 0,0 1 0,0 0 0,0 0 0,-9-6 0,13 10 0,-1 0 0,1 0 0,-1 1 0,1-1 0,-1 0 0,1 0 0,-1 0 0,1 1 0,-1-1 0,1 0 0,0 0 0,-1 1 0,1-1 0,0 0 0,-1 1 0,1-1 0,0 1 0,-1-1 0,1 0 0,0 1 0,-1-1 0,1 1 0,0-1 0,0 1 0,0-1 0,0 0 0,-1 1 0,1-1 0,0 1 0,0-1 0,0 1 0,0-1 0,0 1 0,0-1 0,0 1 0,0-1 0,0 1 0,1-1 0,-1 1 0,-1 26 0,1-25 0,-4 86 0,-20 114 0,8-81 0,8-13 0,9 134 0,1-95 0,-2-100 0,-1-5 0,1 1 0,2 0 0,2-1 0,15 62 0,-14-71 0,-5-27 0,0 0 0,1-1 0,0 1 0,0-1 0,1 1 0,2 7 0,-3-13 0,-1 1 0,1-1 0,-1 0 0,1 1 0,0-1 0,-1 1 0,1-1 0,-1 0 0,1 0 0,-1 1 0,1-1 0,0 0 0,-1 0 0,1 0 0,0 0 0,-1 1 0,1-1 0,0 0 0,-1 0 0,1 0 0,0-1 0,-1 1 0,1 0 0,0 0 0,-1 0 0,1 0 0,-1-1 0,1 1 0,0 0 0,-1 0 0,1-1 0,-1 1 0,1-1 0,-1 1 0,1 0 0,-1-1 0,1 1 0,-1-1 0,1 1 0,-1-1 0,0 1 0,1-2 0,22-23 0,-22 24 0,22-31 0,23-44 0,-33 52 0,1 1 0,1 1 0,1 0 0,36-38 0,-49 57 0,25-27 0,-27 19 0,-21 10 0,9 5 0,-1 0 0,1 1 0,0 0 0,1 0 0,-1 1 0,-17 14 0,-35 17 0,57-33 0,1 1 0,-1 0 0,1 0 0,0 0 0,0 0 0,0 1 0,1-1 0,0 1 0,0 1 0,0-1 0,1 0 0,0 1 0,0 0 0,-3 11 0,-19 36 0,19-46 0,-18 28 0,23-34 0,0-1 0,0 0 0,0 0 0,-1 1 0,1-1 0,0 0 0,0 0 0,-1 0 0,1 0 0,-1 0 0,1 0 0,-1-1 0,1 1 0,-1 0 0,0-1 0,1 1 0,-1-1 0,0 0 0,1 1 0,-3-1 0,3-1 0,0 1 0,0-1 0,0 0 0,0 1 0,0-1 0,0 0 0,0 0 0,0 0 0,0 0 0,0 0 0,1 0 0,-1 0 0,0 0 0,1 0 0,-1 0 0,0 0 0,1-1 0,0 1 0,-1 0 0,1 0 0,0-1 0,-1 1 0,1 0 0,0 0 0,0-3 0,-2-39 0,2 35 0,0-10 0,-1-1 0,-1 1 0,0 0 0,-2 0 0,0 0 0,-1 0 0,-1 1 0,-1-1 0,0 2 0,-1-1 0,-18-27 0,11 18 62,-22-56 0,5 11-1551,27 60-5337</inkml:trace>
 </inkml:ink>
 </file>
 
@@ -243,7 +1096,7 @@
           <a:p>
             <a:fld id="{C192C1EE-9FB9-4797-86C2-7306F5547C9A}" type="datetimeFigureOut">
               <a:rPr lang="en-NL" smtClean="0"/>
-              <a:t>10/18/2022</a:t>
+              <a:t>10/16/2023</a:t>
             </a:fld>
             <a:endParaRPr lang="en-NL"/>
           </a:p>
@@ -9965,52 +10818,87 @@
                   <a:schemeClr val="accent1"/>
                 </a:solidFill>
               </a:rPr>
-              <a:t>Shiny App Project</a:t>
-            </a:r>
+              <a:t>Shiny App</a:t>
+            </a:r>
+          </a:p>
+          <a:p>
+            <a:pPr lvl="1"/>
+            <a:r>
+              <a:rPr lang="en-GB" sz="1600" dirty="0"/>
+              <a:t>File -&gt; new file -&gt; Shiny Web App</a:t>
+            </a:r>
+            <a:endParaRPr lang="en-GB" dirty="0"/>
+          </a:p>
+          <a:p>
+            <a:pPr lvl="1"/>
+            <a:r>
+              <a:rPr lang="en-GB" sz="1600" dirty="0"/>
+              <a:t>Choose a </a:t>
+            </a:r>
+            <a:r>
+              <a:rPr lang="en-GB" sz="1600" dirty="0">
+                <a:solidFill>
+                  <a:schemeClr val="accent1"/>
+                </a:solidFill>
+              </a:rPr>
+              <a:t>Single File</a:t>
+            </a:r>
+            <a:r>
+              <a:rPr lang="en-GB" sz="1600" dirty="0"/>
+              <a:t> app</a:t>
+            </a:r>
+          </a:p>
+          <a:p>
+            <a:pPr lvl="1"/>
+            <a:r>
+              <a:rPr lang="en-GB" sz="1600" dirty="0"/>
+              <a:t>Open </a:t>
+            </a:r>
+            <a:r>
+              <a:rPr lang="en-GB" sz="1600" dirty="0" err="1">
+                <a:solidFill>
+                  <a:schemeClr val="accent1"/>
+                </a:solidFill>
+              </a:rPr>
+              <a:t>app.R</a:t>
+            </a:r>
+            <a:r>
+              <a:rPr lang="en-GB" sz="1600" dirty="0">
+                <a:solidFill>
+                  <a:schemeClr val="accent1"/>
+                </a:solidFill>
+              </a:rPr>
+              <a:t> </a:t>
+            </a:r>
+            <a:r>
+              <a:rPr lang="en-GB" sz="1600" dirty="0">
+                <a:solidFill>
+                  <a:schemeClr val="tx1">
+                    <a:lumMod val="75000"/>
+                    <a:lumOff val="25000"/>
+                  </a:schemeClr>
+                </a:solidFill>
+              </a:rPr>
+              <a:t>(if it wasn’t already)</a:t>
+            </a:r>
+          </a:p>
+          <a:p>
+            <a:pPr lvl="1"/>
+            <a:endParaRPr lang="en-GB" sz="1600" dirty="0">
+              <a:solidFill>
+                <a:schemeClr val="accent1"/>
+              </a:solidFill>
+            </a:endParaRPr>
           </a:p>
           <a:p>
             <a:pPr marL="457200" lvl="1" indent="0">
               <a:buNone/>
             </a:pPr>
-            <a:endParaRPr lang="en-GB" sz="1600" dirty="0"/>
-          </a:p>
-          <a:p>
-            <a:r>
-              <a:rPr lang="en-GB" dirty="0"/>
-              <a:t>Change the title to </a:t>
-            </a:r>
-            <a:br>
-              <a:rPr lang="en-GB" dirty="0"/>
-            </a:br>
-            <a:r>
-              <a:rPr lang="en-GB" i="1" dirty="0"/>
-              <a:t>“Hello, World!”</a:t>
-            </a:r>
-          </a:p>
-          <a:p>
-            <a:pPr lvl="1"/>
-            <a:r>
-              <a:rPr lang="en-GB" sz="1400" dirty="0"/>
-              <a:t>This is traditional, other titles are </a:t>
-            </a:r>
-            <a:r>
-              <a:rPr lang="en-GB" sz="1400" b="1" u="sng" dirty="0"/>
-              <a:t>not</a:t>
-            </a:r>
-            <a:r>
-              <a:rPr lang="en-GB" sz="1400" dirty="0"/>
-              <a:t> acceptable.</a:t>
-            </a:r>
-          </a:p>
-          <a:p>
-            <a:r>
-              <a:rPr lang="en-GB" dirty="0"/>
-              <a:t>Run your app</a:t>
-            </a:r>
-          </a:p>
-          <a:p>
-            <a:pPr lvl="1"/>
-            <a:endParaRPr lang="en-GB" dirty="0"/>
+            <a:endParaRPr lang="en-GB" sz="1600" dirty="0">
+              <a:solidFill>
+                <a:schemeClr val="accent1"/>
+              </a:solidFill>
+            </a:endParaRPr>
           </a:p>
         </p:txBody>
       </p:sp>
@@ -10072,112 +10960,39 @@
           </a:p>
         </p:txBody>
       </p:sp>
-      <p:grpSp>
-        <p:nvGrpSpPr>
-          <p:cNvPr id="11" name="Group 10">
-            <a:extLst>
-              <a:ext uri="{FF2B5EF4-FFF2-40B4-BE49-F238E27FC236}">
-                <a16:creationId xmlns:a16="http://schemas.microsoft.com/office/drawing/2014/main" id="{C51F17C6-D2E8-4516-BEF4-EF7B3ABFD707}"/>
-              </a:ext>
-            </a:extLst>
-          </p:cNvPr>
-          <p:cNvGrpSpPr/>
+      <p:pic>
+        <p:nvPicPr>
+          <p:cNvPr id="7" name="Picture 6">
+            <a:extLst>
+              <a:ext uri="{FF2B5EF4-FFF2-40B4-BE49-F238E27FC236}">
+                <a16:creationId xmlns:a16="http://schemas.microsoft.com/office/drawing/2014/main" id="{A03CA454-9131-DE78-B5C6-102B26378D1C}"/>
+              </a:ext>
+            </a:extLst>
+          </p:cNvPr>
+          <p:cNvPicPr>
+            <a:picLocks noChangeAspect="1"/>
+          </p:cNvPicPr>
           <p:nvPr/>
-        </p:nvGrpSpPr>
-        <p:grpSpPr>
+        </p:nvPicPr>
+        <p:blipFill rotWithShape="1">
+          <a:blip r:embed="rId2"/>
+          <a:srcRect t="6714" b="35211"/>
+          <a:stretch/>
+        </p:blipFill>
+        <p:spPr>
           <a:xfrm>
-            <a:off x="1573228" y="4164261"/>
-            <a:ext cx="4379335" cy="1236994"/>
-            <a:chOff x="6796664" y="2209955"/>
-            <a:chExt cx="4379335" cy="1236994"/>
+            <a:off x="1333405" y="3182316"/>
+            <a:ext cx="9593014" cy="1405218"/>
           </a:xfrm>
-        </p:grpSpPr>
-        <p:pic>
-          <p:nvPicPr>
-            <p:cNvPr id="8" name="Picture 7">
-              <a:extLst>
-                <a:ext uri="{FF2B5EF4-FFF2-40B4-BE49-F238E27FC236}">
-                  <a16:creationId xmlns:a16="http://schemas.microsoft.com/office/drawing/2014/main" id="{F90FF638-5BFD-43A0-B187-AAEC90256204}"/>
-                </a:ext>
-              </a:extLst>
-            </p:cNvPr>
-            <p:cNvPicPr>
-              <a:picLocks noChangeAspect="1"/>
-            </p:cNvPicPr>
-            <p:nvPr/>
-          </p:nvPicPr>
-          <p:blipFill>
-            <a:blip r:embed="rId2"/>
-            <a:stretch>
-              <a:fillRect/>
-            </a:stretch>
-          </p:blipFill>
-          <p:spPr>
-            <a:xfrm>
-              <a:off x="6796664" y="2293810"/>
-              <a:ext cx="4379335" cy="1153139"/>
-            </a:xfrm>
-            <a:prstGeom prst="rect">
-              <a:avLst/>
-            </a:prstGeom>
-          </p:spPr>
-        </p:pic>
-        <mc:AlternateContent xmlns:mc="http://schemas.openxmlformats.org/markup-compatibility/2006" xmlns:p14="http://schemas.microsoft.com/office/powerpoint/2010/main">
-          <mc:Choice Requires="p14">
-            <p:contentPart p14:bwMode="auto" r:id="rId3">
-              <p14:nvContentPartPr>
-                <p14:cNvPr id="9" name="Ink 8">
-                  <a:extLst>
-                    <a:ext uri="{FF2B5EF4-FFF2-40B4-BE49-F238E27FC236}">
-                      <a16:creationId xmlns:a16="http://schemas.microsoft.com/office/drawing/2014/main" id="{33B5B2A9-BDFE-4942-B594-B2C3C04AA6A8}"/>
-                    </a:ext>
-                  </a:extLst>
-                </p14:cNvPr>
-                <p14:cNvContentPartPr/>
-                <p14:nvPr/>
-              </p14:nvContentPartPr>
-              <p14:xfrm>
-                <a:off x="9489075" y="2209955"/>
-                <a:ext cx="1413720" cy="606600"/>
-              </p14:xfrm>
-            </p:contentPart>
-          </mc:Choice>
-          <mc:Fallback xmlns="">
-            <p:pic>
-              <p:nvPicPr>
-                <p:cNvPr id="9" name="Ink 8">
-                  <a:extLst>
-                    <a:ext uri="{FF2B5EF4-FFF2-40B4-BE49-F238E27FC236}">
-                      <a16:creationId xmlns:a16="http://schemas.microsoft.com/office/drawing/2014/main" id="{33B5B2A9-BDFE-4942-B594-B2C3C04AA6A8}"/>
-                    </a:ext>
-                  </a:extLst>
-                </p:cNvPr>
-                <p:cNvPicPr/>
-                <p:nvPr/>
-              </p:nvPicPr>
-              <p:blipFill>
-                <a:blip r:embed="rId4"/>
-                <a:stretch>
-                  <a:fillRect/>
-                </a:stretch>
-              </p:blipFill>
-              <p:spPr>
-                <a:xfrm>
-                  <a:off x="9480075" y="2201315"/>
-                  <a:ext cx="1431360" cy="624240"/>
-                </a:xfrm>
-                <a:prstGeom prst="rect">
-                  <a:avLst/>
-                </a:prstGeom>
-              </p:spPr>
-            </p:pic>
-          </mc:Fallback>
-        </mc:AlternateContent>
-      </p:grpSp>
+          <a:prstGeom prst="rect">
+            <a:avLst/>
+          </a:prstGeom>
+        </p:spPr>
+      </p:pic>
     </p:spTree>
     <p:extLst>
       <p:ext uri="{BB962C8B-B14F-4D97-AF65-F5344CB8AC3E}">
-        <p14:creationId xmlns:p14="http://schemas.microsoft.com/office/powerpoint/2010/main" val="1495240266"/>
+        <p14:creationId xmlns:p14="http://schemas.microsoft.com/office/powerpoint/2010/main" val="801706623"/>
       </p:ext>
     </p:extLst>
   </p:cSld>
@@ -10268,30 +11083,36 @@
           <a:p>
             <a:r>
               <a:rPr lang="en-GB" dirty="0"/>
-              <a:t>Change lines 48-49 to:</a:t>
-            </a:r>
-          </a:p>
-          <a:p>
-            <a:endParaRPr lang="en-US" dirty="0"/>
-          </a:p>
-          <a:p>
-            <a:endParaRPr lang="en-US" dirty="0"/>
-          </a:p>
-          <a:p>
-            <a:endParaRPr lang="en-US" dirty="0"/>
-          </a:p>
-          <a:p>
-            <a:r>
-              <a:rPr lang="en-US" dirty="0"/>
-              <a:t>Restart the app</a:t>
+              <a:t>Change the title to </a:t>
+            </a:r>
+            <a:br>
+              <a:rPr lang="en-GB" dirty="0"/>
+            </a:br>
+            <a:r>
+              <a:rPr lang="en-GB" i="1" dirty="0"/>
+              <a:t>“Hello, World!”</a:t>
             </a:r>
           </a:p>
           <a:p>
             <a:pPr lvl="1"/>
             <a:r>
-              <a:rPr lang="en-US" dirty="0"/>
-              <a:t>Change the input, see the output update.</a:t>
-            </a:r>
+              <a:rPr lang="en-GB" sz="1400" dirty="0"/>
+              <a:t>This is traditional, other titles are </a:t>
+            </a:r>
+            <a:r>
+              <a:rPr lang="en-GB" sz="1400" b="1" u="sng" dirty="0"/>
+              <a:t>not</a:t>
+            </a:r>
+            <a:r>
+              <a:rPr lang="en-GB" sz="1400" dirty="0"/>
+              <a:t> acceptable.</a:t>
+            </a:r>
+          </a:p>
+          <a:p>
+            <a:pPr marL="457200" lvl="1" indent="0">
+              <a:buNone/>
+            </a:pPr>
+            <a:endParaRPr lang="en-GB" dirty="0"/>
           </a:p>
         </p:txBody>
       </p:sp>
@@ -10353,143 +11174,39 @@
           </a:p>
         </p:txBody>
       </p:sp>
-      <p:sp>
-        <p:nvSpPr>
-          <p:cNvPr id="6" name="TextBox 5">
-            <a:extLst>
-              <a:ext uri="{FF2B5EF4-FFF2-40B4-BE49-F238E27FC236}">
-                <a16:creationId xmlns:a16="http://schemas.microsoft.com/office/drawing/2014/main" id="{E5B6359E-D4EB-4C1D-AC37-23A99FEB194A}"/>
-              </a:ext>
-            </a:extLst>
-          </p:cNvPr>
-          <p:cNvSpPr txBox="1"/>
+      <p:pic>
+        <p:nvPicPr>
+          <p:cNvPr id="7" name="Picture 6">
+            <a:extLst>
+              <a:ext uri="{FF2B5EF4-FFF2-40B4-BE49-F238E27FC236}">
+                <a16:creationId xmlns:a16="http://schemas.microsoft.com/office/drawing/2014/main" id="{850E6A02-A5C4-AEC2-C525-6EAE4AC3C862}"/>
+              </a:ext>
+            </a:extLst>
+          </p:cNvPr>
+          <p:cNvPicPr>
+            <a:picLocks noChangeAspect="1"/>
+          </p:cNvPicPr>
           <p:nvPr/>
-        </p:nvSpPr>
+        </p:nvPicPr>
+        <p:blipFill rotWithShape="1">
+          <a:blip r:embed="rId2"/>
+          <a:srcRect r="30139"/>
+          <a:stretch/>
+        </p:blipFill>
         <p:spPr>
           <a:xfrm>
-            <a:off x="1410447" y="2396566"/>
-            <a:ext cx="7410823" cy="923330"/>
+            <a:off x="1265581" y="3067504"/>
+            <a:ext cx="6848195" cy="1686160"/>
           </a:xfrm>
           <a:prstGeom prst="rect">
             <a:avLst/>
           </a:prstGeom>
-          <a:solidFill>
-            <a:schemeClr val="bg1"/>
-          </a:solidFill>
-          <a:effectLst>
-            <a:outerShdw blurRad="50800" dist="38100" dir="2700000" algn="tl" rotWithShape="0">
-              <a:prstClr val="black">
-                <a:alpha val="40000"/>
-              </a:prstClr>
-            </a:outerShdw>
-          </a:effectLst>
         </p:spPr>
-        <p:txBody>
-          <a:bodyPr wrap="square" rtlCol="0">
-            <a:spAutoFit/>
-          </a:bodyPr>
-          <a:lstStyle/>
-          <a:p>
-            <a:pPr marL="0" indent="0">
-              <a:buNone/>
-            </a:pPr>
-            <a:r>
-              <a:rPr lang="en-US" sz="1800" dirty="0">
-                <a:solidFill>
-                  <a:schemeClr val="bg1">
-                    <a:lumMod val="50000"/>
-                  </a:schemeClr>
-                </a:solidFill>
-                <a:latin typeface="FuraCode Nerd Font" panose="020B0509050000020004" pitchFamily="50" charset="0"/>
-                <a:ea typeface="FuraCode Nerd Font" panose="020B0509050000020004" pitchFamily="50" charset="0"/>
-              </a:rPr>
-              <a:t># Run the application </a:t>
-            </a:r>
-          </a:p>
-          <a:p>
-            <a:pPr marL="0" indent="0">
-              <a:buNone/>
-            </a:pPr>
-            <a:r>
-              <a:rPr lang="en-US" sz="1800" dirty="0" err="1">
-                <a:latin typeface="FuraCode Nerd Font" panose="020B0509050000020004" pitchFamily="50" charset="0"/>
-                <a:ea typeface="FuraCode Nerd Font" panose="020B0509050000020004" pitchFamily="50" charset="0"/>
-              </a:rPr>
-              <a:t>shinyApp</a:t>
-            </a:r>
-            <a:r>
-              <a:rPr lang="en-US" sz="1800" dirty="0">
-                <a:latin typeface="FuraCode Nerd Font" panose="020B0509050000020004" pitchFamily="50" charset="0"/>
-                <a:ea typeface="FuraCode Nerd Font" panose="020B0509050000020004" pitchFamily="50" charset="0"/>
-              </a:rPr>
-              <a:t>(</a:t>
-            </a:r>
-            <a:r>
-              <a:rPr lang="en-US" sz="1800" dirty="0" err="1">
-                <a:latin typeface="FuraCode Nerd Font" panose="020B0509050000020004" pitchFamily="50" charset="0"/>
-                <a:ea typeface="FuraCode Nerd Font" panose="020B0509050000020004" pitchFamily="50" charset="0"/>
-              </a:rPr>
-              <a:t>ui</a:t>
-            </a:r>
-            <a:r>
-              <a:rPr lang="en-US" sz="1800" dirty="0">
-                <a:latin typeface="FuraCode Nerd Font" panose="020B0509050000020004" pitchFamily="50" charset="0"/>
-                <a:ea typeface="FuraCode Nerd Font" panose="020B0509050000020004" pitchFamily="50" charset="0"/>
-              </a:rPr>
-              <a:t> = </a:t>
-            </a:r>
-            <a:r>
-              <a:rPr lang="en-US" sz="1800" dirty="0" err="1">
-                <a:latin typeface="FuraCode Nerd Font" panose="020B0509050000020004" pitchFamily="50" charset="0"/>
-                <a:ea typeface="FuraCode Nerd Font" panose="020B0509050000020004" pitchFamily="50" charset="0"/>
-              </a:rPr>
-              <a:t>ui</a:t>
-            </a:r>
-            <a:r>
-              <a:rPr lang="en-US" sz="1800" dirty="0">
-                <a:latin typeface="FuraCode Nerd Font" panose="020B0509050000020004" pitchFamily="50" charset="0"/>
-                <a:ea typeface="FuraCode Nerd Font" panose="020B0509050000020004" pitchFamily="50" charset="0"/>
-              </a:rPr>
-              <a:t>, server = server, </a:t>
-            </a:r>
-            <a:br>
-              <a:rPr lang="en-US" sz="1800" dirty="0">
-                <a:latin typeface="FuraCode Nerd Font" panose="020B0509050000020004" pitchFamily="50" charset="0"/>
-                <a:ea typeface="FuraCode Nerd Font" panose="020B0509050000020004" pitchFamily="50" charset="0"/>
-              </a:rPr>
-            </a:br>
-            <a:r>
-              <a:rPr lang="en-US" sz="1800" dirty="0">
-                <a:latin typeface="FuraCode Nerd Font" panose="020B0509050000020004" pitchFamily="50" charset="0"/>
-                <a:ea typeface="FuraCode Nerd Font" panose="020B0509050000020004" pitchFamily="50" charset="0"/>
-              </a:rPr>
-              <a:t>	   options = list(</a:t>
-            </a:r>
-            <a:r>
-              <a:rPr lang="en-US" sz="1800" dirty="0" err="1">
-                <a:latin typeface="FuraCode Nerd Font" panose="020B0509050000020004" pitchFamily="50" charset="0"/>
-                <a:ea typeface="FuraCode Nerd Font" panose="020B0509050000020004" pitchFamily="50" charset="0"/>
-              </a:rPr>
-              <a:t>display.mode</a:t>
-            </a:r>
-            <a:r>
-              <a:rPr lang="en-US" sz="1800" dirty="0">
-                <a:latin typeface="FuraCode Nerd Font" panose="020B0509050000020004" pitchFamily="50" charset="0"/>
-                <a:ea typeface="FuraCode Nerd Font" panose="020B0509050000020004" pitchFamily="50" charset="0"/>
-              </a:rPr>
-              <a:t> = "showcase"))</a:t>
-            </a:r>
-            <a:endParaRPr lang="en-GB" sz="1800" dirty="0">
-              <a:latin typeface="FuraCode Nerd Font" panose="020B0509050000020004" pitchFamily="50" charset="0"/>
-              <a:ea typeface="FuraCode Nerd Font" panose="020B0509050000020004" pitchFamily="50" charset="0"/>
-            </a:endParaRPr>
-          </a:p>
-        </p:txBody>
-      </p:sp>
+      </p:pic>
     </p:spTree>
     <p:extLst>
       <p:ext uri="{BB962C8B-B14F-4D97-AF65-F5344CB8AC3E}">
-        <p14:creationId xmlns:p14="http://schemas.microsoft.com/office/powerpoint/2010/main" val="776796449"/>
+        <p14:creationId xmlns:p14="http://schemas.microsoft.com/office/powerpoint/2010/main" val="1495240266"/>
       </p:ext>
     </p:extLst>
   </p:cSld>
@@ -10546,7 +11263,7 @@
             </a:br>
             <a:r>
               <a:rPr lang="en-GB" dirty="0"/>
-              <a:t>my first shiny app</a:t>
+              <a:t>MY first shiny app</a:t>
             </a:r>
             <a:endParaRPr lang="nl-NL" dirty="0"/>
           </a:p>
@@ -10579,343 +11296,35 @@
           <a:lstStyle/>
           <a:p>
             <a:r>
-              <a:rPr lang="en-US" dirty="0"/>
-              <a:t>UI</a:t>
-            </a:r>
-          </a:p>
-          <a:p>
-            <a:pPr marL="457200" lvl="1" indent="0">
-              <a:buNone/>
-            </a:pPr>
-            <a:r>
-              <a:rPr lang="en-US" sz="2000" dirty="0">
-                <a:solidFill>
-                  <a:schemeClr val="accent6">
-                    <a:lumMod val="75000"/>
-                  </a:schemeClr>
-                </a:solidFill>
-                <a:latin typeface="FuraCode Nerd Font Mono" panose="020B0509050000020004" pitchFamily="50" charset="0"/>
-                <a:ea typeface="FuraCode Nerd Font Mono" panose="020B0509050000020004" pitchFamily="50" charset="0"/>
-              </a:rPr>
-              <a:t>- </a:t>
-            </a:r>
-            <a:r>
-              <a:rPr lang="en-US" sz="2000" dirty="0" err="1">
-                <a:solidFill>
-                  <a:schemeClr val="accent6">
-                    <a:lumMod val="75000"/>
-                  </a:schemeClr>
-                </a:solidFill>
-                <a:latin typeface="FuraCode Nerd Font Mono" panose="020B0509050000020004" pitchFamily="50" charset="0"/>
-                <a:ea typeface="FuraCode Nerd Font Mono" panose="020B0509050000020004" pitchFamily="50" charset="0"/>
-              </a:rPr>
-              <a:t>sliderInput</a:t>
-            </a:r>
-            <a:r>
-              <a:rPr lang="en-US" sz="2000" dirty="0">
-                <a:solidFill>
-                  <a:schemeClr val="accent6">
-                    <a:lumMod val="75000"/>
-                  </a:schemeClr>
-                </a:solidFill>
-                <a:latin typeface="FuraCode Nerd Font Mono" panose="020B0509050000020004" pitchFamily="50" charset="0"/>
-                <a:ea typeface="FuraCode Nerd Font Mono" panose="020B0509050000020004" pitchFamily="50" charset="0"/>
-              </a:rPr>
-              <a:t>(“bins”)</a:t>
-            </a:r>
-          </a:p>
-          <a:p>
-            <a:pPr marL="457200" lvl="1" indent="0">
-              <a:buNone/>
-            </a:pPr>
-            <a:r>
-              <a:rPr lang="en-US" sz="2000" dirty="0">
-                <a:solidFill>
-                  <a:schemeClr val="accent4">
-                    <a:lumMod val="75000"/>
-                  </a:schemeClr>
-                </a:solidFill>
-                <a:latin typeface="FuraCode Nerd Font Mono" panose="020B0509050000020004" pitchFamily="50" charset="0"/>
-                <a:ea typeface="FuraCode Nerd Font Mono" panose="020B0509050000020004" pitchFamily="50" charset="0"/>
-              </a:rPr>
-              <a:t>+ </a:t>
-            </a:r>
-            <a:r>
-              <a:rPr lang="en-US" sz="2000" dirty="0" err="1">
-                <a:solidFill>
-                  <a:schemeClr val="accent4">
-                    <a:lumMod val="75000"/>
-                  </a:schemeClr>
-                </a:solidFill>
-                <a:latin typeface="FuraCode Nerd Font Mono" panose="020B0509050000020004" pitchFamily="50" charset="0"/>
-                <a:ea typeface="FuraCode Nerd Font Mono" panose="020B0509050000020004" pitchFamily="50" charset="0"/>
-              </a:rPr>
-              <a:t>textInput</a:t>
-            </a:r>
-            <a:r>
-              <a:rPr lang="en-US" sz="2000" dirty="0">
-                <a:solidFill>
-                  <a:schemeClr val="accent4">
-                    <a:lumMod val="75000"/>
-                  </a:schemeClr>
-                </a:solidFill>
-                <a:latin typeface="FuraCode Nerd Font Mono" panose="020B0509050000020004" pitchFamily="50" charset="0"/>
-                <a:ea typeface="FuraCode Nerd Font Mono" panose="020B0509050000020004" pitchFamily="50" charset="0"/>
-              </a:rPr>
-              <a:t>(“name”)</a:t>
-            </a:r>
-          </a:p>
-          <a:p>
-            <a:pPr marL="457200" lvl="1" indent="0">
-              <a:buNone/>
-            </a:pPr>
-            <a:endParaRPr lang="en-US" sz="2000" dirty="0">
-              <a:solidFill>
-                <a:schemeClr val="accent4">
-                  <a:lumMod val="75000"/>
-                </a:schemeClr>
-              </a:solidFill>
-              <a:latin typeface="FuraCode Nerd Font Mono" panose="020B0509050000020004" pitchFamily="50" charset="0"/>
-              <a:ea typeface="FuraCode Nerd Font Mono" panose="020B0509050000020004" pitchFamily="50" charset="0"/>
-            </a:endParaRPr>
-          </a:p>
-          <a:p>
-            <a:pPr marL="457200" lvl="1" indent="0">
-              <a:buNone/>
-            </a:pPr>
-            <a:r>
-              <a:rPr lang="en-US" sz="2000" dirty="0">
-                <a:solidFill>
-                  <a:schemeClr val="accent6">
-                    <a:lumMod val="75000"/>
-                  </a:schemeClr>
-                </a:solidFill>
-                <a:latin typeface="FuraCode Nerd Font Mono" panose="020B0509050000020004" pitchFamily="50" charset="0"/>
-                <a:ea typeface="FuraCode Nerd Font Mono" panose="020B0509050000020004" pitchFamily="50" charset="0"/>
-              </a:rPr>
-              <a:t>- </a:t>
-            </a:r>
-            <a:r>
-              <a:rPr lang="en-US" sz="2000" dirty="0" err="1">
-                <a:solidFill>
-                  <a:schemeClr val="accent6">
-                    <a:lumMod val="75000"/>
-                  </a:schemeClr>
-                </a:solidFill>
-                <a:latin typeface="FuraCode Nerd Font Mono" panose="020B0509050000020004" pitchFamily="50" charset="0"/>
-                <a:ea typeface="FuraCode Nerd Font Mono" panose="020B0509050000020004" pitchFamily="50" charset="0"/>
-              </a:rPr>
-              <a:t>plotOutput</a:t>
-            </a:r>
-            <a:r>
-              <a:rPr lang="en-US" sz="2000" dirty="0">
-                <a:solidFill>
-                  <a:schemeClr val="accent6">
-                    <a:lumMod val="75000"/>
-                  </a:schemeClr>
-                </a:solidFill>
-                <a:latin typeface="FuraCode Nerd Font Mono" panose="020B0509050000020004" pitchFamily="50" charset="0"/>
-                <a:ea typeface="FuraCode Nerd Font Mono" panose="020B0509050000020004" pitchFamily="50" charset="0"/>
-              </a:rPr>
-              <a:t>(“</a:t>
-            </a:r>
-            <a:r>
-              <a:rPr lang="en-US" sz="2000" dirty="0" err="1">
-                <a:solidFill>
-                  <a:schemeClr val="accent6">
-                    <a:lumMod val="75000"/>
-                  </a:schemeClr>
-                </a:solidFill>
-                <a:latin typeface="FuraCode Nerd Font Mono" panose="020B0509050000020004" pitchFamily="50" charset="0"/>
-                <a:ea typeface="FuraCode Nerd Font Mono" panose="020B0509050000020004" pitchFamily="50" charset="0"/>
-              </a:rPr>
-              <a:t>distPlot</a:t>
-            </a:r>
-            <a:r>
-              <a:rPr lang="en-US" sz="2000" dirty="0">
-                <a:solidFill>
-                  <a:schemeClr val="accent6">
-                    <a:lumMod val="75000"/>
-                  </a:schemeClr>
-                </a:solidFill>
-                <a:latin typeface="FuraCode Nerd Font Mono" panose="020B0509050000020004" pitchFamily="50" charset="0"/>
-                <a:ea typeface="FuraCode Nerd Font Mono" panose="020B0509050000020004" pitchFamily="50" charset="0"/>
-              </a:rPr>
-              <a:t>”)</a:t>
-            </a:r>
-          </a:p>
-          <a:p>
-            <a:pPr marL="457200" lvl="1" indent="0">
-              <a:buNone/>
-            </a:pPr>
-            <a:r>
-              <a:rPr lang="en-US" sz="2000" dirty="0">
-                <a:solidFill>
-                  <a:schemeClr val="accent4">
-                    <a:lumMod val="75000"/>
-                  </a:schemeClr>
-                </a:solidFill>
-                <a:latin typeface="FuraCode Nerd Font Mono" panose="020B0509050000020004" pitchFamily="50" charset="0"/>
-                <a:ea typeface="FuraCode Nerd Font Mono" panose="020B0509050000020004" pitchFamily="50" charset="0"/>
-              </a:rPr>
-              <a:t>+ </a:t>
-            </a:r>
-            <a:r>
-              <a:rPr lang="en-US" sz="2000" dirty="0" err="1">
-                <a:solidFill>
-                  <a:schemeClr val="accent4">
-                    <a:lumMod val="75000"/>
-                  </a:schemeClr>
-                </a:solidFill>
-                <a:latin typeface="FuraCode Nerd Font Mono" panose="020B0509050000020004" pitchFamily="50" charset="0"/>
-                <a:ea typeface="FuraCode Nerd Font Mono" panose="020B0509050000020004" pitchFamily="50" charset="0"/>
-              </a:rPr>
-              <a:t>textOutput</a:t>
-            </a:r>
-            <a:r>
-              <a:rPr lang="en-US" sz="2000" dirty="0">
-                <a:solidFill>
-                  <a:schemeClr val="accent4">
-                    <a:lumMod val="75000"/>
-                  </a:schemeClr>
-                </a:solidFill>
-                <a:latin typeface="FuraCode Nerd Font Mono" panose="020B0509050000020004" pitchFamily="50" charset="0"/>
-                <a:ea typeface="FuraCode Nerd Font Mono" panose="020B0509050000020004" pitchFamily="50" charset="0"/>
-              </a:rPr>
-              <a:t>(“welcome”)</a:t>
-            </a:r>
-          </a:p>
-          <a:p>
-            <a:pPr marL="457200" lvl="1" indent="0">
-              <a:buNone/>
-            </a:pPr>
-            <a:endParaRPr lang="en-US" sz="2000" dirty="0">
-              <a:solidFill>
-                <a:schemeClr val="accent4">
-                  <a:lumMod val="75000"/>
-                </a:schemeClr>
-              </a:solidFill>
-              <a:latin typeface="FuraCode Nerd Font Mono" panose="020B0509050000020004" pitchFamily="50" charset="0"/>
-              <a:ea typeface="FuraCode Nerd Font Mono" panose="020B0509050000020004" pitchFamily="50" charset="0"/>
-            </a:endParaRPr>
-          </a:p>
-          <a:p>
-            <a:r>
-              <a:rPr lang="en-US" sz="2400" dirty="0">
-                <a:ea typeface="FuraCode Nerd Font Mono" panose="020B0509050000020004" pitchFamily="50" charset="0"/>
-              </a:rPr>
-              <a:t>Server</a:t>
-            </a:r>
-          </a:p>
-          <a:p>
-            <a:pPr marL="457200" lvl="1" indent="0">
-              <a:buNone/>
-            </a:pPr>
-            <a:r>
-              <a:rPr lang="en-US" sz="2000" dirty="0">
-                <a:solidFill>
-                  <a:schemeClr val="accent6">
-                    <a:lumMod val="75000"/>
-                  </a:schemeClr>
-                </a:solidFill>
-                <a:latin typeface="FuraCode Nerd Font Mono" panose="020B0509050000020004" pitchFamily="50" charset="0"/>
-                <a:ea typeface="FuraCode Nerd Font Mono" panose="020B0509050000020004" pitchFamily="50" charset="0"/>
-              </a:rPr>
-              <a:t>- </a:t>
-            </a:r>
-            <a:r>
-              <a:rPr lang="en-US" sz="2000" dirty="0" err="1">
-                <a:solidFill>
-                  <a:schemeClr val="accent6">
-                    <a:lumMod val="75000"/>
-                  </a:schemeClr>
-                </a:solidFill>
-                <a:latin typeface="FuraCode Nerd Font Mono" panose="020B0509050000020004" pitchFamily="50" charset="0"/>
-                <a:ea typeface="FuraCode Nerd Font Mono" panose="020B0509050000020004" pitchFamily="50" charset="0"/>
-              </a:rPr>
-              <a:t>renderPlot</a:t>
-            </a:r>
-            <a:r>
-              <a:rPr lang="en-US" sz="2000" dirty="0">
-                <a:solidFill>
-                  <a:schemeClr val="accent6">
-                    <a:lumMod val="75000"/>
-                  </a:schemeClr>
-                </a:solidFill>
-                <a:latin typeface="FuraCode Nerd Font Mono" panose="020B0509050000020004" pitchFamily="50" charset="0"/>
-                <a:ea typeface="FuraCode Nerd Font Mono" panose="020B0509050000020004" pitchFamily="50" charset="0"/>
-              </a:rPr>
-              <a:t>(“</a:t>
-            </a:r>
-            <a:r>
-              <a:rPr lang="en-US" sz="2000" dirty="0" err="1">
-                <a:solidFill>
-                  <a:schemeClr val="accent6">
-                    <a:lumMod val="75000"/>
-                  </a:schemeClr>
-                </a:solidFill>
-                <a:latin typeface="FuraCode Nerd Font Mono" panose="020B0509050000020004" pitchFamily="50" charset="0"/>
-                <a:ea typeface="FuraCode Nerd Font Mono" panose="020B0509050000020004" pitchFamily="50" charset="0"/>
-              </a:rPr>
-              <a:t>distPlot</a:t>
-            </a:r>
-            <a:r>
-              <a:rPr lang="en-US" sz="2000" dirty="0">
-                <a:solidFill>
-                  <a:schemeClr val="accent6">
-                    <a:lumMod val="75000"/>
-                  </a:schemeClr>
-                </a:solidFill>
-                <a:latin typeface="FuraCode Nerd Font Mono" panose="020B0509050000020004" pitchFamily="50" charset="0"/>
-                <a:ea typeface="FuraCode Nerd Font Mono" panose="020B0509050000020004" pitchFamily="50" charset="0"/>
-              </a:rPr>
-              <a:t>”)</a:t>
-            </a:r>
-          </a:p>
-          <a:p>
-            <a:pPr marL="457200" lvl="1" indent="0">
-              <a:buNone/>
-            </a:pPr>
-            <a:r>
-              <a:rPr lang="en-US" sz="2000" dirty="0">
-                <a:solidFill>
-                  <a:schemeClr val="accent4">
-                    <a:lumMod val="75000"/>
-                  </a:schemeClr>
-                </a:solidFill>
-                <a:latin typeface="FuraCode Nerd Font Mono" panose="020B0509050000020004" pitchFamily="50" charset="0"/>
-                <a:ea typeface="FuraCode Nerd Font Mono" panose="020B0509050000020004" pitchFamily="50" charset="0"/>
-              </a:rPr>
-              <a:t>+ </a:t>
-            </a:r>
-            <a:r>
-              <a:rPr lang="en-US" sz="2000" dirty="0" err="1">
-                <a:solidFill>
-                  <a:schemeClr val="accent4">
-                    <a:lumMod val="75000"/>
-                  </a:schemeClr>
-                </a:solidFill>
-                <a:latin typeface="FuraCode Nerd Font Mono" panose="020B0509050000020004" pitchFamily="50" charset="0"/>
-                <a:ea typeface="FuraCode Nerd Font Mono" panose="020B0509050000020004" pitchFamily="50" charset="0"/>
-              </a:rPr>
-              <a:t>renderText</a:t>
-            </a:r>
-            <a:r>
-              <a:rPr lang="en-US" sz="2000" dirty="0">
-                <a:solidFill>
-                  <a:schemeClr val="accent4">
-                    <a:lumMod val="75000"/>
-                  </a:schemeClr>
-                </a:solidFill>
-                <a:latin typeface="FuraCode Nerd Font Mono" panose="020B0509050000020004" pitchFamily="50" charset="0"/>
-                <a:ea typeface="FuraCode Nerd Font Mono" panose="020B0509050000020004" pitchFamily="50" charset="0"/>
-              </a:rPr>
-              <a:t>(“welcome”)</a:t>
-            </a:r>
-          </a:p>
-          <a:p>
-            <a:pPr lvl="2"/>
-            <a:endParaRPr lang="en-US" dirty="0"/>
+              <a:rPr lang="en-GB" dirty="0"/>
+              <a:t>Run your app</a:t>
+            </a:r>
+          </a:p>
+          <a:p>
+            <a:endParaRPr lang="en-GB" dirty="0"/>
+          </a:p>
+          <a:p>
+            <a:endParaRPr lang="en-GB" dirty="0"/>
+          </a:p>
+          <a:p>
+            <a:endParaRPr lang="en-GB" dirty="0"/>
+          </a:p>
+          <a:p>
+            <a:r>
+              <a:rPr lang="en-GB" dirty="0"/>
+              <a:t>Congratulations!</a:t>
+            </a:r>
+          </a:p>
+          <a:p>
+            <a:pPr lvl="1"/>
+            <a:r>
+              <a:rPr lang="en-GB" sz="1600" dirty="0"/>
+              <a:t>You’ve made your first shiny app.</a:t>
+            </a:r>
+          </a:p>
+          <a:p>
+            <a:pPr lvl="1"/>
+            <a:endParaRPr lang="en-GB" dirty="0"/>
           </a:p>
         </p:txBody>
       </p:sp>
@@ -10979,10 +11388,10 @@
       </p:sp>
       <p:pic>
         <p:nvPicPr>
-          <p:cNvPr id="12" name="Picture 11">
-            <a:extLst>
-              <a:ext uri="{FF2B5EF4-FFF2-40B4-BE49-F238E27FC236}">
-                <a16:creationId xmlns:a16="http://schemas.microsoft.com/office/drawing/2014/main" id="{BCB9C76C-3C26-47FA-9156-215ECCFE8915}"/>
+          <p:cNvPr id="7" name="Picture 6">
+            <a:extLst>
+              <a:ext uri="{FF2B5EF4-FFF2-40B4-BE49-F238E27FC236}">
+                <a16:creationId xmlns:a16="http://schemas.microsoft.com/office/drawing/2014/main" id="{FFA53E35-871E-1EDD-3714-8F7C4924F8CF}"/>
               </a:ext>
             </a:extLst>
           </p:cNvPr>
@@ -10991,16 +11400,15 @@
           </p:cNvPicPr>
           <p:nvPr/>
         </p:nvPicPr>
-        <p:blipFill>
+        <p:blipFill rotWithShape="1">
           <a:blip r:embed="rId2"/>
-          <a:stretch>
-            <a:fillRect/>
-          </a:stretch>
+          <a:srcRect r="54715"/>
+          <a:stretch/>
         </p:blipFill>
         <p:spPr>
           <a:xfrm>
-            <a:off x="5801805" y="2090509"/>
-            <a:ext cx="6655808" cy="1999408"/>
+            <a:off x="1297027" y="2317345"/>
+            <a:ext cx="4512462" cy="1247949"/>
           </a:xfrm>
           <a:prstGeom prst="rect">
             <a:avLst/>
@@ -11009,10 +11417,10 @@
       </p:pic>
       <p:pic>
         <p:nvPicPr>
-          <p:cNvPr id="14" name="Picture 13">
-            <a:extLst>
-              <a:ext uri="{FF2B5EF4-FFF2-40B4-BE49-F238E27FC236}">
-                <a16:creationId xmlns:a16="http://schemas.microsoft.com/office/drawing/2014/main" id="{CC2C35FC-AF82-498B-89F5-E09D354BE3F8}"/>
+          <p:cNvPr id="12" name="Picture 11">
+            <a:extLst>
+              <a:ext uri="{FF2B5EF4-FFF2-40B4-BE49-F238E27FC236}">
+                <a16:creationId xmlns:a16="http://schemas.microsoft.com/office/drawing/2014/main" id="{3187B1E3-08E9-9B2A-5136-A7993866D639}"/>
               </a:ext>
             </a:extLst>
           </p:cNvPr>
@@ -11021,140 +11429,556 @@
           </p:cNvPicPr>
           <p:nvPr/>
         </p:nvPicPr>
-        <p:blipFill>
-          <a:blip r:embed="rId3">
-            <a:extLst>
-              <a:ext uri="{28A0092B-C50C-407E-A947-70E740481C1C}">
-                <a14:useLocalDpi xmlns:a14="http://schemas.microsoft.com/office/drawing/2010/main" val="0"/>
-              </a:ext>
-            </a:extLst>
-          </a:blip>
-          <a:srcRect/>
+        <p:blipFill rotWithShape="1">
+          <a:blip r:embed="rId2"/>
+          <a:srcRect l="79365"/>
           <a:stretch/>
         </p:blipFill>
         <p:spPr>
           <a:xfrm>
-            <a:off x="5801805" y="4354801"/>
-            <a:ext cx="5486364" cy="1578874"/>
+            <a:off x="5809489" y="2317345"/>
+            <a:ext cx="2056190" cy="1247949"/>
           </a:xfrm>
           <a:prstGeom prst="rect">
             <a:avLst/>
           </a:prstGeom>
         </p:spPr>
       </p:pic>
-      <p:sp>
-        <p:nvSpPr>
-          <p:cNvPr id="15" name="TextBox 14">
-            <a:extLst>
-              <a:ext uri="{FF2B5EF4-FFF2-40B4-BE49-F238E27FC236}">
-                <a16:creationId xmlns:a16="http://schemas.microsoft.com/office/drawing/2014/main" id="{C43C087E-D5E1-41BA-B4F1-6CB3633545AE}"/>
-              </a:ext>
-            </a:extLst>
-          </p:cNvPr>
-          <p:cNvSpPr txBox="1"/>
+      <mc:AlternateContent xmlns:mc="http://schemas.openxmlformats.org/markup-compatibility/2006">
+        <mc:Choice xmlns:p14="http://schemas.microsoft.com/office/powerpoint/2010/main" Requires="p14">
+          <p:contentPart p14:bwMode="auto" r:id="rId3">
+            <p14:nvContentPartPr>
+              <p14:cNvPr id="20" name="Ink 19">
+                <a:extLst>
+                  <a:ext uri="{FF2B5EF4-FFF2-40B4-BE49-F238E27FC236}">
+                    <a16:creationId xmlns:a16="http://schemas.microsoft.com/office/drawing/2014/main" id="{9376DEC4-65CC-1710-4A90-727F1AFE3273}"/>
+                  </a:ext>
+                </a:extLst>
+              </p14:cNvPr>
+              <p14:cNvContentPartPr/>
+              <p14:nvPr/>
+            </p14:nvContentPartPr>
+            <p14:xfrm>
+              <a:off x="5513256" y="3007680"/>
+              <a:ext cx="439200" cy="268920"/>
+            </p14:xfrm>
+          </p:contentPart>
+        </mc:Choice>
+        <mc:Fallback>
+          <p:pic>
+            <p:nvPicPr>
+              <p:cNvPr id="20" name="Ink 19">
+                <a:extLst>
+                  <a:ext uri="{FF2B5EF4-FFF2-40B4-BE49-F238E27FC236}">
+                    <a16:creationId xmlns:a16="http://schemas.microsoft.com/office/drawing/2014/main" id="{9376DEC4-65CC-1710-4A90-727F1AFE3273}"/>
+                  </a:ext>
+                </a:extLst>
+              </p:cNvPr>
+              <p:cNvPicPr/>
+              <p:nvPr/>
+            </p:nvPicPr>
+            <p:blipFill>
+              <a:blip r:embed="rId4"/>
+              <a:stretch>
+                <a:fillRect/>
+              </a:stretch>
+            </p:blipFill>
+            <p:spPr>
+              <a:xfrm>
+                <a:off x="5507136" y="3001560"/>
+                <a:ext cx="451440" cy="281160"/>
+              </a:xfrm>
+              <a:prstGeom prst="rect">
+                <a:avLst/>
+              </a:prstGeom>
+            </p:spPr>
+          </p:pic>
+        </mc:Fallback>
+      </mc:AlternateContent>
+      <p:grpSp>
+        <p:nvGrpSpPr>
+          <p:cNvPr id="24" name="Group 23">
+            <a:extLst>
+              <a:ext uri="{FF2B5EF4-FFF2-40B4-BE49-F238E27FC236}">
+                <a16:creationId xmlns:a16="http://schemas.microsoft.com/office/drawing/2014/main" id="{CEDAA618-F646-3C24-6B06-3882A11B7807}"/>
+              </a:ext>
+            </a:extLst>
+          </p:cNvPr>
+          <p:cNvGrpSpPr/>
           <p:nvPr/>
-        </p:nvSpPr>
-        <p:spPr>
+        </p:nvGrpSpPr>
+        <p:grpSpPr>
           <a:xfrm>
-            <a:off x="5484969" y="998812"/>
-            <a:ext cx="7487803" cy="646331"/>
+            <a:off x="5263776" y="2169960"/>
+            <a:ext cx="2203920" cy="1280880"/>
+            <a:chOff x="5263776" y="2169960"/>
+            <a:chExt cx="2203920" cy="1280880"/>
           </a:xfrm>
-          <a:prstGeom prst="rect">
-            <a:avLst/>
-          </a:prstGeom>
-          <a:noFill/>
-        </p:spPr>
-        <p:txBody>
-          <a:bodyPr wrap="square" rtlCol="0">
-            <a:spAutoFit/>
-          </a:bodyPr>
-          <a:lstStyle/>
-          <a:p>
-            <a:pPr algn="ctr"/>
-            <a:r>
-              <a:rPr lang="en-GB" b="1" dirty="0">
-                <a:solidFill>
-                  <a:schemeClr val="bg1"/>
-                </a:solidFill>
-                <a:latin typeface="Ink Free" panose="03080402000500000000" pitchFamily="66" charset="0"/>
-              </a:rPr>
-              <a:t>Cheat sheets are your </a:t>
-            </a:r>
-            <a:r>
-              <a:rPr lang="en-GB" b="1" u="sng" dirty="0">
-                <a:solidFill>
-                  <a:schemeClr val="bg1"/>
-                </a:solidFill>
-                <a:latin typeface="Ink Free" panose="03080402000500000000" pitchFamily="66" charset="0"/>
-              </a:rPr>
-              <a:t>friend</a:t>
-            </a:r>
-            <a:br>
-              <a:rPr lang="en-GB" b="1" dirty="0">
-                <a:solidFill>
-                  <a:schemeClr val="bg1"/>
-                </a:solidFill>
-                <a:latin typeface="Ink Free" panose="03080402000500000000" pitchFamily="66" charset="0"/>
-              </a:rPr>
-            </a:br>
-            <a:r>
-              <a:rPr lang="en-GB" b="1" dirty="0">
-                <a:solidFill>
-                  <a:schemeClr val="accent1"/>
-                </a:solidFill>
-                <a:latin typeface="Ink Free" panose="03080402000500000000" pitchFamily="66" charset="0"/>
-              </a:rPr>
-              <a:t>Help </a:t>
-            </a:r>
-            <a:r>
-              <a:rPr lang="en-GB" b="1" dirty="0">
-                <a:solidFill>
-                  <a:schemeClr val="bg1"/>
-                </a:solidFill>
-                <a:latin typeface="Ink Free" panose="03080402000500000000" pitchFamily="66" charset="0"/>
-              </a:rPr>
-              <a:t>&gt;</a:t>
-            </a:r>
-            <a:r>
-              <a:rPr lang="en-GB" b="1" dirty="0">
-                <a:solidFill>
-                  <a:schemeClr val="accent1"/>
-                </a:solidFill>
-                <a:latin typeface="Ink Free" panose="03080402000500000000" pitchFamily="66" charset="0"/>
-              </a:rPr>
-              <a:t> Cheat Sheets </a:t>
-            </a:r>
-            <a:r>
-              <a:rPr lang="en-GB" b="1" dirty="0">
-                <a:solidFill>
-                  <a:schemeClr val="bg1"/>
-                </a:solidFill>
-                <a:latin typeface="Ink Free" panose="03080402000500000000" pitchFamily="66" charset="0"/>
-              </a:rPr>
-              <a:t>&gt;</a:t>
-            </a:r>
-            <a:r>
-              <a:rPr lang="en-GB" b="1" dirty="0">
-                <a:solidFill>
-                  <a:schemeClr val="accent1"/>
-                </a:solidFill>
-                <a:latin typeface="Ink Free" panose="03080402000500000000" pitchFamily="66" charset="0"/>
-              </a:rPr>
-              <a:t> Web applications with Shiny</a:t>
-            </a:r>
-            <a:endParaRPr lang="nl-NL" b="1" dirty="0">
-              <a:solidFill>
-                <a:schemeClr val="accent1"/>
-              </a:solidFill>
-              <a:latin typeface="Ink Free" panose="03080402000500000000" pitchFamily="66" charset="0"/>
-            </a:endParaRPr>
-          </a:p>
-        </p:txBody>
-      </p:sp>
+        </p:grpSpPr>
+        <mc:AlternateContent xmlns:mc="http://schemas.openxmlformats.org/markup-compatibility/2006">
+          <mc:Choice xmlns:p14="http://schemas.microsoft.com/office/powerpoint/2010/main" Requires="p14">
+            <p:contentPart p14:bwMode="auto" r:id="rId5">
+              <p14:nvContentPartPr>
+                <p14:cNvPr id="14" name="Ink 13">
+                  <a:extLst>
+                    <a:ext uri="{FF2B5EF4-FFF2-40B4-BE49-F238E27FC236}">
+                      <a16:creationId xmlns:a16="http://schemas.microsoft.com/office/drawing/2014/main" id="{93037999-CB6F-A97D-C6F7-E4CF11AB562A}"/>
+                    </a:ext>
+                  </a:extLst>
+                </p14:cNvPr>
+                <p14:cNvContentPartPr/>
+                <p14:nvPr/>
+              </p14:nvContentPartPr>
+              <p14:xfrm>
+                <a:off x="5909976" y="2200560"/>
+                <a:ext cx="228600" cy="351720"/>
+              </p14:xfrm>
+            </p:contentPart>
+          </mc:Choice>
+          <mc:Fallback>
+            <p:pic>
+              <p:nvPicPr>
+                <p:cNvPr id="14" name="Ink 13">
+                  <a:extLst>
+                    <a:ext uri="{FF2B5EF4-FFF2-40B4-BE49-F238E27FC236}">
+                      <a16:creationId xmlns:a16="http://schemas.microsoft.com/office/drawing/2014/main" id="{93037999-CB6F-A97D-C6F7-E4CF11AB562A}"/>
+                    </a:ext>
+                  </a:extLst>
+                </p:cNvPr>
+                <p:cNvPicPr/>
+                <p:nvPr/>
+              </p:nvPicPr>
+              <p:blipFill>
+                <a:blip r:embed="rId6"/>
+                <a:stretch>
+                  <a:fillRect/>
+                </a:stretch>
+              </p:blipFill>
+              <p:spPr>
+                <a:xfrm>
+                  <a:off x="5903856" y="2194440"/>
+                  <a:ext cx="240840" cy="363960"/>
+                </a:xfrm>
+                <a:prstGeom prst="rect">
+                  <a:avLst/>
+                </a:prstGeom>
+              </p:spPr>
+            </p:pic>
+          </mc:Fallback>
+        </mc:AlternateContent>
+        <mc:AlternateContent xmlns:mc="http://schemas.openxmlformats.org/markup-compatibility/2006">
+          <mc:Choice xmlns:p14="http://schemas.microsoft.com/office/powerpoint/2010/main" Requires="p14">
+            <p:contentPart p14:bwMode="auto" r:id="rId7">
+              <p14:nvContentPartPr>
+                <p14:cNvPr id="15" name="Ink 14">
+                  <a:extLst>
+                    <a:ext uri="{FF2B5EF4-FFF2-40B4-BE49-F238E27FC236}">
+                      <a16:creationId xmlns:a16="http://schemas.microsoft.com/office/drawing/2014/main" id="{37958E6B-E5C7-E3D4-1CA1-77D93203AB84}"/>
+                    </a:ext>
+                  </a:extLst>
+                </p14:cNvPr>
+                <p14:cNvContentPartPr/>
+                <p14:nvPr/>
+              </p14:nvContentPartPr>
+              <p14:xfrm>
+                <a:off x="6480216" y="2169960"/>
+                <a:ext cx="217080" cy="489600"/>
+              </p14:xfrm>
+            </p:contentPart>
+          </mc:Choice>
+          <mc:Fallback>
+            <p:pic>
+              <p:nvPicPr>
+                <p:cNvPr id="15" name="Ink 14">
+                  <a:extLst>
+                    <a:ext uri="{FF2B5EF4-FFF2-40B4-BE49-F238E27FC236}">
+                      <a16:creationId xmlns:a16="http://schemas.microsoft.com/office/drawing/2014/main" id="{37958E6B-E5C7-E3D4-1CA1-77D93203AB84}"/>
+                    </a:ext>
+                  </a:extLst>
+                </p:cNvPr>
+                <p:cNvPicPr/>
+                <p:nvPr/>
+              </p:nvPicPr>
+              <p:blipFill>
+                <a:blip r:embed="rId8"/>
+                <a:stretch>
+                  <a:fillRect/>
+                </a:stretch>
+              </p:blipFill>
+              <p:spPr>
+                <a:xfrm>
+                  <a:off x="6474096" y="2163840"/>
+                  <a:ext cx="229320" cy="501840"/>
+                </a:xfrm>
+                <a:prstGeom prst="rect">
+                  <a:avLst/>
+                </a:prstGeom>
+              </p:spPr>
+            </p:pic>
+          </mc:Fallback>
+        </mc:AlternateContent>
+        <mc:AlternateContent xmlns:mc="http://schemas.openxmlformats.org/markup-compatibility/2006">
+          <mc:Choice xmlns:p14="http://schemas.microsoft.com/office/powerpoint/2010/main" Requires="p14">
+            <p:contentPart p14:bwMode="auto" r:id="rId9">
+              <p14:nvContentPartPr>
+                <p14:cNvPr id="16" name="Ink 15">
+                  <a:extLst>
+                    <a:ext uri="{FF2B5EF4-FFF2-40B4-BE49-F238E27FC236}">
+                      <a16:creationId xmlns:a16="http://schemas.microsoft.com/office/drawing/2014/main" id="{BB383934-AFF8-782E-3A93-4C22E341FBFA}"/>
+                    </a:ext>
+                  </a:extLst>
+                </p14:cNvPr>
+                <p14:cNvContentPartPr/>
+                <p14:nvPr/>
+              </p14:nvContentPartPr>
+              <p14:xfrm>
+                <a:off x="7003296" y="2419800"/>
+                <a:ext cx="464400" cy="428760"/>
+              </p14:xfrm>
+            </p:contentPart>
+          </mc:Choice>
+          <mc:Fallback>
+            <p:pic>
+              <p:nvPicPr>
+                <p:cNvPr id="16" name="Ink 15">
+                  <a:extLst>
+                    <a:ext uri="{FF2B5EF4-FFF2-40B4-BE49-F238E27FC236}">
+                      <a16:creationId xmlns:a16="http://schemas.microsoft.com/office/drawing/2014/main" id="{BB383934-AFF8-782E-3A93-4C22E341FBFA}"/>
+                    </a:ext>
+                  </a:extLst>
+                </p:cNvPr>
+                <p:cNvPicPr/>
+                <p:nvPr/>
+              </p:nvPicPr>
+              <p:blipFill>
+                <a:blip r:embed="rId10"/>
+                <a:stretch>
+                  <a:fillRect/>
+                </a:stretch>
+              </p:blipFill>
+              <p:spPr>
+                <a:xfrm>
+                  <a:off x="6997176" y="2413680"/>
+                  <a:ext cx="476640" cy="441000"/>
+                </a:xfrm>
+                <a:prstGeom prst="rect">
+                  <a:avLst/>
+                </a:prstGeom>
+              </p:spPr>
+            </p:pic>
+          </mc:Fallback>
+        </mc:AlternateContent>
+        <mc:AlternateContent xmlns:mc="http://schemas.openxmlformats.org/markup-compatibility/2006">
+          <mc:Choice xmlns:p14="http://schemas.microsoft.com/office/powerpoint/2010/main" Requires="p14">
+            <p:contentPart p14:bwMode="auto" r:id="rId11">
+              <p14:nvContentPartPr>
+                <p14:cNvPr id="17" name="Ink 16">
+                  <a:extLst>
+                    <a:ext uri="{FF2B5EF4-FFF2-40B4-BE49-F238E27FC236}">
+                      <a16:creationId xmlns:a16="http://schemas.microsoft.com/office/drawing/2014/main" id="{B2E4BA31-AB73-8B11-1D5D-BEB0C7295453}"/>
+                    </a:ext>
+                  </a:extLst>
+                </p14:cNvPr>
+                <p14:cNvContentPartPr/>
+                <p14:nvPr/>
+              </p14:nvContentPartPr>
+              <p14:xfrm>
+                <a:off x="6777576" y="3039720"/>
+                <a:ext cx="329760" cy="275400"/>
+              </p14:xfrm>
+            </p:contentPart>
+          </mc:Choice>
+          <mc:Fallback>
+            <p:pic>
+              <p:nvPicPr>
+                <p:cNvPr id="17" name="Ink 16">
+                  <a:extLst>
+                    <a:ext uri="{FF2B5EF4-FFF2-40B4-BE49-F238E27FC236}">
+                      <a16:creationId xmlns:a16="http://schemas.microsoft.com/office/drawing/2014/main" id="{B2E4BA31-AB73-8B11-1D5D-BEB0C7295453}"/>
+                    </a:ext>
+                  </a:extLst>
+                </p:cNvPr>
+                <p:cNvPicPr/>
+                <p:nvPr/>
+              </p:nvPicPr>
+              <p:blipFill>
+                <a:blip r:embed="rId12"/>
+                <a:stretch>
+                  <a:fillRect/>
+                </a:stretch>
+              </p:blipFill>
+              <p:spPr>
+                <a:xfrm>
+                  <a:off x="6771456" y="3033600"/>
+                  <a:ext cx="342000" cy="287640"/>
+                </a:xfrm>
+                <a:prstGeom prst="rect">
+                  <a:avLst/>
+                </a:prstGeom>
+              </p:spPr>
+            </p:pic>
+          </mc:Fallback>
+        </mc:AlternateContent>
+        <mc:AlternateContent xmlns:mc="http://schemas.openxmlformats.org/markup-compatibility/2006">
+          <mc:Choice xmlns:p14="http://schemas.microsoft.com/office/powerpoint/2010/main" Requires="p14">
+            <p:contentPart p14:bwMode="auto" r:id="rId13">
+              <p14:nvContentPartPr>
+                <p14:cNvPr id="19" name="Ink 18">
+                  <a:extLst>
+                    <a:ext uri="{FF2B5EF4-FFF2-40B4-BE49-F238E27FC236}">
+                      <a16:creationId xmlns:a16="http://schemas.microsoft.com/office/drawing/2014/main" id="{B0F965E6-0252-4535-08F0-2AD080F99C03}"/>
+                    </a:ext>
+                  </a:extLst>
+                </p14:cNvPr>
+                <p14:cNvContentPartPr/>
+                <p14:nvPr/>
+              </p14:nvContentPartPr>
+              <p14:xfrm>
+                <a:off x="6181416" y="3109920"/>
+                <a:ext cx="199080" cy="340920"/>
+              </p14:xfrm>
+            </p:contentPart>
+          </mc:Choice>
+          <mc:Fallback>
+            <p:pic>
+              <p:nvPicPr>
+                <p:cNvPr id="19" name="Ink 18">
+                  <a:extLst>
+                    <a:ext uri="{FF2B5EF4-FFF2-40B4-BE49-F238E27FC236}">
+                      <a16:creationId xmlns:a16="http://schemas.microsoft.com/office/drawing/2014/main" id="{B0F965E6-0252-4535-08F0-2AD080F99C03}"/>
+                    </a:ext>
+                  </a:extLst>
+                </p:cNvPr>
+                <p:cNvPicPr/>
+                <p:nvPr/>
+              </p:nvPicPr>
+              <p:blipFill>
+                <a:blip r:embed="rId14"/>
+                <a:stretch>
+                  <a:fillRect/>
+                </a:stretch>
+              </p:blipFill>
+              <p:spPr>
+                <a:xfrm>
+                  <a:off x="6175296" y="3103800"/>
+                  <a:ext cx="211320" cy="353160"/>
+                </a:xfrm>
+                <a:prstGeom prst="rect">
+                  <a:avLst/>
+                </a:prstGeom>
+              </p:spPr>
+            </p:pic>
+          </mc:Fallback>
+        </mc:AlternateContent>
+        <mc:AlternateContent xmlns:mc="http://schemas.openxmlformats.org/markup-compatibility/2006">
+          <mc:Choice xmlns:p14="http://schemas.microsoft.com/office/powerpoint/2010/main" Requires="p14">
+            <p:contentPart p14:bwMode="auto" r:id="rId15">
+              <p14:nvContentPartPr>
+                <p14:cNvPr id="21" name="Ink 20">
+                  <a:extLst>
+                    <a:ext uri="{FF2B5EF4-FFF2-40B4-BE49-F238E27FC236}">
+                      <a16:creationId xmlns:a16="http://schemas.microsoft.com/office/drawing/2014/main" id="{66D28C72-1FC1-AF1F-3338-16C77CFBA1C2}"/>
+                    </a:ext>
+                  </a:extLst>
+                </p14:cNvPr>
+                <p14:cNvContentPartPr/>
+                <p14:nvPr/>
+              </p14:nvContentPartPr>
+              <p14:xfrm>
+                <a:off x="5263776" y="2608800"/>
+                <a:ext cx="589680" cy="268560"/>
+              </p14:xfrm>
+            </p:contentPart>
+          </mc:Choice>
+          <mc:Fallback>
+            <p:pic>
+              <p:nvPicPr>
+                <p:cNvPr id="21" name="Ink 20">
+                  <a:extLst>
+                    <a:ext uri="{FF2B5EF4-FFF2-40B4-BE49-F238E27FC236}">
+                      <a16:creationId xmlns:a16="http://schemas.microsoft.com/office/drawing/2014/main" id="{66D28C72-1FC1-AF1F-3338-16C77CFBA1C2}"/>
+                    </a:ext>
+                  </a:extLst>
+                </p:cNvPr>
+                <p:cNvPicPr/>
+                <p:nvPr/>
+              </p:nvPicPr>
+              <p:blipFill>
+                <a:blip r:embed="rId16"/>
+                <a:stretch>
+                  <a:fillRect/>
+                </a:stretch>
+              </p:blipFill>
+              <p:spPr>
+                <a:xfrm>
+                  <a:off x="5257656" y="2602680"/>
+                  <a:ext cx="601920" cy="280800"/>
+                </a:xfrm>
+                <a:prstGeom prst="rect">
+                  <a:avLst/>
+                </a:prstGeom>
+              </p:spPr>
+            </p:pic>
+          </mc:Fallback>
+        </mc:AlternateContent>
+        <mc:AlternateContent xmlns:mc="http://schemas.openxmlformats.org/markup-compatibility/2006">
+          <mc:Choice xmlns:p14="http://schemas.microsoft.com/office/powerpoint/2010/main" Requires="p14">
+            <p:contentPart p14:bwMode="auto" r:id="rId17">
+              <p14:nvContentPartPr>
+                <p14:cNvPr id="22" name="Ink 21">
+                  <a:extLst>
+                    <a:ext uri="{FF2B5EF4-FFF2-40B4-BE49-F238E27FC236}">
+                      <a16:creationId xmlns:a16="http://schemas.microsoft.com/office/drawing/2014/main" id="{C75A1093-D93D-941C-AD3D-AB9B594E6479}"/>
+                    </a:ext>
+                  </a:extLst>
+                </p14:cNvPr>
+                <p14:cNvContentPartPr/>
+                <p14:nvPr/>
+              </p14:nvContentPartPr>
+              <p14:xfrm>
+                <a:off x="5919336" y="2194440"/>
+                <a:ext cx="226080" cy="390600"/>
+              </p14:xfrm>
+            </p:contentPart>
+          </mc:Choice>
+          <mc:Fallback>
+            <p:pic>
+              <p:nvPicPr>
+                <p:cNvPr id="22" name="Ink 21">
+                  <a:extLst>
+                    <a:ext uri="{FF2B5EF4-FFF2-40B4-BE49-F238E27FC236}">
+                      <a16:creationId xmlns:a16="http://schemas.microsoft.com/office/drawing/2014/main" id="{C75A1093-D93D-941C-AD3D-AB9B594E6479}"/>
+                    </a:ext>
+                  </a:extLst>
+                </p:cNvPr>
+                <p:cNvPicPr/>
+                <p:nvPr/>
+              </p:nvPicPr>
+              <p:blipFill>
+                <a:blip r:embed="rId18"/>
+                <a:stretch>
+                  <a:fillRect/>
+                </a:stretch>
+              </p:blipFill>
+              <p:spPr>
+                <a:xfrm>
+                  <a:off x="5913216" y="2188320"/>
+                  <a:ext cx="238320" cy="402840"/>
+                </a:xfrm>
+                <a:prstGeom prst="rect">
+                  <a:avLst/>
+                </a:prstGeom>
+              </p:spPr>
+            </p:pic>
+          </mc:Fallback>
+        </mc:AlternateContent>
+      </p:grpSp>
+      <mc:AlternateContent xmlns:mc="http://schemas.openxmlformats.org/markup-compatibility/2006">
+        <mc:Choice xmlns:p14="http://schemas.microsoft.com/office/powerpoint/2010/main" Requires="p14">
+          <p:contentPart p14:bwMode="auto" r:id="rId19">
+            <p14:nvContentPartPr>
+              <p14:cNvPr id="25" name="Ink 24">
+                <a:extLst>
+                  <a:ext uri="{FF2B5EF4-FFF2-40B4-BE49-F238E27FC236}">
+                    <a16:creationId xmlns:a16="http://schemas.microsoft.com/office/drawing/2014/main" id="{D9269CDF-FC56-4D36-1ED7-FA62BA13A975}"/>
+                  </a:ext>
+                </a:extLst>
+              </p14:cNvPr>
+              <p14:cNvContentPartPr/>
+              <p14:nvPr/>
+            </p14:nvContentPartPr>
+            <p14:xfrm>
+              <a:off x="6500016" y="2169600"/>
+              <a:ext cx="185040" cy="488880"/>
+            </p14:xfrm>
+          </p:contentPart>
+        </mc:Choice>
+        <mc:Fallback>
+          <p:pic>
+            <p:nvPicPr>
+              <p:cNvPr id="25" name="Ink 24">
+                <a:extLst>
+                  <a:ext uri="{FF2B5EF4-FFF2-40B4-BE49-F238E27FC236}">
+                    <a16:creationId xmlns:a16="http://schemas.microsoft.com/office/drawing/2014/main" id="{D9269CDF-FC56-4D36-1ED7-FA62BA13A975}"/>
+                  </a:ext>
+                </a:extLst>
+              </p:cNvPr>
+              <p:cNvPicPr/>
+              <p:nvPr/>
+            </p:nvPicPr>
+            <p:blipFill>
+              <a:blip r:embed="rId20"/>
+              <a:stretch>
+                <a:fillRect/>
+              </a:stretch>
+            </p:blipFill>
+            <p:spPr>
+              <a:xfrm>
+                <a:off x="6493896" y="2163480"/>
+                <a:ext cx="197280" cy="501120"/>
+              </a:xfrm>
+              <a:prstGeom prst="rect">
+                <a:avLst/>
+              </a:prstGeom>
+            </p:spPr>
+          </p:pic>
+        </mc:Fallback>
+      </mc:AlternateContent>
+      <mc:AlternateContent xmlns:mc="http://schemas.openxmlformats.org/markup-compatibility/2006">
+        <mc:Choice xmlns:p14="http://schemas.microsoft.com/office/powerpoint/2010/main" Requires="p14">
+          <p:contentPart p14:bwMode="auto" r:id="rId21">
+            <p14:nvContentPartPr>
+              <p14:cNvPr id="26" name="Ink 25">
+                <a:extLst>
+                  <a:ext uri="{FF2B5EF4-FFF2-40B4-BE49-F238E27FC236}">
+                    <a16:creationId xmlns:a16="http://schemas.microsoft.com/office/drawing/2014/main" id="{1240769C-D154-B1AA-D83D-A0D17733F975}"/>
+                  </a:ext>
+                </a:extLst>
+              </p14:cNvPr>
+              <p14:cNvContentPartPr/>
+              <p14:nvPr/>
+            </p14:nvContentPartPr>
+            <p14:xfrm>
+              <a:off x="6802416" y="3028920"/>
+              <a:ext cx="140040" cy="135000"/>
+            </p14:xfrm>
+          </p:contentPart>
+        </mc:Choice>
+        <mc:Fallback>
+          <p:pic>
+            <p:nvPicPr>
+              <p:cNvPr id="26" name="Ink 25">
+                <a:extLst>
+                  <a:ext uri="{FF2B5EF4-FFF2-40B4-BE49-F238E27FC236}">
+                    <a16:creationId xmlns:a16="http://schemas.microsoft.com/office/drawing/2014/main" id="{1240769C-D154-B1AA-D83D-A0D17733F975}"/>
+                  </a:ext>
+                </a:extLst>
+              </p:cNvPr>
+              <p:cNvPicPr/>
+              <p:nvPr/>
+            </p:nvPicPr>
+            <p:blipFill>
+              <a:blip r:embed="rId22"/>
+              <a:stretch>
+                <a:fillRect/>
+              </a:stretch>
+            </p:blipFill>
+            <p:spPr>
+              <a:xfrm>
+                <a:off x="6796296" y="3022800"/>
+                <a:ext cx="152280" cy="147240"/>
+              </a:xfrm>
+              <a:prstGeom prst="rect">
+                <a:avLst/>
+              </a:prstGeom>
+            </p:spPr>
+          </p:pic>
+        </mc:Fallback>
+      </mc:AlternateContent>
     </p:spTree>
     <p:extLst>
       <p:ext uri="{BB962C8B-B14F-4D97-AF65-F5344CB8AC3E}">
-        <p14:creationId xmlns:p14="http://schemas.microsoft.com/office/powerpoint/2010/main" val="3626636867"/>
+        <p14:creationId xmlns:p14="http://schemas.microsoft.com/office/powerpoint/2010/main" val="1361209070"/>
       </p:ext>
     </p:extLst>
   </p:cSld>
@@ -11211,7 +12035,7 @@
             </a:br>
             <a:r>
               <a:rPr lang="en-GB" dirty="0"/>
-              <a:t>Make it yours</a:t>
+              <a:t>MY first shiny app</a:t>
             </a:r>
             <a:endParaRPr lang="nl-NL" dirty="0"/>
           </a:p>
@@ -11245,90 +12069,30 @@
           <a:p>
             <a:r>
               <a:rPr lang="en-GB" dirty="0"/>
-              <a:t>Keep it simple</a:t>
+              <a:t>Change lines 51-52 to:</a:t>
+            </a:r>
+          </a:p>
+          <a:p>
+            <a:endParaRPr lang="en-US" dirty="0"/>
+          </a:p>
+          <a:p>
+            <a:endParaRPr lang="en-US" dirty="0"/>
+          </a:p>
+          <a:p>
+            <a:endParaRPr lang="en-US" dirty="0"/>
+          </a:p>
+          <a:p>
+            <a:r>
+              <a:rPr lang="en-US" dirty="0"/>
+              <a:t>Restart the app</a:t>
             </a:r>
           </a:p>
           <a:p>
             <a:pPr lvl="1"/>
             <a:r>
-              <a:rPr lang="en-GB" sz="2000" dirty="0"/>
-              <a:t>Stick to a basic use case – you can add complexity later</a:t>
-            </a:r>
-          </a:p>
-          <a:p>
-            <a:r>
-              <a:rPr lang="en-GB" dirty="0"/>
-              <a:t>Load any data you need</a:t>
-            </a:r>
-          </a:p>
-          <a:p>
-            <a:r>
-              <a:rPr lang="en-GB" dirty="0"/>
-              <a:t>UI</a:t>
-            </a:r>
-          </a:p>
-          <a:p>
-            <a:pPr lvl="1"/>
-            <a:r>
-              <a:rPr lang="en-GB" dirty="0"/>
-              <a:t>Add/change inputs &amp; outputs</a:t>
-            </a:r>
-          </a:p>
-          <a:p>
-            <a:pPr lvl="2"/>
-            <a:r>
-              <a:rPr lang="en-GB" sz="1600" dirty="0">
-                <a:latin typeface="FuraCode Nerd Font" panose="020B0509050000020004" pitchFamily="50" charset="0"/>
-                <a:ea typeface="FuraCode Nerd Font" panose="020B0509050000020004" pitchFamily="50" charset="0"/>
-              </a:rPr>
-              <a:t>[xxx]Input(..), [xxx]Output(..)</a:t>
-            </a:r>
-          </a:p>
-          <a:p>
-            <a:pPr lvl="1"/>
-            <a:r>
-              <a:rPr lang="en-GB" dirty="0"/>
-              <a:t>Change layout, labels, texts</a:t>
-            </a:r>
-          </a:p>
-          <a:p>
-            <a:r>
-              <a:rPr lang="en-GB" dirty="0"/>
-              <a:t>Server</a:t>
-            </a:r>
-          </a:p>
-          <a:p>
-            <a:pPr lvl="1"/>
-            <a:r>
-              <a:rPr lang="en-GB" dirty="0"/>
-              <a:t>Create an output for your analysis/visualization</a:t>
-            </a:r>
-          </a:p>
-          <a:p>
-            <a:pPr lvl="2"/>
-            <a:r>
-              <a:rPr lang="en-GB" sz="1600" dirty="0">
-                <a:latin typeface="FuraCode Nerd Font" panose="020B0509050000020004" pitchFamily="50" charset="0"/>
-                <a:ea typeface="FuraCode Nerd Font" panose="020B0509050000020004" pitchFamily="50" charset="0"/>
-              </a:rPr>
-              <a:t>render[xxx](..)</a:t>
-            </a:r>
-          </a:p>
-          <a:p>
-            <a:pPr marL="457200" lvl="1" indent="0">
-              <a:buNone/>
-            </a:pPr>
-            <a:endParaRPr lang="en-GB" dirty="0">
-              <a:latin typeface="FuraCode Nerd Font" panose="020B0509050000020004" pitchFamily="50" charset="0"/>
-              <a:ea typeface="FuraCode Nerd Font" panose="020B0509050000020004" pitchFamily="50" charset="0"/>
-            </a:endParaRPr>
-          </a:p>
-          <a:p>
-            <a:pPr lvl="1"/>
-            <a:endParaRPr lang="en-GB" dirty="0"/>
-          </a:p>
-          <a:p>
-            <a:endParaRPr lang="en-GB" dirty="0"/>
+              <a:rPr lang="en-US" dirty="0"/>
+              <a:t>Change the input, see the output update.</a:t>
+            </a:r>
           </a:p>
         </p:txBody>
       </p:sp>
@@ -11355,7 +12119,7 @@
           <a:p>
             <a:r>
               <a:rPr lang="en-GB" dirty="0"/>
-              <a:t>24/10/2022</a:t>
+              <a:t>3/6/2022</a:t>
             </a:r>
             <a:endParaRPr lang="en-NL" dirty="0"/>
           </a:p>
@@ -11390,119 +12154,595 @@
           </a:p>
         </p:txBody>
       </p:sp>
-      <p:sp>
-        <p:nvSpPr>
-          <p:cNvPr id="12" name="TextBox 11">
-            <a:extLst>
-              <a:ext uri="{FF2B5EF4-FFF2-40B4-BE49-F238E27FC236}">
-                <a16:creationId xmlns:a16="http://schemas.microsoft.com/office/drawing/2014/main" id="{0E71A3FC-D42C-4F36-AB75-CDAEF3341FAA}"/>
-              </a:ext>
-            </a:extLst>
-          </p:cNvPr>
-          <p:cNvSpPr txBox="1"/>
+      <p:pic>
+        <p:nvPicPr>
+          <p:cNvPr id="8" name="Picture 7">
+            <a:extLst>
+              <a:ext uri="{FF2B5EF4-FFF2-40B4-BE49-F238E27FC236}">
+                <a16:creationId xmlns:a16="http://schemas.microsoft.com/office/drawing/2014/main" id="{4670703B-CC38-8881-122A-D36394A9EC8C}"/>
+              </a:ext>
+            </a:extLst>
+          </p:cNvPr>
+          <p:cNvPicPr>
+            <a:picLocks noChangeAspect="1"/>
+          </p:cNvPicPr>
           <p:nvPr/>
-        </p:nvSpPr>
+        </p:nvPicPr>
+        <p:blipFill>
+          <a:blip r:embed="rId2"/>
+          <a:stretch>
+            <a:fillRect/>
+          </a:stretch>
+        </p:blipFill>
         <p:spPr>
           <a:xfrm>
-            <a:off x="5074397" y="196909"/>
-            <a:ext cx="7051701" cy="830997"/>
+            <a:off x="1265581" y="2656470"/>
+            <a:ext cx="8463635" cy="887951"/>
           </a:xfrm>
           <a:prstGeom prst="rect">
             <a:avLst/>
           </a:prstGeom>
-          <a:noFill/>
         </p:spPr>
-        <p:txBody>
-          <a:bodyPr wrap="square" rtlCol="0">
-            <a:spAutoFit/>
-          </a:bodyPr>
-          <a:lstStyle/>
-          <a:p>
-            <a:pPr algn="ctr"/>
-            <a:r>
-              <a:rPr lang="en-GB" sz="2400" b="1" dirty="0">
-                <a:solidFill>
-                  <a:schemeClr val="bg1"/>
-                </a:solidFill>
-                <a:latin typeface="Ink Free" panose="03080402000500000000" pitchFamily="66" charset="0"/>
-              </a:rPr>
-              <a:t>Cheat sheets are your </a:t>
-            </a:r>
-            <a:r>
-              <a:rPr lang="en-GB" sz="2400" b="1" u="sng" dirty="0">
-                <a:solidFill>
-                  <a:schemeClr val="bg1"/>
-                </a:solidFill>
-                <a:latin typeface="Ink Free" panose="03080402000500000000" pitchFamily="66" charset="0"/>
-              </a:rPr>
-              <a:t>friend</a:t>
-            </a:r>
-            <a:br>
-              <a:rPr lang="en-GB" sz="2400" b="1" dirty="0">
-                <a:solidFill>
-                  <a:schemeClr val="bg1"/>
-                </a:solidFill>
-                <a:latin typeface="Ink Free" panose="03080402000500000000" pitchFamily="66" charset="0"/>
-              </a:rPr>
-            </a:br>
-            <a:r>
-              <a:rPr lang="en-GB" sz="2400" b="1" dirty="0">
-                <a:solidFill>
-                  <a:schemeClr val="accent1"/>
-                </a:solidFill>
-                <a:latin typeface="Ink Free" panose="03080402000500000000" pitchFamily="66" charset="0"/>
-              </a:rPr>
-              <a:t>Help </a:t>
-            </a:r>
-            <a:r>
-              <a:rPr lang="en-GB" sz="2400" b="1" dirty="0">
-                <a:solidFill>
-                  <a:schemeClr val="bg1"/>
-                </a:solidFill>
-                <a:latin typeface="Ink Free" panose="03080402000500000000" pitchFamily="66" charset="0"/>
-              </a:rPr>
-              <a:t>&gt;</a:t>
-            </a:r>
-            <a:r>
-              <a:rPr lang="en-GB" sz="2400" b="1" dirty="0">
-                <a:solidFill>
-                  <a:schemeClr val="accent1"/>
-                </a:solidFill>
-                <a:latin typeface="Ink Free" panose="03080402000500000000" pitchFamily="66" charset="0"/>
-              </a:rPr>
-              <a:t> Cheat Sheets </a:t>
-            </a:r>
-            <a:r>
-              <a:rPr lang="en-GB" sz="2400" b="1" dirty="0">
-                <a:solidFill>
-                  <a:schemeClr val="bg1"/>
-                </a:solidFill>
-                <a:latin typeface="Ink Free" panose="03080402000500000000" pitchFamily="66" charset="0"/>
-              </a:rPr>
-              <a:t>&gt;</a:t>
-            </a:r>
-            <a:r>
-              <a:rPr lang="en-GB" sz="2400" b="1" dirty="0">
-                <a:solidFill>
-                  <a:schemeClr val="accent1"/>
-                </a:solidFill>
-                <a:latin typeface="Ink Free" panose="03080402000500000000" pitchFamily="66" charset="0"/>
-              </a:rPr>
-              <a:t> Web applications with Shiny</a:t>
-            </a:r>
-            <a:endParaRPr lang="nl-NL" sz="2400" b="1" dirty="0">
-              <a:solidFill>
-                <a:schemeClr val="accent1"/>
-              </a:solidFill>
-              <a:latin typeface="Ink Free" panose="03080402000500000000" pitchFamily="66" charset="0"/>
-            </a:endParaRPr>
-          </a:p>
-        </p:txBody>
-      </p:sp>
+      </p:pic>
     </p:spTree>
     <p:extLst>
       <p:ext uri="{BB962C8B-B14F-4D97-AF65-F5344CB8AC3E}">
-        <p14:creationId xmlns:p14="http://schemas.microsoft.com/office/powerpoint/2010/main" val="2943126073"/>
+        <p14:creationId xmlns:p14="http://schemas.microsoft.com/office/powerpoint/2010/main" val="776796449"/>
+      </p:ext>
+    </p:extLst>
+  </p:cSld>
+  <p:clrMapOvr>
+    <a:masterClrMapping/>
+  </p:clrMapOvr>
+</p:sld>
+</file>
+
+<file path=ppt/slides/slide19.xml><?xml version="1.0" encoding="utf-8"?>
+<p:sld xmlns:a="http://schemas.openxmlformats.org/drawingml/2006/main" xmlns:r="http://schemas.openxmlformats.org/officeDocument/2006/relationships" xmlns:p="http://schemas.openxmlformats.org/presentationml/2006/main">
+  <p:cSld>
+    <p:spTree>
+      <p:nvGrpSpPr>
+        <p:cNvPr id="1" name=""/>
+        <p:cNvGrpSpPr/>
+        <p:nvPr/>
+      </p:nvGrpSpPr>
+      <p:grpSpPr>
+        <a:xfrm>
+          <a:off x="0" y="0"/>
+          <a:ext cx="0" cy="0"/>
+          <a:chOff x="0" y="0"/>
+          <a:chExt cx="0" cy="0"/>
+        </a:xfrm>
+      </p:grpSpPr>
+      <p:sp>
+        <p:nvSpPr>
+          <p:cNvPr id="2" name="Title 1">
+            <a:extLst>
+              <a:ext uri="{FF2B5EF4-FFF2-40B4-BE49-F238E27FC236}">
+                <a16:creationId xmlns:a16="http://schemas.microsoft.com/office/drawing/2014/main" id="{DC65E524-C514-45D7-BC6C-D11A108C5A11}"/>
+              </a:ext>
+            </a:extLst>
+          </p:cNvPr>
+          <p:cNvSpPr>
+            <a:spLocks noGrp="1"/>
+          </p:cNvSpPr>
+          <p:nvPr>
+            <p:ph type="title"/>
+          </p:nvPr>
+        </p:nvSpPr>
+        <p:spPr/>
+        <p:txBody>
+          <a:bodyPr/>
+          <a:lstStyle/>
+          <a:p>
+            <a:r>
+              <a:rPr lang="en-GB" sz="2000" dirty="0"/>
+              <a:t>Hello, world!</a:t>
+            </a:r>
+            <a:br>
+              <a:rPr lang="en-GB" dirty="0"/>
+            </a:br>
+            <a:r>
+              <a:rPr lang="en-GB" dirty="0"/>
+              <a:t>my first shiny app</a:t>
+            </a:r>
+            <a:endParaRPr lang="nl-NL" dirty="0"/>
+          </a:p>
+        </p:txBody>
+      </p:sp>
+      <p:sp>
+        <p:nvSpPr>
+          <p:cNvPr id="3" name="Content Placeholder 2">
+            <a:extLst>
+              <a:ext uri="{FF2B5EF4-FFF2-40B4-BE49-F238E27FC236}">
+                <a16:creationId xmlns:a16="http://schemas.microsoft.com/office/drawing/2014/main" id="{53955285-5F23-4DBC-8F2C-B5AF06D4975D}"/>
+              </a:ext>
+            </a:extLst>
+          </p:cNvPr>
+          <p:cNvSpPr>
+            <a:spLocks noGrp="1"/>
+          </p:cNvSpPr>
+          <p:nvPr>
+            <p:ph sz="half" idx="1"/>
+          </p:nvPr>
+        </p:nvSpPr>
+        <p:spPr>
+          <a:xfrm>
+            <a:off x="1265581" y="1825624"/>
+            <a:ext cx="10515600" cy="4395881"/>
+          </a:xfrm>
+        </p:spPr>
+        <p:txBody>
+          <a:bodyPr/>
+          <a:lstStyle/>
+          <a:p>
+            <a:r>
+              <a:rPr lang="en-US" dirty="0"/>
+              <a:t>UI</a:t>
+            </a:r>
+          </a:p>
+          <a:p>
+            <a:pPr marL="457200" lvl="1" indent="0">
+              <a:buNone/>
+            </a:pPr>
+            <a:r>
+              <a:rPr lang="en-US" sz="2000" dirty="0">
+                <a:solidFill>
+                  <a:schemeClr val="accent6">
+                    <a:lumMod val="75000"/>
+                  </a:schemeClr>
+                </a:solidFill>
+                <a:latin typeface="FuraCode Nerd Font Mono" panose="020B0509050000020004" pitchFamily="50" charset="0"/>
+                <a:ea typeface="FuraCode Nerd Font Mono" panose="020B0509050000020004" pitchFamily="50" charset="0"/>
+              </a:rPr>
+              <a:t>- </a:t>
+            </a:r>
+            <a:r>
+              <a:rPr lang="en-US" sz="2000" dirty="0" err="1">
+                <a:solidFill>
+                  <a:schemeClr val="accent6">
+                    <a:lumMod val="75000"/>
+                  </a:schemeClr>
+                </a:solidFill>
+                <a:latin typeface="FuraCode Nerd Font Mono" panose="020B0509050000020004" pitchFamily="50" charset="0"/>
+                <a:ea typeface="FuraCode Nerd Font Mono" panose="020B0509050000020004" pitchFamily="50" charset="0"/>
+              </a:rPr>
+              <a:t>sliderInput</a:t>
+            </a:r>
+            <a:r>
+              <a:rPr lang="en-US" sz="2000" dirty="0">
+                <a:solidFill>
+                  <a:schemeClr val="accent6">
+                    <a:lumMod val="75000"/>
+                  </a:schemeClr>
+                </a:solidFill>
+                <a:latin typeface="FuraCode Nerd Font Mono" panose="020B0509050000020004" pitchFamily="50" charset="0"/>
+                <a:ea typeface="FuraCode Nerd Font Mono" panose="020B0509050000020004" pitchFamily="50" charset="0"/>
+              </a:rPr>
+              <a:t>(“bins”, …)</a:t>
+            </a:r>
+          </a:p>
+          <a:p>
+            <a:pPr marL="457200" lvl="1" indent="0">
+              <a:buNone/>
+            </a:pPr>
+            <a:r>
+              <a:rPr lang="en-US" sz="2000" dirty="0">
+                <a:solidFill>
+                  <a:schemeClr val="accent4">
+                    <a:lumMod val="75000"/>
+                  </a:schemeClr>
+                </a:solidFill>
+                <a:latin typeface="FuraCode Nerd Font Mono" panose="020B0509050000020004" pitchFamily="50" charset="0"/>
+                <a:ea typeface="FuraCode Nerd Font Mono" panose="020B0509050000020004" pitchFamily="50" charset="0"/>
+              </a:rPr>
+              <a:t>+ </a:t>
+            </a:r>
+            <a:r>
+              <a:rPr lang="en-US" sz="2000" dirty="0" err="1">
+                <a:solidFill>
+                  <a:schemeClr val="accent4">
+                    <a:lumMod val="75000"/>
+                  </a:schemeClr>
+                </a:solidFill>
+                <a:latin typeface="FuraCode Nerd Font Mono" panose="020B0509050000020004" pitchFamily="50" charset="0"/>
+                <a:ea typeface="FuraCode Nerd Font Mono" panose="020B0509050000020004" pitchFamily="50" charset="0"/>
+              </a:rPr>
+              <a:t>textInput</a:t>
+            </a:r>
+            <a:r>
+              <a:rPr lang="en-US" sz="2000" dirty="0">
+                <a:solidFill>
+                  <a:schemeClr val="accent4">
+                    <a:lumMod val="75000"/>
+                  </a:schemeClr>
+                </a:solidFill>
+                <a:latin typeface="FuraCode Nerd Font Mono" panose="020B0509050000020004" pitchFamily="50" charset="0"/>
+                <a:ea typeface="FuraCode Nerd Font Mono" panose="020B0509050000020004" pitchFamily="50" charset="0"/>
+              </a:rPr>
+              <a:t>(“name”, …)</a:t>
+            </a:r>
+          </a:p>
+          <a:p>
+            <a:pPr marL="457200" lvl="1" indent="0">
+              <a:buNone/>
+            </a:pPr>
+            <a:endParaRPr lang="en-US" sz="2000" dirty="0">
+              <a:solidFill>
+                <a:schemeClr val="accent4">
+                  <a:lumMod val="75000"/>
+                </a:schemeClr>
+              </a:solidFill>
+              <a:latin typeface="FuraCode Nerd Font Mono" panose="020B0509050000020004" pitchFamily="50" charset="0"/>
+              <a:ea typeface="FuraCode Nerd Font Mono" panose="020B0509050000020004" pitchFamily="50" charset="0"/>
+            </a:endParaRPr>
+          </a:p>
+          <a:p>
+            <a:pPr marL="457200" lvl="1" indent="0">
+              <a:buNone/>
+            </a:pPr>
+            <a:r>
+              <a:rPr lang="en-US" sz="2000" dirty="0">
+                <a:solidFill>
+                  <a:schemeClr val="accent6">
+                    <a:lumMod val="75000"/>
+                  </a:schemeClr>
+                </a:solidFill>
+                <a:latin typeface="FuraCode Nerd Font Mono" panose="020B0509050000020004" pitchFamily="50" charset="0"/>
+                <a:ea typeface="FuraCode Nerd Font Mono" panose="020B0509050000020004" pitchFamily="50" charset="0"/>
+              </a:rPr>
+              <a:t>- </a:t>
+            </a:r>
+            <a:r>
+              <a:rPr lang="en-US" sz="2000" dirty="0" err="1">
+                <a:solidFill>
+                  <a:schemeClr val="accent6">
+                    <a:lumMod val="75000"/>
+                  </a:schemeClr>
+                </a:solidFill>
+                <a:latin typeface="FuraCode Nerd Font Mono" panose="020B0509050000020004" pitchFamily="50" charset="0"/>
+                <a:ea typeface="FuraCode Nerd Font Mono" panose="020B0509050000020004" pitchFamily="50" charset="0"/>
+              </a:rPr>
+              <a:t>plotOutput</a:t>
+            </a:r>
+            <a:r>
+              <a:rPr lang="en-US" sz="2000" dirty="0">
+                <a:solidFill>
+                  <a:schemeClr val="accent6">
+                    <a:lumMod val="75000"/>
+                  </a:schemeClr>
+                </a:solidFill>
+                <a:latin typeface="FuraCode Nerd Font Mono" panose="020B0509050000020004" pitchFamily="50" charset="0"/>
+                <a:ea typeface="FuraCode Nerd Font Mono" panose="020B0509050000020004" pitchFamily="50" charset="0"/>
+              </a:rPr>
+              <a:t>(“</a:t>
+            </a:r>
+            <a:r>
+              <a:rPr lang="en-US" sz="2000" dirty="0" err="1">
+                <a:solidFill>
+                  <a:schemeClr val="accent6">
+                    <a:lumMod val="75000"/>
+                  </a:schemeClr>
+                </a:solidFill>
+                <a:latin typeface="FuraCode Nerd Font Mono" panose="020B0509050000020004" pitchFamily="50" charset="0"/>
+                <a:ea typeface="FuraCode Nerd Font Mono" panose="020B0509050000020004" pitchFamily="50" charset="0"/>
+              </a:rPr>
+              <a:t>distPlot</a:t>
+            </a:r>
+            <a:r>
+              <a:rPr lang="en-US" sz="2000" dirty="0">
+                <a:solidFill>
+                  <a:schemeClr val="accent6">
+                    <a:lumMod val="75000"/>
+                  </a:schemeClr>
+                </a:solidFill>
+                <a:latin typeface="FuraCode Nerd Font Mono" panose="020B0509050000020004" pitchFamily="50" charset="0"/>
+                <a:ea typeface="FuraCode Nerd Font Mono" panose="020B0509050000020004" pitchFamily="50" charset="0"/>
+              </a:rPr>
+              <a:t>”)</a:t>
+            </a:r>
+          </a:p>
+          <a:p>
+            <a:pPr marL="457200" lvl="1" indent="0">
+              <a:buNone/>
+            </a:pPr>
+            <a:r>
+              <a:rPr lang="en-US" sz="2000" dirty="0">
+                <a:solidFill>
+                  <a:schemeClr val="accent4">
+                    <a:lumMod val="75000"/>
+                  </a:schemeClr>
+                </a:solidFill>
+                <a:latin typeface="FuraCode Nerd Font Mono" panose="020B0509050000020004" pitchFamily="50" charset="0"/>
+                <a:ea typeface="FuraCode Nerd Font Mono" panose="020B0509050000020004" pitchFamily="50" charset="0"/>
+              </a:rPr>
+              <a:t>+ </a:t>
+            </a:r>
+            <a:r>
+              <a:rPr lang="en-US" sz="2000" dirty="0" err="1">
+                <a:solidFill>
+                  <a:schemeClr val="accent4">
+                    <a:lumMod val="75000"/>
+                  </a:schemeClr>
+                </a:solidFill>
+                <a:latin typeface="FuraCode Nerd Font Mono" panose="020B0509050000020004" pitchFamily="50" charset="0"/>
+                <a:ea typeface="FuraCode Nerd Font Mono" panose="020B0509050000020004" pitchFamily="50" charset="0"/>
+              </a:rPr>
+              <a:t>textOutput</a:t>
+            </a:r>
+            <a:r>
+              <a:rPr lang="en-US" sz="2000" dirty="0">
+                <a:solidFill>
+                  <a:schemeClr val="accent4">
+                    <a:lumMod val="75000"/>
+                  </a:schemeClr>
+                </a:solidFill>
+                <a:latin typeface="FuraCode Nerd Font Mono" panose="020B0509050000020004" pitchFamily="50" charset="0"/>
+                <a:ea typeface="FuraCode Nerd Font Mono" panose="020B0509050000020004" pitchFamily="50" charset="0"/>
+              </a:rPr>
+              <a:t>(“welcome”)</a:t>
+            </a:r>
+          </a:p>
+          <a:p>
+            <a:pPr marL="457200" lvl="1" indent="0">
+              <a:buNone/>
+            </a:pPr>
+            <a:endParaRPr lang="en-US" sz="2000" dirty="0">
+              <a:solidFill>
+                <a:schemeClr val="accent4">
+                  <a:lumMod val="75000"/>
+                </a:schemeClr>
+              </a:solidFill>
+              <a:latin typeface="FuraCode Nerd Font Mono" panose="020B0509050000020004" pitchFamily="50" charset="0"/>
+              <a:ea typeface="FuraCode Nerd Font Mono" panose="020B0509050000020004" pitchFamily="50" charset="0"/>
+            </a:endParaRPr>
+          </a:p>
+          <a:p>
+            <a:r>
+              <a:rPr lang="en-US" sz="2400" dirty="0">
+                <a:ea typeface="FuraCode Nerd Font Mono" panose="020B0509050000020004" pitchFamily="50" charset="0"/>
+              </a:rPr>
+              <a:t>Server</a:t>
+            </a:r>
+          </a:p>
+          <a:p>
+            <a:pPr marL="457200" lvl="1" indent="0">
+              <a:buNone/>
+            </a:pPr>
+            <a:r>
+              <a:rPr lang="en-US" sz="2000" dirty="0">
+                <a:solidFill>
+                  <a:schemeClr val="accent6">
+                    <a:lumMod val="75000"/>
+                  </a:schemeClr>
+                </a:solidFill>
+                <a:latin typeface="FuraCode Nerd Font Mono" panose="020B0509050000020004" pitchFamily="50" charset="0"/>
+                <a:ea typeface="FuraCode Nerd Font Mono" panose="020B0509050000020004" pitchFamily="50" charset="0"/>
+              </a:rPr>
+              <a:t>- </a:t>
+            </a:r>
+            <a:r>
+              <a:rPr lang="en-US" sz="2000" dirty="0" err="1">
+                <a:solidFill>
+                  <a:schemeClr val="accent6">
+                    <a:lumMod val="75000"/>
+                  </a:schemeClr>
+                </a:solidFill>
+                <a:latin typeface="FuraCode Nerd Font Mono" panose="020B0509050000020004" pitchFamily="50" charset="0"/>
+                <a:ea typeface="FuraCode Nerd Font Mono" panose="020B0509050000020004" pitchFamily="50" charset="0"/>
+              </a:rPr>
+              <a:t>renderPlot</a:t>
+            </a:r>
+            <a:r>
+              <a:rPr lang="en-US" sz="2000" dirty="0">
+                <a:solidFill>
+                  <a:schemeClr val="accent6">
+                    <a:lumMod val="75000"/>
+                  </a:schemeClr>
+                </a:solidFill>
+                <a:latin typeface="FuraCode Nerd Font Mono" panose="020B0509050000020004" pitchFamily="50" charset="0"/>
+                <a:ea typeface="FuraCode Nerd Font Mono" panose="020B0509050000020004" pitchFamily="50" charset="0"/>
+              </a:rPr>
+              <a:t>(“</a:t>
+            </a:r>
+            <a:r>
+              <a:rPr lang="en-US" sz="2000" dirty="0" err="1">
+                <a:solidFill>
+                  <a:schemeClr val="accent6">
+                    <a:lumMod val="75000"/>
+                  </a:schemeClr>
+                </a:solidFill>
+                <a:latin typeface="FuraCode Nerd Font Mono" panose="020B0509050000020004" pitchFamily="50" charset="0"/>
+                <a:ea typeface="FuraCode Nerd Font Mono" panose="020B0509050000020004" pitchFamily="50" charset="0"/>
+              </a:rPr>
+              <a:t>distPlot</a:t>
+            </a:r>
+            <a:r>
+              <a:rPr lang="en-US" sz="2000" dirty="0">
+                <a:solidFill>
+                  <a:schemeClr val="accent6">
+                    <a:lumMod val="75000"/>
+                  </a:schemeClr>
+                </a:solidFill>
+                <a:latin typeface="FuraCode Nerd Font Mono" panose="020B0509050000020004" pitchFamily="50" charset="0"/>
+                <a:ea typeface="FuraCode Nerd Font Mono" panose="020B0509050000020004" pitchFamily="50" charset="0"/>
+              </a:rPr>
+              <a:t>”, …)</a:t>
+            </a:r>
+          </a:p>
+          <a:p>
+            <a:pPr marL="457200" lvl="1" indent="0">
+              <a:buNone/>
+            </a:pPr>
+            <a:r>
+              <a:rPr lang="en-US" sz="2000" dirty="0">
+                <a:solidFill>
+                  <a:schemeClr val="accent4">
+                    <a:lumMod val="75000"/>
+                  </a:schemeClr>
+                </a:solidFill>
+                <a:latin typeface="FuraCode Nerd Font Mono" panose="020B0509050000020004" pitchFamily="50" charset="0"/>
+                <a:ea typeface="FuraCode Nerd Font Mono" panose="020B0509050000020004" pitchFamily="50" charset="0"/>
+              </a:rPr>
+              <a:t>+ </a:t>
+            </a:r>
+            <a:r>
+              <a:rPr lang="en-US" sz="2000" dirty="0" err="1">
+                <a:solidFill>
+                  <a:schemeClr val="accent4">
+                    <a:lumMod val="75000"/>
+                  </a:schemeClr>
+                </a:solidFill>
+                <a:latin typeface="FuraCode Nerd Font Mono" panose="020B0509050000020004" pitchFamily="50" charset="0"/>
+                <a:ea typeface="FuraCode Nerd Font Mono" panose="020B0509050000020004" pitchFamily="50" charset="0"/>
+              </a:rPr>
+              <a:t>renderText</a:t>
+            </a:r>
+            <a:r>
+              <a:rPr lang="en-US" sz="2000" dirty="0">
+                <a:solidFill>
+                  <a:schemeClr val="accent4">
+                    <a:lumMod val="75000"/>
+                  </a:schemeClr>
+                </a:solidFill>
+                <a:latin typeface="FuraCode Nerd Font Mono" panose="020B0509050000020004" pitchFamily="50" charset="0"/>
+                <a:ea typeface="FuraCode Nerd Font Mono" panose="020B0509050000020004" pitchFamily="50" charset="0"/>
+              </a:rPr>
+              <a:t>(“welcome”, …)</a:t>
+            </a:r>
+          </a:p>
+          <a:p>
+            <a:pPr lvl="2"/>
+            <a:endParaRPr lang="en-US" dirty="0"/>
+          </a:p>
+        </p:txBody>
+      </p:sp>
+      <p:sp>
+        <p:nvSpPr>
+          <p:cNvPr id="4" name="Date Placeholder 3">
+            <a:extLst>
+              <a:ext uri="{FF2B5EF4-FFF2-40B4-BE49-F238E27FC236}">
+                <a16:creationId xmlns:a16="http://schemas.microsoft.com/office/drawing/2014/main" id="{9CDB5518-298D-4D8C-A9AF-F150612A217D}"/>
+              </a:ext>
+            </a:extLst>
+          </p:cNvPr>
+          <p:cNvSpPr>
+            <a:spLocks noGrp="1"/>
+          </p:cNvSpPr>
+          <p:nvPr>
+            <p:ph type="dt" sz="half" idx="10"/>
+          </p:nvPr>
+        </p:nvSpPr>
+        <p:spPr/>
+        <p:txBody>
+          <a:bodyPr/>
+          <a:lstStyle/>
+          <a:p>
+            <a:r>
+              <a:rPr lang="en-GB" dirty="0"/>
+              <a:t>3/6/2022</a:t>
+            </a:r>
+            <a:endParaRPr lang="en-NL" dirty="0"/>
+          </a:p>
+        </p:txBody>
+      </p:sp>
+      <p:sp>
+        <p:nvSpPr>
+          <p:cNvPr id="5" name="Footer Placeholder 4">
+            <a:extLst>
+              <a:ext uri="{FF2B5EF4-FFF2-40B4-BE49-F238E27FC236}">
+                <a16:creationId xmlns:a16="http://schemas.microsoft.com/office/drawing/2014/main" id="{923905B8-3F4C-448A-85D9-8ACD7BD8BAA5}"/>
+              </a:ext>
+            </a:extLst>
+          </p:cNvPr>
+          <p:cNvSpPr>
+            <a:spLocks noGrp="1"/>
+          </p:cNvSpPr>
+          <p:nvPr>
+            <p:ph type="ftr" sz="quarter" idx="11"/>
+          </p:nvPr>
+        </p:nvSpPr>
+        <p:spPr/>
+        <p:txBody>
+          <a:bodyPr/>
+          <a:lstStyle/>
+          <a:p>
+            <a:r>
+              <a:rPr lang="en-GB" dirty="0"/>
+              <a:t>Karel Kroeze - BDSi - Shiny workshop</a:t>
+            </a:r>
+            <a:endParaRPr lang="en-NL" dirty="0"/>
+          </a:p>
+        </p:txBody>
+      </p:sp>
+      <p:pic>
+        <p:nvPicPr>
+          <p:cNvPr id="12" name="Picture 11">
+            <a:extLst>
+              <a:ext uri="{FF2B5EF4-FFF2-40B4-BE49-F238E27FC236}">
+                <a16:creationId xmlns:a16="http://schemas.microsoft.com/office/drawing/2014/main" id="{BCB9C76C-3C26-47FA-9156-215ECCFE8915}"/>
+              </a:ext>
+            </a:extLst>
+          </p:cNvPr>
+          <p:cNvPicPr>
+            <a:picLocks noChangeAspect="1"/>
+          </p:cNvPicPr>
+          <p:nvPr/>
+        </p:nvPicPr>
+        <p:blipFill rotWithShape="1">
+          <a:blip r:embed="rId2"/>
+          <a:srcRect l="1701" r="4992"/>
+          <a:stretch/>
+        </p:blipFill>
+        <p:spPr>
+          <a:xfrm>
+            <a:off x="5781675" y="2211603"/>
+            <a:ext cx="6210300" cy="1999408"/>
+          </a:xfrm>
+          <a:prstGeom prst="rect">
+            <a:avLst/>
+          </a:prstGeom>
+        </p:spPr>
+      </p:pic>
+      <p:pic>
+        <p:nvPicPr>
+          <p:cNvPr id="14" name="Picture 13">
+            <a:extLst>
+              <a:ext uri="{FF2B5EF4-FFF2-40B4-BE49-F238E27FC236}">
+                <a16:creationId xmlns:a16="http://schemas.microsoft.com/office/drawing/2014/main" id="{CC2C35FC-AF82-498B-89F5-E09D354BE3F8}"/>
+              </a:ext>
+            </a:extLst>
+          </p:cNvPr>
+          <p:cNvPicPr>
+            <a:picLocks noChangeAspect="1"/>
+          </p:cNvPicPr>
+          <p:nvPr/>
+        </p:nvPicPr>
+        <p:blipFill rotWithShape="1">
+          <a:blip r:embed="rId3">
+            <a:extLst>
+              <a:ext uri="{28A0092B-C50C-407E-A947-70E740481C1C}">
+                <a14:useLocalDpi xmlns:a14="http://schemas.microsoft.com/office/drawing/2010/main" val="0"/>
+              </a:ext>
+            </a:extLst>
+          </a:blip>
+          <a:srcRect l="2064" r="14255"/>
+          <a:stretch/>
+        </p:blipFill>
+        <p:spPr>
+          <a:xfrm>
+            <a:off x="6591300" y="4426821"/>
+            <a:ext cx="4591050" cy="1578874"/>
+          </a:xfrm>
+          <a:prstGeom prst="rect">
+            <a:avLst/>
+          </a:prstGeom>
+        </p:spPr>
+      </p:pic>
+    </p:spTree>
+    <p:extLst>
+      <p:ext uri="{BB962C8B-B14F-4D97-AF65-F5344CB8AC3E}">
+        <p14:creationId xmlns:p14="http://schemas.microsoft.com/office/powerpoint/2010/main" val="3626636867"/>
       </p:ext>
     </p:extLst>
   </p:cSld>
@@ -11673,6 +12913,1243 @@
   <p:clrMapOvr>
     <a:masterClrMapping/>
   </p:clrMapOvr>
+</p:sld>
+</file>
+
+<file path=ppt/slides/slide20.xml><?xml version="1.0" encoding="utf-8"?>
+<p:sld xmlns:a="http://schemas.openxmlformats.org/drawingml/2006/main" xmlns:r="http://schemas.openxmlformats.org/officeDocument/2006/relationships" xmlns:p="http://schemas.openxmlformats.org/presentationml/2006/main">
+  <p:cSld>
+    <p:spTree>
+      <p:nvGrpSpPr>
+        <p:cNvPr id="1" name=""/>
+        <p:cNvGrpSpPr/>
+        <p:nvPr/>
+      </p:nvGrpSpPr>
+      <p:grpSpPr>
+        <a:xfrm>
+          <a:off x="0" y="0"/>
+          <a:ext cx="0" cy="0"/>
+          <a:chOff x="0" y="0"/>
+          <a:chExt cx="0" cy="0"/>
+        </a:xfrm>
+      </p:grpSpPr>
+      <p:sp>
+        <p:nvSpPr>
+          <p:cNvPr id="2" name="Title 1">
+            <a:extLst>
+              <a:ext uri="{FF2B5EF4-FFF2-40B4-BE49-F238E27FC236}">
+                <a16:creationId xmlns:a16="http://schemas.microsoft.com/office/drawing/2014/main" id="{DC65E524-C514-45D7-BC6C-D11A108C5A11}"/>
+              </a:ext>
+            </a:extLst>
+          </p:cNvPr>
+          <p:cNvSpPr>
+            <a:spLocks noGrp="1"/>
+          </p:cNvSpPr>
+          <p:nvPr>
+            <p:ph type="title"/>
+          </p:nvPr>
+        </p:nvSpPr>
+        <p:spPr/>
+        <p:txBody>
+          <a:bodyPr/>
+          <a:lstStyle/>
+          <a:p>
+            <a:r>
+              <a:rPr lang="en-GB" sz="2000" dirty="0"/>
+              <a:t>Hello, world!</a:t>
+            </a:r>
+            <a:br>
+              <a:rPr lang="en-GB" dirty="0"/>
+            </a:br>
+            <a:r>
+              <a:rPr lang="en-GB" dirty="0"/>
+              <a:t>Make it yours</a:t>
+            </a:r>
+            <a:endParaRPr lang="nl-NL" dirty="0"/>
+          </a:p>
+        </p:txBody>
+      </p:sp>
+      <p:sp>
+        <p:nvSpPr>
+          <p:cNvPr id="3" name="Content Placeholder 2">
+            <a:extLst>
+              <a:ext uri="{FF2B5EF4-FFF2-40B4-BE49-F238E27FC236}">
+                <a16:creationId xmlns:a16="http://schemas.microsoft.com/office/drawing/2014/main" id="{53955285-5F23-4DBC-8F2C-B5AF06D4975D}"/>
+              </a:ext>
+            </a:extLst>
+          </p:cNvPr>
+          <p:cNvSpPr>
+            <a:spLocks noGrp="1"/>
+          </p:cNvSpPr>
+          <p:nvPr>
+            <p:ph sz="half" idx="1"/>
+          </p:nvPr>
+        </p:nvSpPr>
+        <p:spPr>
+          <a:xfrm>
+            <a:off x="1265581" y="1825624"/>
+            <a:ext cx="10515600" cy="4395881"/>
+          </a:xfrm>
+        </p:spPr>
+        <p:txBody>
+          <a:bodyPr/>
+          <a:lstStyle/>
+          <a:p>
+            <a:r>
+              <a:rPr lang="en-GB" dirty="0"/>
+              <a:t>Keep it simple</a:t>
+            </a:r>
+          </a:p>
+          <a:p>
+            <a:pPr lvl="1"/>
+            <a:r>
+              <a:rPr lang="en-GB" sz="2000" dirty="0"/>
+              <a:t>Stick to a basic use case – you can add complexity later</a:t>
+            </a:r>
+          </a:p>
+          <a:p>
+            <a:r>
+              <a:rPr lang="en-GB" dirty="0"/>
+              <a:t>Load any data you need</a:t>
+            </a:r>
+          </a:p>
+          <a:p>
+            <a:r>
+              <a:rPr lang="en-GB" dirty="0"/>
+              <a:t>UI</a:t>
+            </a:r>
+          </a:p>
+          <a:p>
+            <a:pPr lvl="1"/>
+            <a:r>
+              <a:rPr lang="en-GB" dirty="0"/>
+              <a:t>Add/change inputs &amp; outputs</a:t>
+            </a:r>
+          </a:p>
+          <a:p>
+            <a:pPr lvl="2"/>
+            <a:r>
+              <a:rPr lang="en-GB" sz="1600" dirty="0">
+                <a:latin typeface="FuraCode Nerd Font" panose="020B0509050000020004" pitchFamily="50" charset="0"/>
+                <a:ea typeface="FuraCode Nerd Font" panose="020B0509050000020004" pitchFamily="50" charset="0"/>
+              </a:rPr>
+              <a:t>[xxx]Input(..), [xxx]Output(..)</a:t>
+            </a:r>
+          </a:p>
+          <a:p>
+            <a:pPr lvl="1"/>
+            <a:r>
+              <a:rPr lang="en-GB" dirty="0"/>
+              <a:t>Change layout, labels, texts</a:t>
+            </a:r>
+          </a:p>
+          <a:p>
+            <a:r>
+              <a:rPr lang="en-GB" dirty="0"/>
+              <a:t>Server</a:t>
+            </a:r>
+          </a:p>
+          <a:p>
+            <a:pPr lvl="1"/>
+            <a:r>
+              <a:rPr lang="en-GB" dirty="0"/>
+              <a:t>Create an output for your analysis/visualization</a:t>
+            </a:r>
+          </a:p>
+          <a:p>
+            <a:pPr lvl="2"/>
+            <a:r>
+              <a:rPr lang="en-GB" sz="1600" dirty="0">
+                <a:latin typeface="FuraCode Nerd Font" panose="020B0509050000020004" pitchFamily="50" charset="0"/>
+                <a:ea typeface="FuraCode Nerd Font" panose="020B0509050000020004" pitchFamily="50" charset="0"/>
+              </a:rPr>
+              <a:t>render[xxx](..)</a:t>
+            </a:r>
+          </a:p>
+          <a:p>
+            <a:pPr marL="457200" lvl="1" indent="0">
+              <a:buNone/>
+            </a:pPr>
+            <a:endParaRPr lang="en-GB" dirty="0">
+              <a:latin typeface="FuraCode Nerd Font" panose="020B0509050000020004" pitchFamily="50" charset="0"/>
+              <a:ea typeface="FuraCode Nerd Font" panose="020B0509050000020004" pitchFamily="50" charset="0"/>
+            </a:endParaRPr>
+          </a:p>
+          <a:p>
+            <a:pPr lvl="1"/>
+            <a:endParaRPr lang="en-GB" dirty="0"/>
+          </a:p>
+          <a:p>
+            <a:endParaRPr lang="en-GB" dirty="0"/>
+          </a:p>
+        </p:txBody>
+      </p:sp>
+      <p:sp>
+        <p:nvSpPr>
+          <p:cNvPr id="4" name="Date Placeholder 3">
+            <a:extLst>
+              <a:ext uri="{FF2B5EF4-FFF2-40B4-BE49-F238E27FC236}">
+                <a16:creationId xmlns:a16="http://schemas.microsoft.com/office/drawing/2014/main" id="{9CDB5518-298D-4D8C-A9AF-F150612A217D}"/>
+              </a:ext>
+            </a:extLst>
+          </p:cNvPr>
+          <p:cNvSpPr>
+            <a:spLocks noGrp="1"/>
+          </p:cNvSpPr>
+          <p:nvPr>
+            <p:ph type="dt" sz="half" idx="10"/>
+          </p:nvPr>
+        </p:nvSpPr>
+        <p:spPr/>
+        <p:txBody>
+          <a:bodyPr/>
+          <a:lstStyle/>
+          <a:p>
+            <a:r>
+              <a:rPr lang="en-GB" dirty="0"/>
+              <a:t>24/10/2022</a:t>
+            </a:r>
+            <a:endParaRPr lang="en-NL" dirty="0"/>
+          </a:p>
+        </p:txBody>
+      </p:sp>
+      <p:sp>
+        <p:nvSpPr>
+          <p:cNvPr id="5" name="Footer Placeholder 4">
+            <a:extLst>
+              <a:ext uri="{FF2B5EF4-FFF2-40B4-BE49-F238E27FC236}">
+                <a16:creationId xmlns:a16="http://schemas.microsoft.com/office/drawing/2014/main" id="{923905B8-3F4C-448A-85D9-8ACD7BD8BAA5}"/>
+              </a:ext>
+            </a:extLst>
+          </p:cNvPr>
+          <p:cNvSpPr>
+            <a:spLocks noGrp="1"/>
+          </p:cNvSpPr>
+          <p:nvPr>
+            <p:ph type="ftr" sz="quarter" idx="11"/>
+          </p:nvPr>
+        </p:nvSpPr>
+        <p:spPr/>
+        <p:txBody>
+          <a:bodyPr/>
+          <a:lstStyle/>
+          <a:p>
+            <a:r>
+              <a:rPr lang="en-GB" dirty="0"/>
+              <a:t>Karel Kroeze - BDSi - Shiny workshop</a:t>
+            </a:r>
+            <a:endParaRPr lang="en-NL" dirty="0"/>
+          </a:p>
+        </p:txBody>
+      </p:sp>
+      <p:sp>
+        <p:nvSpPr>
+          <p:cNvPr id="12" name="TextBox 11">
+            <a:extLst>
+              <a:ext uri="{FF2B5EF4-FFF2-40B4-BE49-F238E27FC236}">
+                <a16:creationId xmlns:a16="http://schemas.microsoft.com/office/drawing/2014/main" id="{0E71A3FC-D42C-4F36-AB75-CDAEF3341FAA}"/>
+              </a:ext>
+            </a:extLst>
+          </p:cNvPr>
+          <p:cNvSpPr txBox="1"/>
+          <p:nvPr/>
+        </p:nvSpPr>
+        <p:spPr>
+          <a:xfrm>
+            <a:off x="5074397" y="196909"/>
+            <a:ext cx="7051701" cy="830997"/>
+          </a:xfrm>
+          <a:prstGeom prst="rect">
+            <a:avLst/>
+          </a:prstGeom>
+          <a:noFill/>
+        </p:spPr>
+        <p:txBody>
+          <a:bodyPr wrap="square" rtlCol="0">
+            <a:spAutoFit/>
+          </a:bodyPr>
+          <a:lstStyle/>
+          <a:p>
+            <a:pPr algn="ctr"/>
+            <a:r>
+              <a:rPr lang="en-GB" sz="2400" b="1" dirty="0">
+                <a:solidFill>
+                  <a:schemeClr val="bg1"/>
+                </a:solidFill>
+                <a:latin typeface="Ink Free" panose="03080402000500000000" pitchFamily="66" charset="0"/>
+              </a:rPr>
+              <a:t>Cheat sheets are your </a:t>
+            </a:r>
+            <a:r>
+              <a:rPr lang="en-GB" sz="2400" b="1" u="sng" dirty="0">
+                <a:solidFill>
+                  <a:schemeClr val="bg1"/>
+                </a:solidFill>
+                <a:latin typeface="Ink Free" panose="03080402000500000000" pitchFamily="66" charset="0"/>
+              </a:rPr>
+              <a:t>friend</a:t>
+            </a:r>
+            <a:br>
+              <a:rPr lang="en-GB" sz="2400" b="1" dirty="0">
+                <a:solidFill>
+                  <a:schemeClr val="bg1"/>
+                </a:solidFill>
+                <a:latin typeface="Ink Free" panose="03080402000500000000" pitchFamily="66" charset="0"/>
+              </a:rPr>
+            </a:br>
+            <a:r>
+              <a:rPr lang="en-GB" sz="2400" b="1" dirty="0">
+                <a:solidFill>
+                  <a:schemeClr val="accent1"/>
+                </a:solidFill>
+                <a:latin typeface="Ink Free" panose="03080402000500000000" pitchFamily="66" charset="0"/>
+              </a:rPr>
+              <a:t>Help </a:t>
+            </a:r>
+            <a:r>
+              <a:rPr lang="en-GB" sz="2400" b="1" dirty="0">
+                <a:solidFill>
+                  <a:schemeClr val="bg1"/>
+                </a:solidFill>
+                <a:latin typeface="Ink Free" panose="03080402000500000000" pitchFamily="66" charset="0"/>
+              </a:rPr>
+              <a:t>&gt;</a:t>
+            </a:r>
+            <a:r>
+              <a:rPr lang="en-GB" sz="2400" b="1" dirty="0">
+                <a:solidFill>
+                  <a:schemeClr val="accent1"/>
+                </a:solidFill>
+                <a:latin typeface="Ink Free" panose="03080402000500000000" pitchFamily="66" charset="0"/>
+              </a:rPr>
+              <a:t> Cheat Sheets </a:t>
+            </a:r>
+            <a:r>
+              <a:rPr lang="en-GB" sz="2400" b="1" dirty="0">
+                <a:solidFill>
+                  <a:schemeClr val="bg1"/>
+                </a:solidFill>
+                <a:latin typeface="Ink Free" panose="03080402000500000000" pitchFamily="66" charset="0"/>
+              </a:rPr>
+              <a:t>&gt;</a:t>
+            </a:r>
+            <a:r>
+              <a:rPr lang="en-GB" sz="2400" b="1" dirty="0">
+                <a:solidFill>
+                  <a:schemeClr val="accent1"/>
+                </a:solidFill>
+                <a:latin typeface="Ink Free" panose="03080402000500000000" pitchFamily="66" charset="0"/>
+              </a:rPr>
+              <a:t> Web applications with Shiny</a:t>
+            </a:r>
+            <a:endParaRPr lang="nl-NL" sz="2400" b="1" dirty="0">
+              <a:solidFill>
+                <a:schemeClr val="accent1"/>
+              </a:solidFill>
+              <a:latin typeface="Ink Free" panose="03080402000500000000" pitchFamily="66" charset="0"/>
+            </a:endParaRPr>
+          </a:p>
+        </p:txBody>
+      </p:sp>
+      <mc:AlternateContent xmlns:mc="http://schemas.openxmlformats.org/markup-compatibility/2006">
+        <mc:Choice xmlns:p14="http://schemas.microsoft.com/office/powerpoint/2010/main" Requires="p14">
+          <p:contentPart p14:bwMode="auto" r:id="rId2">
+            <p14:nvContentPartPr>
+              <p14:cNvPr id="7" name="Ink 6">
+                <a:extLst>
+                  <a:ext uri="{FF2B5EF4-FFF2-40B4-BE49-F238E27FC236}">
+                    <a16:creationId xmlns:a16="http://schemas.microsoft.com/office/drawing/2014/main" id="{C841DFD6-E7F0-3937-8BCF-8ADDC2AE880B}"/>
+                  </a:ext>
+                </a:extLst>
+              </p14:cNvPr>
+              <p14:cNvContentPartPr/>
+              <p14:nvPr/>
+            </p14:nvContentPartPr>
+            <p14:xfrm>
+              <a:off x="5273692" y="945466"/>
+              <a:ext cx="6572160" cy="164880"/>
+            </p14:xfrm>
+          </p:contentPart>
+        </mc:Choice>
+        <mc:Fallback>
+          <p:pic>
+            <p:nvPicPr>
+              <p:cNvPr id="7" name="Ink 6">
+                <a:extLst>
+                  <a:ext uri="{FF2B5EF4-FFF2-40B4-BE49-F238E27FC236}">
+                    <a16:creationId xmlns:a16="http://schemas.microsoft.com/office/drawing/2014/main" id="{C841DFD6-E7F0-3937-8BCF-8ADDC2AE880B}"/>
+                  </a:ext>
+                </a:extLst>
+              </p:cNvPr>
+              <p:cNvPicPr/>
+              <p:nvPr/>
+            </p:nvPicPr>
+            <p:blipFill>
+              <a:blip r:embed="rId3"/>
+              <a:stretch>
+                <a:fillRect/>
+              </a:stretch>
+            </p:blipFill>
+            <p:spPr>
+              <a:xfrm>
+                <a:off x="5267572" y="939346"/>
+                <a:ext cx="6584400" cy="177120"/>
+              </a:xfrm>
+              <a:prstGeom prst="rect">
+                <a:avLst/>
+              </a:prstGeom>
+            </p:spPr>
+          </p:pic>
+        </mc:Fallback>
+      </mc:AlternateContent>
+      <p:grpSp>
+        <p:nvGrpSpPr>
+          <p:cNvPr id="14" name="Group 13">
+            <a:extLst>
+              <a:ext uri="{FF2B5EF4-FFF2-40B4-BE49-F238E27FC236}">
+                <a16:creationId xmlns:a16="http://schemas.microsoft.com/office/drawing/2014/main" id="{F697C212-547C-BDF6-677D-D79359A1E716}"/>
+              </a:ext>
+            </a:extLst>
+          </p:cNvPr>
+          <p:cNvGrpSpPr/>
+          <p:nvPr/>
+        </p:nvGrpSpPr>
+        <p:grpSpPr>
+          <a:xfrm>
+            <a:off x="9716616" y="537000"/>
+            <a:ext cx="780480" cy="109440"/>
+            <a:chOff x="9716616" y="537000"/>
+            <a:chExt cx="780480" cy="109440"/>
+          </a:xfrm>
+        </p:grpSpPr>
+        <mc:AlternateContent xmlns:mc="http://schemas.openxmlformats.org/markup-compatibility/2006">
+          <mc:Choice xmlns:p14="http://schemas.microsoft.com/office/powerpoint/2010/main" Requires="p14">
+            <p:contentPart p14:bwMode="auto" r:id="rId4">
+              <p14:nvContentPartPr>
+                <p14:cNvPr id="8" name="Ink 7">
+                  <a:extLst>
+                    <a:ext uri="{FF2B5EF4-FFF2-40B4-BE49-F238E27FC236}">
+                      <a16:creationId xmlns:a16="http://schemas.microsoft.com/office/drawing/2014/main" id="{4AE70AF9-1F14-B2D7-8F98-4B4B61F26451}"/>
+                    </a:ext>
+                  </a:extLst>
+                </p14:cNvPr>
+                <p14:cNvContentPartPr/>
+                <p14:nvPr/>
+              </p14:nvContentPartPr>
+              <p14:xfrm>
+                <a:off x="9716616" y="537000"/>
+                <a:ext cx="758880" cy="109440"/>
+              </p14:xfrm>
+            </p:contentPart>
+          </mc:Choice>
+          <mc:Fallback>
+            <p:pic>
+              <p:nvPicPr>
+                <p:cNvPr id="8" name="Ink 7">
+                  <a:extLst>
+                    <a:ext uri="{FF2B5EF4-FFF2-40B4-BE49-F238E27FC236}">
+                      <a16:creationId xmlns:a16="http://schemas.microsoft.com/office/drawing/2014/main" id="{4AE70AF9-1F14-B2D7-8F98-4B4B61F26451}"/>
+                    </a:ext>
+                  </a:extLst>
+                </p:cNvPr>
+                <p:cNvPicPr/>
+                <p:nvPr/>
+              </p:nvPicPr>
+              <p:blipFill>
+                <a:blip r:embed="rId5"/>
+                <a:stretch>
+                  <a:fillRect/>
+                </a:stretch>
+              </p:blipFill>
+              <p:spPr>
+                <a:xfrm>
+                  <a:off x="9710496" y="530880"/>
+                  <a:ext cx="771120" cy="121680"/>
+                </a:xfrm>
+                <a:prstGeom prst="rect">
+                  <a:avLst/>
+                </a:prstGeom>
+              </p:spPr>
+            </p:pic>
+          </mc:Fallback>
+        </mc:AlternateContent>
+        <mc:AlternateContent xmlns:mc="http://schemas.openxmlformats.org/markup-compatibility/2006">
+          <mc:Choice xmlns:p14="http://schemas.microsoft.com/office/powerpoint/2010/main" Requires="p14">
+            <p:contentPart p14:bwMode="auto" r:id="rId6">
+              <p14:nvContentPartPr>
+                <p14:cNvPr id="9" name="Ink 8">
+                  <a:extLst>
+                    <a:ext uri="{FF2B5EF4-FFF2-40B4-BE49-F238E27FC236}">
+                      <a16:creationId xmlns:a16="http://schemas.microsoft.com/office/drawing/2014/main" id="{5EC1E851-7996-C73D-0213-2DE96B4E0F71}"/>
+                    </a:ext>
+                  </a:extLst>
+                </p14:cNvPr>
+                <p14:cNvContentPartPr/>
+                <p14:nvPr/>
+              </p14:nvContentPartPr>
+              <p14:xfrm>
+                <a:off x="9747216" y="554280"/>
+                <a:ext cx="749880" cy="49680"/>
+              </p14:xfrm>
+            </p:contentPart>
+          </mc:Choice>
+          <mc:Fallback>
+            <p:pic>
+              <p:nvPicPr>
+                <p:cNvPr id="9" name="Ink 8">
+                  <a:extLst>
+                    <a:ext uri="{FF2B5EF4-FFF2-40B4-BE49-F238E27FC236}">
+                      <a16:creationId xmlns:a16="http://schemas.microsoft.com/office/drawing/2014/main" id="{5EC1E851-7996-C73D-0213-2DE96B4E0F71}"/>
+                    </a:ext>
+                  </a:extLst>
+                </p:cNvPr>
+                <p:cNvPicPr/>
+                <p:nvPr/>
+              </p:nvPicPr>
+              <p:blipFill>
+                <a:blip r:embed="rId7"/>
+                <a:stretch>
+                  <a:fillRect/>
+                </a:stretch>
+              </p:blipFill>
+              <p:spPr>
+                <a:xfrm>
+                  <a:off x="9741096" y="548160"/>
+                  <a:ext cx="762120" cy="61920"/>
+                </a:xfrm>
+                <a:prstGeom prst="rect">
+                  <a:avLst/>
+                </a:prstGeom>
+              </p:spPr>
+            </p:pic>
+          </mc:Fallback>
+        </mc:AlternateContent>
+      </p:grpSp>
+      <mc:AlternateContent xmlns:mc="http://schemas.openxmlformats.org/markup-compatibility/2006">
+        <mc:Choice xmlns:p14="http://schemas.microsoft.com/office/powerpoint/2010/main" Requires="p14">
+          <p:contentPart p14:bwMode="auto" r:id="rId8">
+            <p14:nvContentPartPr>
+              <p14:cNvPr id="18" name="Ink 17">
+                <a:extLst>
+                  <a:ext uri="{FF2B5EF4-FFF2-40B4-BE49-F238E27FC236}">
+                    <a16:creationId xmlns:a16="http://schemas.microsoft.com/office/drawing/2014/main" id="{BAED29BD-1DA3-934E-49B7-F495F7A7195B}"/>
+                  </a:ext>
+                </a:extLst>
+              </p14:cNvPr>
+              <p14:cNvContentPartPr/>
+              <p14:nvPr/>
+            </p14:nvContentPartPr>
+            <p14:xfrm>
+              <a:off x="9978335" y="242252"/>
+              <a:ext cx="99115" cy="87028"/>
+            </p14:xfrm>
+          </p:contentPart>
+        </mc:Choice>
+        <mc:Fallback>
+          <p:pic>
+            <p:nvPicPr>
+              <p:cNvPr id="18" name="Ink 17">
+                <a:extLst>
+                  <a:ext uri="{FF2B5EF4-FFF2-40B4-BE49-F238E27FC236}">
+                    <a16:creationId xmlns:a16="http://schemas.microsoft.com/office/drawing/2014/main" id="{BAED29BD-1DA3-934E-49B7-F495F7A7195B}"/>
+                  </a:ext>
+                </a:extLst>
+              </p:cNvPr>
+              <p:cNvPicPr/>
+              <p:nvPr/>
+            </p:nvPicPr>
+            <p:blipFill>
+              <a:blip r:embed="rId9"/>
+              <a:stretch>
+                <a:fillRect/>
+              </a:stretch>
+            </p:blipFill>
+            <p:spPr>
+              <a:xfrm>
+                <a:off x="9972230" y="236113"/>
+                <a:ext cx="111325" cy="99306"/>
+              </a:xfrm>
+              <a:prstGeom prst="rect">
+                <a:avLst/>
+              </a:prstGeom>
+            </p:spPr>
+          </p:pic>
+        </mc:Fallback>
+      </mc:AlternateContent>
+    </p:spTree>
+    <p:extLst>
+      <p:ext uri="{BB962C8B-B14F-4D97-AF65-F5344CB8AC3E}">
+        <p14:creationId xmlns:p14="http://schemas.microsoft.com/office/powerpoint/2010/main" val="2943126073"/>
+      </p:ext>
+    </p:extLst>
+  </p:cSld>
+  <p:clrMapOvr>
+    <a:masterClrMapping/>
+  </p:clrMapOvr>
+  <p:timing>
+    <p:tnLst>
+      <p:par>
+        <p:cTn id="1" dur="indefinite" restart="never" nodeType="tmRoot">
+          <p:childTnLst>
+            <p:seq concurrent="1" nextAc="seek">
+              <p:cTn id="2" dur="indefinite" nodeType="mainSeq">
+                <p:childTnLst>
+                  <p:par>
+                    <p:cTn id="3" fill="hold">
+                      <p:stCondLst>
+                        <p:cond delay="indefinite"/>
+                      </p:stCondLst>
+                      <p:childTnLst>
+                        <p:par>
+                          <p:cTn id="4" fill="hold">
+                            <p:stCondLst>
+                              <p:cond delay="0"/>
+                            </p:stCondLst>
+                            <p:childTnLst>
+                              <p:par>
+                                <p:cTn id="5" presetID="1" presetClass="entr" presetSubtype="0" fill="hold" nodeType="clickEffect">
+                                  <p:stCondLst>
+                                    <p:cond delay="0"/>
+                                  </p:stCondLst>
+                                  <p:childTnLst>
+                                    <p:set>
+                                      <p:cBhvr>
+                                        <p:cTn id="6" dur="1" fill="hold">
+                                          <p:stCondLst>
+                                            <p:cond delay="0"/>
+                                          </p:stCondLst>
+                                        </p:cTn>
+                                        <p:tgtEl>
+                                          <p:spTgt spid="3">
+                                            <p:txEl>
+                                              <p:pRg st="0" end="0"/>
+                                            </p:txEl>
+                                          </p:spTgt>
+                                        </p:tgtEl>
+                                        <p:attrNameLst>
+                                          <p:attrName>style.visibility</p:attrName>
+                                        </p:attrNameLst>
+                                      </p:cBhvr>
+                                      <p:to>
+                                        <p:strVal val="visible"/>
+                                      </p:to>
+                                    </p:set>
+                                  </p:childTnLst>
+                                </p:cTn>
+                              </p:par>
+                              <p:par>
+                                <p:cTn id="7" presetID="1" presetClass="entr" presetSubtype="0" fill="hold" nodeType="withEffect">
+                                  <p:stCondLst>
+                                    <p:cond delay="0"/>
+                                  </p:stCondLst>
+                                  <p:childTnLst>
+                                    <p:set>
+                                      <p:cBhvr>
+                                        <p:cTn id="8" dur="1" fill="hold">
+                                          <p:stCondLst>
+                                            <p:cond delay="0"/>
+                                          </p:stCondLst>
+                                        </p:cTn>
+                                        <p:tgtEl>
+                                          <p:spTgt spid="3">
+                                            <p:txEl>
+                                              <p:pRg st="1" end="1"/>
+                                            </p:txEl>
+                                          </p:spTgt>
+                                        </p:tgtEl>
+                                        <p:attrNameLst>
+                                          <p:attrName>style.visibility</p:attrName>
+                                        </p:attrNameLst>
+                                      </p:cBhvr>
+                                      <p:to>
+                                        <p:strVal val="visible"/>
+                                      </p:to>
+                                    </p:set>
+                                  </p:childTnLst>
+                                </p:cTn>
+                              </p:par>
+                            </p:childTnLst>
+                          </p:cTn>
+                        </p:par>
+                      </p:childTnLst>
+                    </p:cTn>
+                  </p:par>
+                  <p:par>
+                    <p:cTn id="9" fill="hold">
+                      <p:stCondLst>
+                        <p:cond delay="indefinite"/>
+                      </p:stCondLst>
+                      <p:childTnLst>
+                        <p:par>
+                          <p:cTn id="10" fill="hold">
+                            <p:stCondLst>
+                              <p:cond delay="0"/>
+                            </p:stCondLst>
+                            <p:childTnLst>
+                              <p:par>
+                                <p:cTn id="11" presetID="1" presetClass="entr" presetSubtype="0" fill="hold" nodeType="clickEffect">
+                                  <p:stCondLst>
+                                    <p:cond delay="0"/>
+                                  </p:stCondLst>
+                                  <p:childTnLst>
+                                    <p:set>
+                                      <p:cBhvr>
+                                        <p:cTn id="12" dur="1" fill="hold">
+                                          <p:stCondLst>
+                                            <p:cond delay="0"/>
+                                          </p:stCondLst>
+                                        </p:cTn>
+                                        <p:tgtEl>
+                                          <p:spTgt spid="3">
+                                            <p:txEl>
+                                              <p:pRg st="2" end="2"/>
+                                            </p:txEl>
+                                          </p:spTgt>
+                                        </p:tgtEl>
+                                        <p:attrNameLst>
+                                          <p:attrName>style.visibility</p:attrName>
+                                        </p:attrNameLst>
+                                      </p:cBhvr>
+                                      <p:to>
+                                        <p:strVal val="visible"/>
+                                      </p:to>
+                                    </p:set>
+                                  </p:childTnLst>
+                                </p:cTn>
+                              </p:par>
+                            </p:childTnLst>
+                          </p:cTn>
+                        </p:par>
+                      </p:childTnLst>
+                    </p:cTn>
+                  </p:par>
+                  <p:par>
+                    <p:cTn id="13" fill="hold">
+                      <p:stCondLst>
+                        <p:cond delay="indefinite"/>
+                      </p:stCondLst>
+                      <p:childTnLst>
+                        <p:par>
+                          <p:cTn id="14" fill="hold">
+                            <p:stCondLst>
+                              <p:cond delay="0"/>
+                            </p:stCondLst>
+                            <p:childTnLst>
+                              <p:par>
+                                <p:cTn id="15" presetID="1" presetClass="entr" presetSubtype="0" fill="hold" nodeType="clickEffect">
+                                  <p:stCondLst>
+                                    <p:cond delay="0"/>
+                                  </p:stCondLst>
+                                  <p:childTnLst>
+                                    <p:set>
+                                      <p:cBhvr>
+                                        <p:cTn id="16" dur="1" fill="hold">
+                                          <p:stCondLst>
+                                            <p:cond delay="0"/>
+                                          </p:stCondLst>
+                                        </p:cTn>
+                                        <p:tgtEl>
+                                          <p:spTgt spid="3">
+                                            <p:txEl>
+                                              <p:pRg st="3" end="3"/>
+                                            </p:txEl>
+                                          </p:spTgt>
+                                        </p:tgtEl>
+                                        <p:attrNameLst>
+                                          <p:attrName>style.visibility</p:attrName>
+                                        </p:attrNameLst>
+                                      </p:cBhvr>
+                                      <p:to>
+                                        <p:strVal val="visible"/>
+                                      </p:to>
+                                    </p:set>
+                                  </p:childTnLst>
+                                </p:cTn>
+                              </p:par>
+                              <p:par>
+                                <p:cTn id="17" presetID="1" presetClass="entr" presetSubtype="0" fill="hold" nodeType="withEffect">
+                                  <p:stCondLst>
+                                    <p:cond delay="0"/>
+                                  </p:stCondLst>
+                                  <p:childTnLst>
+                                    <p:set>
+                                      <p:cBhvr>
+                                        <p:cTn id="18" dur="1" fill="hold">
+                                          <p:stCondLst>
+                                            <p:cond delay="0"/>
+                                          </p:stCondLst>
+                                        </p:cTn>
+                                        <p:tgtEl>
+                                          <p:spTgt spid="3">
+                                            <p:txEl>
+                                              <p:pRg st="4" end="4"/>
+                                            </p:txEl>
+                                          </p:spTgt>
+                                        </p:tgtEl>
+                                        <p:attrNameLst>
+                                          <p:attrName>style.visibility</p:attrName>
+                                        </p:attrNameLst>
+                                      </p:cBhvr>
+                                      <p:to>
+                                        <p:strVal val="visible"/>
+                                      </p:to>
+                                    </p:set>
+                                  </p:childTnLst>
+                                </p:cTn>
+                              </p:par>
+                              <p:par>
+                                <p:cTn id="19" presetID="1" presetClass="entr" presetSubtype="0" fill="hold" nodeType="withEffect">
+                                  <p:stCondLst>
+                                    <p:cond delay="0"/>
+                                  </p:stCondLst>
+                                  <p:childTnLst>
+                                    <p:set>
+                                      <p:cBhvr>
+                                        <p:cTn id="20" dur="1" fill="hold">
+                                          <p:stCondLst>
+                                            <p:cond delay="0"/>
+                                          </p:stCondLst>
+                                        </p:cTn>
+                                        <p:tgtEl>
+                                          <p:spTgt spid="3">
+                                            <p:txEl>
+                                              <p:pRg st="5" end="5"/>
+                                            </p:txEl>
+                                          </p:spTgt>
+                                        </p:tgtEl>
+                                        <p:attrNameLst>
+                                          <p:attrName>style.visibility</p:attrName>
+                                        </p:attrNameLst>
+                                      </p:cBhvr>
+                                      <p:to>
+                                        <p:strVal val="visible"/>
+                                      </p:to>
+                                    </p:set>
+                                  </p:childTnLst>
+                                </p:cTn>
+                              </p:par>
+                              <p:par>
+                                <p:cTn id="21" presetID="1" presetClass="entr" presetSubtype="0" fill="hold" nodeType="withEffect">
+                                  <p:stCondLst>
+                                    <p:cond delay="0"/>
+                                  </p:stCondLst>
+                                  <p:childTnLst>
+                                    <p:set>
+                                      <p:cBhvr>
+                                        <p:cTn id="22" dur="1" fill="hold">
+                                          <p:stCondLst>
+                                            <p:cond delay="0"/>
+                                          </p:stCondLst>
+                                        </p:cTn>
+                                        <p:tgtEl>
+                                          <p:spTgt spid="3">
+                                            <p:txEl>
+                                              <p:pRg st="6" end="6"/>
+                                            </p:txEl>
+                                          </p:spTgt>
+                                        </p:tgtEl>
+                                        <p:attrNameLst>
+                                          <p:attrName>style.visibility</p:attrName>
+                                        </p:attrNameLst>
+                                      </p:cBhvr>
+                                      <p:to>
+                                        <p:strVal val="visible"/>
+                                      </p:to>
+                                    </p:set>
+                                  </p:childTnLst>
+                                </p:cTn>
+                              </p:par>
+                            </p:childTnLst>
+                          </p:cTn>
+                        </p:par>
+                      </p:childTnLst>
+                    </p:cTn>
+                  </p:par>
+                  <p:par>
+                    <p:cTn id="23" fill="hold">
+                      <p:stCondLst>
+                        <p:cond delay="indefinite"/>
+                      </p:stCondLst>
+                      <p:childTnLst>
+                        <p:par>
+                          <p:cTn id="24" fill="hold">
+                            <p:stCondLst>
+                              <p:cond delay="0"/>
+                            </p:stCondLst>
+                            <p:childTnLst>
+                              <p:par>
+                                <p:cTn id="25" presetID="1" presetClass="entr" presetSubtype="0" fill="hold" nodeType="clickEffect">
+                                  <p:stCondLst>
+                                    <p:cond delay="0"/>
+                                  </p:stCondLst>
+                                  <p:childTnLst>
+                                    <p:set>
+                                      <p:cBhvr>
+                                        <p:cTn id="26" dur="1" fill="hold">
+                                          <p:stCondLst>
+                                            <p:cond delay="0"/>
+                                          </p:stCondLst>
+                                        </p:cTn>
+                                        <p:tgtEl>
+                                          <p:spTgt spid="3">
+                                            <p:txEl>
+                                              <p:pRg st="7" end="7"/>
+                                            </p:txEl>
+                                          </p:spTgt>
+                                        </p:tgtEl>
+                                        <p:attrNameLst>
+                                          <p:attrName>style.visibility</p:attrName>
+                                        </p:attrNameLst>
+                                      </p:cBhvr>
+                                      <p:to>
+                                        <p:strVal val="visible"/>
+                                      </p:to>
+                                    </p:set>
+                                  </p:childTnLst>
+                                </p:cTn>
+                              </p:par>
+                              <p:par>
+                                <p:cTn id="27" presetID="1" presetClass="entr" presetSubtype="0" fill="hold" nodeType="withEffect">
+                                  <p:stCondLst>
+                                    <p:cond delay="0"/>
+                                  </p:stCondLst>
+                                  <p:childTnLst>
+                                    <p:set>
+                                      <p:cBhvr>
+                                        <p:cTn id="28" dur="1" fill="hold">
+                                          <p:stCondLst>
+                                            <p:cond delay="0"/>
+                                          </p:stCondLst>
+                                        </p:cTn>
+                                        <p:tgtEl>
+                                          <p:spTgt spid="3">
+                                            <p:txEl>
+                                              <p:pRg st="8" end="8"/>
+                                            </p:txEl>
+                                          </p:spTgt>
+                                        </p:tgtEl>
+                                        <p:attrNameLst>
+                                          <p:attrName>style.visibility</p:attrName>
+                                        </p:attrNameLst>
+                                      </p:cBhvr>
+                                      <p:to>
+                                        <p:strVal val="visible"/>
+                                      </p:to>
+                                    </p:set>
+                                  </p:childTnLst>
+                                </p:cTn>
+                              </p:par>
+                              <p:par>
+                                <p:cTn id="29" presetID="1" presetClass="entr" presetSubtype="0" fill="hold" nodeType="withEffect">
+                                  <p:stCondLst>
+                                    <p:cond delay="0"/>
+                                  </p:stCondLst>
+                                  <p:childTnLst>
+                                    <p:set>
+                                      <p:cBhvr>
+                                        <p:cTn id="30" dur="1" fill="hold">
+                                          <p:stCondLst>
+                                            <p:cond delay="0"/>
+                                          </p:stCondLst>
+                                        </p:cTn>
+                                        <p:tgtEl>
+                                          <p:spTgt spid="3">
+                                            <p:txEl>
+                                              <p:pRg st="9" end="9"/>
+                                            </p:txEl>
+                                          </p:spTgt>
+                                        </p:tgtEl>
+                                        <p:attrNameLst>
+                                          <p:attrName>style.visibility</p:attrName>
+                                        </p:attrNameLst>
+                                      </p:cBhvr>
+                                      <p:to>
+                                        <p:strVal val="visible"/>
+                                      </p:to>
+                                    </p:set>
+                                  </p:childTnLst>
+                                </p:cTn>
+                              </p:par>
+                            </p:childTnLst>
+                          </p:cTn>
+                        </p:par>
+                      </p:childTnLst>
+                    </p:cTn>
+                  </p:par>
+                  <p:par>
+                    <p:cTn id="31" fill="hold">
+                      <p:stCondLst>
+                        <p:cond delay="indefinite"/>
+                      </p:stCondLst>
+                      <p:childTnLst>
+                        <p:par>
+                          <p:cTn id="32" fill="hold">
+                            <p:stCondLst>
+                              <p:cond delay="0"/>
+                            </p:stCondLst>
+                            <p:childTnLst>
+                              <p:par>
+                                <p:cTn id="33" presetID="1" presetClass="entr" presetSubtype="0" fill="hold" grpId="0" nodeType="clickEffect">
+                                  <p:stCondLst>
+                                    <p:cond delay="0"/>
+                                  </p:stCondLst>
+                                  <p:childTnLst>
+                                    <p:set>
+                                      <p:cBhvr>
+                                        <p:cTn id="34" dur="1" fill="hold">
+                                          <p:stCondLst>
+                                            <p:cond delay="0"/>
+                                          </p:stCondLst>
+                                        </p:cTn>
+                                        <p:tgtEl>
+                                          <p:spTgt spid="12"/>
+                                        </p:tgtEl>
+                                        <p:attrNameLst>
+                                          <p:attrName>style.visibility</p:attrName>
+                                        </p:attrNameLst>
+                                      </p:cBhvr>
+                                      <p:to>
+                                        <p:strVal val="visible"/>
+                                      </p:to>
+                                    </p:set>
+                                  </p:childTnLst>
+                                </p:cTn>
+                              </p:par>
+                            </p:childTnLst>
+                          </p:cTn>
+                        </p:par>
+                        <p:par>
+                          <p:cTn id="35" fill="hold">
+                            <p:stCondLst>
+                              <p:cond delay="0"/>
+                            </p:stCondLst>
+                            <p:childTnLst>
+                              <p:par>
+                                <p:cTn id="36" presetID="63" presetClass="entr" presetSubtype="0" fill="hold" nodeType="afterEffect">
+                                  <p:stCondLst>
+                                    <p:cond delay="500"/>
+                                  </p:stCondLst>
+                                  <p:childTnLst>
+                                    <p:set>
+                                      <p:cBhvr>
+                                        <p:cTn id="37" dur="1" fill="hold">
+                                          <p:stCondLst>
+                                            <p:cond delay="0"/>
+                                          </p:stCondLst>
+                                        </p:cTn>
+                                        <p:tgtEl>
+                                          <p:spTgt spid="7"/>
+                                        </p:tgtEl>
+                                        <p:attrNameLst>
+                                          <p:attrName>style.visibility</p:attrName>
+                                        </p:attrNameLst>
+                                      </p:cBhvr>
+                                      <p:to>
+                                        <p:strVal val="visible"/>
+                                      </p:to>
+                                    </p:set>
+                                    <p:anim calcmode="lin" valueType="num">
+                                      <p:cBhvr>
+                                        <p:cTn id="38" dur="500" fill="hold"/>
+                                        <p:tgtEl>
+                                          <p:spTgt spid="7"/>
+                                        </p:tgtEl>
+                                        <p:attrNameLst>
+                                          <p:attrName>drawProgress</p:attrName>
+                                        </p:attrNameLst>
+                                      </p:cBhvr>
+                                      <p:tavLst>
+                                        <p:tav tm="0">
+                                          <p:val>
+                                            <p:fltVal val="0"/>
+                                          </p:val>
+                                        </p:tav>
+                                        <p:tav tm="100000">
+                                          <p:val>
+                                            <p:fltVal val="1"/>
+                                          </p:val>
+                                        </p:tav>
+                                      </p:tavLst>
+                                    </p:anim>
+                                  </p:childTnLst>
+                                </p:cTn>
+                              </p:par>
+                            </p:childTnLst>
+                          </p:cTn>
+                        </p:par>
+                        <p:par>
+                          <p:cTn id="39" fill="hold">
+                            <p:stCondLst>
+                              <p:cond delay="1000"/>
+                            </p:stCondLst>
+                            <p:childTnLst>
+                              <p:par>
+                                <p:cTn id="40" presetID="63" presetClass="entr" presetSubtype="0" fill="hold" nodeType="afterEffect">
+                                  <p:stCondLst>
+                                    <p:cond delay="500"/>
+                                  </p:stCondLst>
+                                  <p:childTnLst>
+                                    <p:set>
+                                      <p:cBhvr>
+                                        <p:cTn id="41" dur="1" fill="hold">
+                                          <p:stCondLst>
+                                            <p:cond delay="0"/>
+                                          </p:stCondLst>
+                                        </p:cTn>
+                                        <p:tgtEl>
+                                          <p:spTgt spid="14"/>
+                                        </p:tgtEl>
+                                        <p:attrNameLst>
+                                          <p:attrName>style.visibility</p:attrName>
+                                        </p:attrNameLst>
+                                      </p:cBhvr>
+                                      <p:to>
+                                        <p:strVal val="visible"/>
+                                      </p:to>
+                                    </p:set>
+                                    <p:anim calcmode="lin" valueType="num">
+                                      <p:cBhvr>
+                                        <p:cTn id="42" dur="500" fill="hold"/>
+                                        <p:tgtEl>
+                                          <p:spTgt spid="14"/>
+                                        </p:tgtEl>
+                                        <p:attrNameLst>
+                                          <p:attrName>drawProgress</p:attrName>
+                                        </p:attrNameLst>
+                                      </p:cBhvr>
+                                      <p:tavLst>
+                                        <p:tav tm="0">
+                                          <p:val>
+                                            <p:fltVal val="0"/>
+                                          </p:val>
+                                        </p:tav>
+                                        <p:tav tm="100000">
+                                          <p:val>
+                                            <p:fltVal val="1"/>
+                                          </p:val>
+                                        </p:tav>
+                                      </p:tavLst>
+                                    </p:anim>
+                                  </p:childTnLst>
+                                </p:cTn>
+                              </p:par>
+                            </p:childTnLst>
+                          </p:cTn>
+                        </p:par>
+                        <p:par>
+                          <p:cTn id="43" fill="hold">
+                            <p:stCondLst>
+                              <p:cond delay="2000"/>
+                            </p:stCondLst>
+                            <p:childTnLst>
+                              <p:par>
+                                <p:cTn id="44" presetID="63" presetClass="entr" presetSubtype="0" fill="hold" nodeType="afterEffect">
+                                  <p:stCondLst>
+                                    <p:cond delay="0"/>
+                                  </p:stCondLst>
+                                  <p:childTnLst>
+                                    <p:set>
+                                      <p:cBhvr>
+                                        <p:cTn id="45" dur="1" fill="hold">
+                                          <p:stCondLst>
+                                            <p:cond delay="0"/>
+                                          </p:stCondLst>
+                                        </p:cTn>
+                                        <p:tgtEl>
+                                          <p:spTgt spid="18"/>
+                                        </p:tgtEl>
+                                        <p:attrNameLst>
+                                          <p:attrName>style.visibility</p:attrName>
+                                        </p:attrNameLst>
+                                      </p:cBhvr>
+                                      <p:to>
+                                        <p:strVal val="visible"/>
+                                      </p:to>
+                                    </p:set>
+                                    <p:anim calcmode="lin" valueType="num">
+                                      <p:cBhvr>
+                                        <p:cTn id="46" dur="250" fill="hold"/>
+                                        <p:tgtEl>
+                                          <p:spTgt spid="18"/>
+                                        </p:tgtEl>
+                                        <p:attrNameLst>
+                                          <p:attrName>drawProgress</p:attrName>
+                                        </p:attrNameLst>
+                                      </p:cBhvr>
+                                      <p:tavLst>
+                                        <p:tav tm="0">
+                                          <p:val>
+                                            <p:fltVal val="0"/>
+                                          </p:val>
+                                        </p:tav>
+                                        <p:tav tm="100000">
+                                          <p:val>
+                                            <p:fltVal val="1"/>
+                                          </p:val>
+                                        </p:tav>
+                                      </p:tavLst>
+                                    </p:anim>
+                                  </p:childTnLst>
+                                </p:cTn>
+                              </p:par>
+                            </p:childTnLst>
+                          </p:cTn>
+                        </p:par>
+                        <p:par>
+                          <p:cTn id="47" fill="hold">
+                            <p:stCondLst>
+                              <p:cond delay="2250"/>
+                            </p:stCondLst>
+                            <p:childTnLst>
+                              <p:par>
+                                <p:cTn id="48" presetID="6" presetClass="emph" presetSubtype="0" repeatCount="indefinite" autoRev="1" fill="hold" nodeType="afterEffect">
+                                  <p:stCondLst>
+                                    <p:cond delay="1000"/>
+                                  </p:stCondLst>
+                                  <p:childTnLst>
+                                    <p:animScale>
+                                      <p:cBhvr>
+                                        <p:cTn id="49" dur="500" fill="hold"/>
+                                        <p:tgtEl>
+                                          <p:spTgt spid="18"/>
+                                        </p:tgtEl>
+                                      </p:cBhvr>
+                                      <p:by x="150000" y="150000"/>
+                                    </p:animScale>
+                                  </p:childTnLst>
+                                </p:cTn>
+                              </p:par>
+                            </p:childTnLst>
+                          </p:cTn>
+                        </p:par>
+                      </p:childTnLst>
+                    </p:cTn>
+                  </p:par>
+                </p:childTnLst>
+              </p:cTn>
+              <p:prevCondLst>
+                <p:cond evt="onPrev" delay="0">
+                  <p:tgtEl>
+                    <p:sldTgt/>
+                  </p:tgtEl>
+                </p:cond>
+              </p:prevCondLst>
+              <p:nextCondLst>
+                <p:cond evt="onNext" delay="0">
+                  <p:tgtEl>
+                    <p:sldTgt/>
+                  </p:tgtEl>
+                </p:cond>
+              </p:nextCondLst>
+            </p:seq>
+          </p:childTnLst>
+        </p:cTn>
+      </p:par>
+    </p:tnLst>
+    <p:bldLst>
+      <p:bldP spid="12" grpId="0"/>
+    </p:bldLst>
+  </p:timing>
 </p:sld>
 </file>
 
@@ -11874,7 +14351,7 @@
         </p:nvSpPr>
         <p:spPr>
           <a:xfrm>
-            <a:off x="1265583" y="1825625"/>
+            <a:off x="1265583" y="1819529"/>
             <a:ext cx="10515600" cy="4351338"/>
           </a:xfrm>
         </p:spPr>
@@ -11925,7 +14402,7 @@
             </a:pPr>
             <a:r>
               <a:rPr lang="en-GB" dirty="0"/>
-              <a:t>Maintained by </a:t>
+              <a:t>Maintained by                      (of                 fame) </a:t>
             </a:r>
           </a:p>
           <a:p>
@@ -11934,7 +14411,7 @@
               <a:rPr lang="en-GB" dirty="0">
                 <a:hlinkClick r:id="rId4"/>
               </a:rPr>
-              <a:t>https://shiny.rstudio.com/</a:t>
+              <a:t>https://shiny.posit.co/</a:t>
             </a:r>
             <a:endParaRPr lang="en-GB" dirty="0"/>
           </a:p>
@@ -11974,8 +14451,44 @@
         </p:blipFill>
         <p:spPr>
           <a:xfrm>
-            <a:off x="3651323" y="4084721"/>
-            <a:ext cx="1745383" cy="613611"/>
+            <a:off x="6345755" y="4129543"/>
+            <a:ext cx="1359589" cy="477980"/>
+          </a:xfrm>
+          <a:prstGeom prst="rect">
+            <a:avLst/>
+          </a:prstGeom>
+        </p:spPr>
+      </p:pic>
+      <p:pic>
+        <p:nvPicPr>
+          <p:cNvPr id="11" name="Picture 10" descr="A white circle on a black background&#10;&#10;Description automatically generated">
+            <a:extLst>
+              <a:ext uri="{FF2B5EF4-FFF2-40B4-BE49-F238E27FC236}">
+                <a16:creationId xmlns:a16="http://schemas.microsoft.com/office/drawing/2014/main" id="{53AA340E-6562-0260-FBE4-0C34F2999576}"/>
+              </a:ext>
+            </a:extLst>
+          </p:cNvPr>
+          <p:cNvPicPr>
+            <a:picLocks noChangeAspect="1"/>
+          </p:cNvPicPr>
+          <p:nvPr/>
+        </p:nvPicPr>
+        <p:blipFill>
+          <a:blip r:embed="rId6">
+            <a:extLst>
+              <a:ext uri="{28A0092B-C50C-407E-A947-70E740481C1C}">
+                <a14:useLocalDpi xmlns:a14="http://schemas.microsoft.com/office/drawing/2010/main" val="0"/>
+              </a:ext>
+            </a:extLst>
+          </a:blip>
+          <a:stretch>
+            <a:fillRect/>
+          </a:stretch>
+        </p:blipFill>
+        <p:spPr>
+          <a:xfrm>
+            <a:off x="3669611" y="4199483"/>
+            <a:ext cx="1640005" cy="408040"/>
           </a:xfrm>
           <a:prstGeom prst="rect">
             <a:avLst/>

</xml_diff>